<commit_message>
Add UT test case for multiple tooltip generation
</commit_message>
<xml_diff>
--- a/doc/test/TooltipsLab/CreateTooltip.pptx
+++ b/doc/test/TooltipsLab/CreateTooltip.pptx
@@ -7,7 +7,7 @@
     <p:sldMasterId id="2147483672" r:id="rId3"/>
   </p:sldMasterIdLst>
   <p:notesMasterIdLst>
-    <p:notesMasterId r:id="rId16"/>
+    <p:notesMasterId r:id="rId19"/>
   </p:notesMasterIdLst>
   <p:sldIdLst>
     <p:sldId id="287" r:id="rId4"/>
@@ -21,7 +21,10 @@
     <p:sldId id="319" r:id="rId12"/>
     <p:sldId id="320" r:id="rId13"/>
     <p:sldId id="322" r:id="rId14"/>
-    <p:sldId id="305" r:id="rId15"/>
+    <p:sldId id="323" r:id="rId15"/>
+    <p:sldId id="324" r:id="rId16"/>
+    <p:sldId id="325" r:id="rId17"/>
+    <p:sldId id="305" r:id="rId18"/>
   </p:sldIdLst>
   <p:sldSz cx="9144000" cy="6858000" type="screen4x3"/>
   <p:notesSz cx="6858000" cy="9144000"/>
@@ -140,6 +143,9 @@
             <p14:sldId id="319"/>
             <p14:sldId id="320"/>
             <p14:sldId id="322"/>
+            <p14:sldId id="323"/>
+            <p14:sldId id="324"/>
+            <p14:sldId id="325"/>
             <p14:sldId id="305"/>
           </p14:sldIdLst>
         </p14:section>
@@ -11061,6 +11067,1498 @@
 </file>
 
 <file path=ppt/slides/slide12.xml><?xml version="1.0" encoding="utf-8"?>
+<p:sld xmlns:a="http://schemas.openxmlformats.org/drawingml/2006/main" xmlns:r="http://schemas.openxmlformats.org/officeDocument/2006/relationships" xmlns:p="http://schemas.openxmlformats.org/presentationml/2006/main">
+  <p:cSld>
+    <p:bg>
+      <p:bgPr>
+        <a:solidFill>
+          <a:srgbClr val="0070BF"/>
+        </a:solidFill>
+        <a:effectLst/>
+      </p:bgPr>
+    </p:bg>
+    <p:spTree>
+      <p:nvGrpSpPr>
+        <p:cNvPr id="1" name=""/>
+        <p:cNvGrpSpPr/>
+        <p:nvPr/>
+      </p:nvGrpSpPr>
+      <p:grpSpPr>
+        <a:xfrm>
+          <a:off x="0" y="0"/>
+          <a:ext cx="0" cy="0"/>
+          <a:chOff x="0" y="0"/>
+          <a:chExt cx="0" cy="0"/>
+        </a:xfrm>
+      </p:grpSpPr>
+      <p:sp>
+        <p:nvSpPr>
+          <p:cNvPr id="2" name="Title 1"/>
+          <p:cNvSpPr>
+            <a:spLocks noGrp="1"/>
+          </p:cNvSpPr>
+          <p:nvPr>
+            <p:ph type="title"/>
+          </p:nvPr>
+        </p:nvSpPr>
+        <p:spPr>
+          <a:solidFill>
+            <a:srgbClr val="0070BF"/>
+          </a:solidFill>
+        </p:spPr>
+        <p:txBody>
+          <a:bodyPr/>
+          <a:lstStyle/>
+          <a:p>
+            <a:r>
+              <a:rPr lang="en-US" dirty="0" smtClean="0"/>
+              <a:t>Create Tooltip: </a:t>
+            </a:r>
+            <a:r>
+              <a:rPr lang="en-US" dirty="0" smtClean="0"/>
+              <a:t>Create multiple tooltips</a:t>
+            </a:r>
+            <a:endParaRPr lang="en-SG" dirty="0"/>
+          </a:p>
+        </p:txBody>
+      </p:sp>
+      <p:sp>
+        <p:nvSpPr>
+          <p:cNvPr id="4" name="Content Placeholder 2"/>
+          <p:cNvSpPr>
+            <a:spLocks noGrp="1"/>
+          </p:cNvSpPr>
+          <p:nvPr>
+            <p:ph idx="1"/>
+          </p:nvPr>
+        </p:nvSpPr>
+        <p:spPr>
+          <a:xfrm>
+            <a:off x="457200" y="3124200"/>
+            <a:ext cx="8229600" cy="3001963"/>
+          </a:xfrm>
+        </p:spPr>
+        <p:txBody>
+          <a:bodyPr/>
+          <a:lstStyle/>
+          <a:p>
+            <a:r>
+              <a:rPr lang="en-US" dirty="0" smtClean="0"/>
+              <a:t>Click ‘Create Tooltip’ </a:t>
+            </a:r>
+            <a:r>
+              <a:rPr lang="en-US" dirty="0" smtClean="0"/>
+              <a:t>5 times in succession.</a:t>
+            </a:r>
+            <a:endParaRPr lang="en-SG" dirty="0"/>
+          </a:p>
+        </p:txBody>
+      </p:sp>
+    </p:spTree>
+    <p:extLst>
+      <p:ext uri="{BB962C8B-B14F-4D97-AF65-F5344CB8AC3E}">
+        <p14:creationId xmlns:p14="http://schemas.microsoft.com/office/powerpoint/2010/main" val="1269167759"/>
+      </p:ext>
+    </p:extLst>
+  </p:cSld>
+  <p:clrMapOvr>
+    <a:masterClrMapping/>
+  </p:clrMapOvr>
+  <p:timing>
+    <p:tnLst>
+      <p:par>
+        <p:cTn id="1" dur="indefinite" restart="never" nodeType="tmRoot"/>
+      </p:par>
+    </p:tnLst>
+  </p:timing>
+</p:sld>
+</file>
+
+<file path=ppt/slides/slide13.xml><?xml version="1.0" encoding="utf-8"?>
+<p:sld xmlns:a="http://schemas.openxmlformats.org/drawingml/2006/main" xmlns:r="http://schemas.openxmlformats.org/officeDocument/2006/relationships" xmlns:p="http://schemas.openxmlformats.org/presentationml/2006/main">
+  <p:cSld>
+    <p:spTree>
+      <p:nvGrpSpPr>
+        <p:cNvPr id="1" name=""/>
+        <p:cNvGrpSpPr/>
+        <p:nvPr/>
+      </p:nvGrpSpPr>
+      <p:grpSpPr>
+        <a:xfrm>
+          <a:off x="0" y="0"/>
+          <a:ext cx="0" cy="0"/>
+          <a:chOff x="0" y="0"/>
+          <a:chExt cx="0" cy="0"/>
+        </a:xfrm>
+      </p:grpSpPr>
+    </p:spTree>
+    <p:extLst>
+      <p:ext uri="{BB962C8B-B14F-4D97-AF65-F5344CB8AC3E}">
+        <p14:creationId xmlns:p14="http://schemas.microsoft.com/office/powerpoint/2010/main" val="1069082780"/>
+      </p:ext>
+    </p:extLst>
+  </p:cSld>
+  <p:clrMapOvr>
+    <a:masterClrMapping/>
+  </p:clrMapOvr>
+  <p:timing>
+    <p:tnLst>
+      <p:par>
+        <p:cTn id="1" dur="indefinite" restart="never" nodeType="tmRoot"/>
+      </p:par>
+    </p:tnLst>
+  </p:timing>
+</p:sld>
+</file>
+
+<file path=ppt/slides/slide14.xml><?xml version="1.0" encoding="utf-8"?>
+<p:sld xmlns:a="http://schemas.openxmlformats.org/drawingml/2006/main" xmlns:r="http://schemas.openxmlformats.org/officeDocument/2006/relationships" xmlns:p="http://schemas.openxmlformats.org/presentationml/2006/main">
+  <p:cSld>
+    <p:spTree>
+      <p:nvGrpSpPr>
+        <p:cNvPr id="1" name=""/>
+        <p:cNvGrpSpPr/>
+        <p:nvPr/>
+      </p:nvGrpSpPr>
+      <p:grpSpPr>
+        <a:xfrm>
+          <a:off x="0" y="0"/>
+          <a:ext cx="0" cy="0"/>
+          <a:chOff x="0" y="0"/>
+          <a:chExt cx="0" cy="0"/>
+        </a:xfrm>
+      </p:grpSpPr>
+      <p:sp>
+        <p:nvSpPr>
+          <p:cNvPr id="8" name="Oval 7"/>
+          <p:cNvSpPr/>
+          <p:nvPr/>
+        </p:nvSpPr>
+        <p:spPr>
+          <a:xfrm>
+            <a:off x="2540000" y="2540000"/>
+            <a:ext cx="317500" cy="317500"/>
+          </a:xfrm>
+          <a:prstGeom prst="ellipse">
+            <a:avLst/>
+          </a:prstGeom>
+          <a:solidFill>
+            <a:srgbClr val="D3D3D3"/>
+          </a:solidFill>
+          <a:ln w="25400" cap="flat" cmpd="sng" algn="ctr">
+            <a:solidFill>
+              <a:schemeClr val="accent1">
+                <a:shade val="50000"/>
+                <a:alpha val="0"/>
+              </a:schemeClr>
+            </a:solidFill>
+            <a:prstDash val="solid"/>
+            <a:round/>
+            <a:headEnd type="none" w="med" len="med"/>
+            <a:tailEnd type="none" w="med" len="med"/>
+          </a:ln>
+        </p:spPr>
+        <p:style>
+          <a:lnRef idx="2">
+            <a:schemeClr val="accent1">
+              <a:shade val="50000"/>
+            </a:schemeClr>
+          </a:lnRef>
+          <a:fillRef idx="1">
+            <a:schemeClr val="accent1"/>
+          </a:fillRef>
+          <a:effectRef idx="0">
+            <a:schemeClr val="accent1"/>
+          </a:effectRef>
+          <a:fontRef idx="minor">
+            <a:schemeClr val="lt1"/>
+          </a:fontRef>
+        </p:style>
+        <p:txBody>
+          <a:bodyPr rtlCol="0" anchor="ctr"/>
+          <a:lstStyle/>
+          <a:p>
+            <a:pPr algn="ctr"/>
+            <a:r>
+              <a:rPr lang="en-SG" sz="1600" smtClean="0">
+                <a:solidFill>
+                  <a:srgbClr val="FFFFFF"/>
+                </a:solidFill>
+              </a:rPr>
+              <a:t>?</a:t>
+            </a:r>
+            <a:endParaRPr lang="en-SG" sz="1600">
+              <a:solidFill>
+                <a:srgbClr val="FFFFFF"/>
+              </a:solidFill>
+            </a:endParaRPr>
+          </a:p>
+        </p:txBody>
+      </p:sp>
+      <p:sp>
+        <p:nvSpPr>
+          <p:cNvPr id="9" name="Rounded Rectangular Callout 8"/>
+          <p:cNvSpPr/>
+          <p:nvPr/>
+        </p:nvSpPr>
+        <p:spPr>
+          <a:xfrm>
+            <a:off x="2143119" y="984250"/>
+            <a:ext cx="1905000" cy="1270000"/>
+          </a:xfrm>
+          <a:prstGeom prst="wedgeRoundRectCallout">
+            <a:avLst/>
+          </a:prstGeom>
+          <a:solidFill>
+            <a:srgbClr val="000000">
+              <a:alpha val="80000"/>
+            </a:srgbClr>
+          </a:solidFill>
+          <a:ln w="635">
+            <a:solidFill>
+              <a:srgbClr val="FFFF00"/>
+            </a:solidFill>
+          </a:ln>
+          <a:effectLst>
+            <a:outerShdw blurRad="63500" sx="102000" sy="102000" algn="ctr">
+              <a:prstClr val="black">
+                <a:alpha val="40000"/>
+              </a:prstClr>
+            </a:outerShdw>
+          </a:effectLst>
+        </p:spPr>
+        <p:style>
+          <a:lnRef idx="2">
+            <a:schemeClr val="accent1">
+              <a:shade val="50000"/>
+            </a:schemeClr>
+          </a:lnRef>
+          <a:fillRef idx="1">
+            <a:schemeClr val="accent1"/>
+          </a:fillRef>
+          <a:effectRef idx="0">
+            <a:schemeClr val="accent1"/>
+          </a:effectRef>
+          <a:fontRef idx="minor">
+            <a:schemeClr val="lt1"/>
+          </a:fontRef>
+        </p:style>
+        <p:txBody>
+          <a:bodyPr rtlCol="0" anchor="ctr">
+            <a:normAutofit/>
+          </a:bodyPr>
+          <a:lstStyle/>
+          <a:p>
+            <a:pPr algn="ctr"/>
+            <a:endParaRPr lang="en-SG" sz="1600">
+              <a:solidFill>
+                <a:srgbClr val="FFFFFF"/>
+              </a:solidFill>
+            </a:endParaRPr>
+          </a:p>
+        </p:txBody>
+      </p:sp>
+      <p:sp>
+        <p:nvSpPr>
+          <p:cNvPr id="10" name="Oval 9"/>
+          <p:cNvSpPr/>
+          <p:nvPr/>
+        </p:nvSpPr>
+        <p:spPr>
+          <a:xfrm>
+            <a:off x="2540000" y="2540000"/>
+            <a:ext cx="317500" cy="317500"/>
+          </a:xfrm>
+          <a:prstGeom prst="ellipse">
+            <a:avLst/>
+          </a:prstGeom>
+          <a:solidFill>
+            <a:srgbClr val="D3D3D3"/>
+          </a:solidFill>
+          <a:ln w="25400" cap="flat" cmpd="sng" algn="ctr">
+            <a:solidFill>
+              <a:schemeClr val="accent1">
+                <a:shade val="50000"/>
+                <a:alpha val="0"/>
+              </a:schemeClr>
+            </a:solidFill>
+            <a:prstDash val="solid"/>
+            <a:round/>
+            <a:headEnd type="none" w="med" len="med"/>
+            <a:tailEnd type="none" w="med" len="med"/>
+          </a:ln>
+        </p:spPr>
+        <p:style>
+          <a:lnRef idx="2">
+            <a:schemeClr val="accent1">
+              <a:shade val="50000"/>
+            </a:schemeClr>
+          </a:lnRef>
+          <a:fillRef idx="1">
+            <a:schemeClr val="accent1"/>
+          </a:fillRef>
+          <a:effectRef idx="0">
+            <a:schemeClr val="accent1"/>
+          </a:effectRef>
+          <a:fontRef idx="minor">
+            <a:schemeClr val="lt1"/>
+          </a:fontRef>
+        </p:style>
+        <p:txBody>
+          <a:bodyPr rtlCol="0" anchor="ctr"/>
+          <a:lstStyle/>
+          <a:p>
+            <a:pPr algn="ctr"/>
+            <a:r>
+              <a:rPr lang="en-SG" sz="1600" smtClean="0">
+                <a:solidFill>
+                  <a:srgbClr val="FFFFFF"/>
+                </a:solidFill>
+              </a:rPr>
+              <a:t>?</a:t>
+            </a:r>
+            <a:endParaRPr lang="en-SG" sz="1600">
+              <a:solidFill>
+                <a:srgbClr val="FFFFFF"/>
+              </a:solidFill>
+            </a:endParaRPr>
+          </a:p>
+        </p:txBody>
+      </p:sp>
+      <p:sp>
+        <p:nvSpPr>
+          <p:cNvPr id="11" name="Rounded Rectangular Callout 10"/>
+          <p:cNvSpPr/>
+          <p:nvPr/>
+        </p:nvSpPr>
+        <p:spPr>
+          <a:xfrm>
+            <a:off x="2143119" y="984250"/>
+            <a:ext cx="1905000" cy="1270000"/>
+          </a:xfrm>
+          <a:prstGeom prst="wedgeRoundRectCallout">
+            <a:avLst/>
+          </a:prstGeom>
+          <a:solidFill>
+            <a:srgbClr val="000000">
+              <a:alpha val="80000"/>
+            </a:srgbClr>
+          </a:solidFill>
+          <a:ln w="635">
+            <a:solidFill>
+              <a:srgbClr val="FFFF00"/>
+            </a:solidFill>
+          </a:ln>
+          <a:effectLst>
+            <a:outerShdw blurRad="63500" sx="102000" sy="102000" algn="ctr">
+              <a:prstClr val="black">
+                <a:alpha val="40000"/>
+              </a:prstClr>
+            </a:outerShdw>
+          </a:effectLst>
+        </p:spPr>
+        <p:style>
+          <a:lnRef idx="2">
+            <a:schemeClr val="accent1">
+              <a:shade val="50000"/>
+            </a:schemeClr>
+          </a:lnRef>
+          <a:fillRef idx="1">
+            <a:schemeClr val="accent1"/>
+          </a:fillRef>
+          <a:effectRef idx="0">
+            <a:schemeClr val="accent1"/>
+          </a:effectRef>
+          <a:fontRef idx="minor">
+            <a:schemeClr val="lt1"/>
+          </a:fontRef>
+        </p:style>
+        <p:txBody>
+          <a:bodyPr rtlCol="0" anchor="ctr">
+            <a:normAutofit/>
+          </a:bodyPr>
+          <a:lstStyle/>
+          <a:p>
+            <a:pPr algn="ctr"/>
+            <a:endParaRPr lang="en-SG" sz="1600">
+              <a:solidFill>
+                <a:srgbClr val="FFFFFF"/>
+              </a:solidFill>
+            </a:endParaRPr>
+          </a:p>
+        </p:txBody>
+      </p:sp>
+      <p:sp>
+        <p:nvSpPr>
+          <p:cNvPr id="12" name="Oval 11"/>
+          <p:cNvSpPr/>
+          <p:nvPr/>
+        </p:nvSpPr>
+        <p:spPr>
+          <a:xfrm>
+            <a:off x="2540000" y="2540000"/>
+            <a:ext cx="317500" cy="317500"/>
+          </a:xfrm>
+          <a:prstGeom prst="ellipse">
+            <a:avLst/>
+          </a:prstGeom>
+          <a:solidFill>
+            <a:srgbClr val="D3D3D3"/>
+          </a:solidFill>
+          <a:ln w="25400" cap="flat" cmpd="sng" algn="ctr">
+            <a:solidFill>
+              <a:schemeClr val="accent1">
+                <a:shade val="50000"/>
+                <a:alpha val="0"/>
+              </a:schemeClr>
+            </a:solidFill>
+            <a:prstDash val="solid"/>
+            <a:round/>
+            <a:headEnd type="none" w="med" len="med"/>
+            <a:tailEnd type="none" w="med" len="med"/>
+          </a:ln>
+        </p:spPr>
+        <p:style>
+          <a:lnRef idx="2">
+            <a:schemeClr val="accent1">
+              <a:shade val="50000"/>
+            </a:schemeClr>
+          </a:lnRef>
+          <a:fillRef idx="1">
+            <a:schemeClr val="accent1"/>
+          </a:fillRef>
+          <a:effectRef idx="0">
+            <a:schemeClr val="accent1"/>
+          </a:effectRef>
+          <a:fontRef idx="minor">
+            <a:schemeClr val="lt1"/>
+          </a:fontRef>
+        </p:style>
+        <p:txBody>
+          <a:bodyPr rtlCol="0" anchor="ctr"/>
+          <a:lstStyle/>
+          <a:p>
+            <a:pPr algn="ctr"/>
+            <a:r>
+              <a:rPr lang="en-SG" sz="1600" smtClean="0">
+                <a:solidFill>
+                  <a:srgbClr val="FFFFFF"/>
+                </a:solidFill>
+              </a:rPr>
+              <a:t>?</a:t>
+            </a:r>
+            <a:endParaRPr lang="en-SG" sz="1600">
+              <a:solidFill>
+                <a:srgbClr val="FFFFFF"/>
+              </a:solidFill>
+            </a:endParaRPr>
+          </a:p>
+        </p:txBody>
+      </p:sp>
+      <p:sp>
+        <p:nvSpPr>
+          <p:cNvPr id="13" name="Rounded Rectangular Callout 12"/>
+          <p:cNvSpPr/>
+          <p:nvPr/>
+        </p:nvSpPr>
+        <p:spPr>
+          <a:xfrm>
+            <a:off x="2143119" y="984250"/>
+            <a:ext cx="1905000" cy="1270000"/>
+          </a:xfrm>
+          <a:prstGeom prst="wedgeRoundRectCallout">
+            <a:avLst/>
+          </a:prstGeom>
+          <a:solidFill>
+            <a:srgbClr val="000000">
+              <a:alpha val="80000"/>
+            </a:srgbClr>
+          </a:solidFill>
+          <a:ln w="635">
+            <a:solidFill>
+              <a:srgbClr val="FFFF00"/>
+            </a:solidFill>
+          </a:ln>
+          <a:effectLst>
+            <a:outerShdw blurRad="63500" sx="102000" sy="102000" algn="ctr">
+              <a:prstClr val="black">
+                <a:alpha val="40000"/>
+              </a:prstClr>
+            </a:outerShdw>
+          </a:effectLst>
+        </p:spPr>
+        <p:style>
+          <a:lnRef idx="2">
+            <a:schemeClr val="accent1">
+              <a:shade val="50000"/>
+            </a:schemeClr>
+          </a:lnRef>
+          <a:fillRef idx="1">
+            <a:schemeClr val="accent1"/>
+          </a:fillRef>
+          <a:effectRef idx="0">
+            <a:schemeClr val="accent1"/>
+          </a:effectRef>
+          <a:fontRef idx="minor">
+            <a:schemeClr val="lt1"/>
+          </a:fontRef>
+        </p:style>
+        <p:txBody>
+          <a:bodyPr rtlCol="0" anchor="ctr">
+            <a:normAutofit/>
+          </a:bodyPr>
+          <a:lstStyle/>
+          <a:p>
+            <a:pPr algn="ctr"/>
+            <a:endParaRPr lang="en-SG" sz="1600">
+              <a:solidFill>
+                <a:srgbClr val="FFFFFF"/>
+              </a:solidFill>
+            </a:endParaRPr>
+          </a:p>
+        </p:txBody>
+      </p:sp>
+      <p:sp>
+        <p:nvSpPr>
+          <p:cNvPr id="14" name="Oval 13"/>
+          <p:cNvSpPr/>
+          <p:nvPr/>
+        </p:nvSpPr>
+        <p:spPr>
+          <a:xfrm>
+            <a:off x="2540000" y="2540000"/>
+            <a:ext cx="317500" cy="317500"/>
+          </a:xfrm>
+          <a:prstGeom prst="ellipse">
+            <a:avLst/>
+          </a:prstGeom>
+          <a:solidFill>
+            <a:srgbClr val="D3D3D3"/>
+          </a:solidFill>
+          <a:ln w="25400" cap="flat" cmpd="sng" algn="ctr">
+            <a:solidFill>
+              <a:schemeClr val="accent1">
+                <a:shade val="50000"/>
+                <a:alpha val="0"/>
+              </a:schemeClr>
+            </a:solidFill>
+            <a:prstDash val="solid"/>
+            <a:round/>
+            <a:headEnd type="none" w="med" len="med"/>
+            <a:tailEnd type="none" w="med" len="med"/>
+          </a:ln>
+        </p:spPr>
+        <p:style>
+          <a:lnRef idx="2">
+            <a:schemeClr val="accent1">
+              <a:shade val="50000"/>
+            </a:schemeClr>
+          </a:lnRef>
+          <a:fillRef idx="1">
+            <a:schemeClr val="accent1"/>
+          </a:fillRef>
+          <a:effectRef idx="0">
+            <a:schemeClr val="accent1"/>
+          </a:effectRef>
+          <a:fontRef idx="minor">
+            <a:schemeClr val="lt1"/>
+          </a:fontRef>
+        </p:style>
+        <p:txBody>
+          <a:bodyPr rtlCol="0" anchor="ctr"/>
+          <a:lstStyle/>
+          <a:p>
+            <a:pPr algn="ctr"/>
+            <a:r>
+              <a:rPr lang="en-SG" sz="1600" smtClean="0">
+                <a:solidFill>
+                  <a:srgbClr val="FFFFFF"/>
+                </a:solidFill>
+              </a:rPr>
+              <a:t>?</a:t>
+            </a:r>
+            <a:endParaRPr lang="en-SG" sz="1600">
+              <a:solidFill>
+                <a:srgbClr val="FFFFFF"/>
+              </a:solidFill>
+            </a:endParaRPr>
+          </a:p>
+        </p:txBody>
+      </p:sp>
+      <p:sp>
+        <p:nvSpPr>
+          <p:cNvPr id="15" name="Rounded Rectangular Callout 14"/>
+          <p:cNvSpPr/>
+          <p:nvPr/>
+        </p:nvSpPr>
+        <p:spPr>
+          <a:xfrm>
+            <a:off x="2143119" y="984250"/>
+            <a:ext cx="1905000" cy="1270000"/>
+          </a:xfrm>
+          <a:prstGeom prst="wedgeRoundRectCallout">
+            <a:avLst/>
+          </a:prstGeom>
+          <a:solidFill>
+            <a:srgbClr val="000000">
+              <a:alpha val="80000"/>
+            </a:srgbClr>
+          </a:solidFill>
+          <a:ln w="635">
+            <a:solidFill>
+              <a:srgbClr val="FFFF00"/>
+            </a:solidFill>
+          </a:ln>
+          <a:effectLst>
+            <a:outerShdw blurRad="63500" sx="102000" sy="102000" algn="ctr">
+              <a:prstClr val="black">
+                <a:alpha val="40000"/>
+              </a:prstClr>
+            </a:outerShdw>
+          </a:effectLst>
+        </p:spPr>
+        <p:style>
+          <a:lnRef idx="2">
+            <a:schemeClr val="accent1">
+              <a:shade val="50000"/>
+            </a:schemeClr>
+          </a:lnRef>
+          <a:fillRef idx="1">
+            <a:schemeClr val="accent1"/>
+          </a:fillRef>
+          <a:effectRef idx="0">
+            <a:schemeClr val="accent1"/>
+          </a:effectRef>
+          <a:fontRef idx="minor">
+            <a:schemeClr val="lt1"/>
+          </a:fontRef>
+        </p:style>
+        <p:txBody>
+          <a:bodyPr rtlCol="0" anchor="ctr">
+            <a:normAutofit/>
+          </a:bodyPr>
+          <a:lstStyle/>
+          <a:p>
+            <a:pPr algn="ctr"/>
+            <a:endParaRPr lang="en-SG" sz="1600">
+              <a:solidFill>
+                <a:srgbClr val="FFFFFF"/>
+              </a:solidFill>
+            </a:endParaRPr>
+          </a:p>
+        </p:txBody>
+      </p:sp>
+      <p:sp>
+        <p:nvSpPr>
+          <p:cNvPr id="16" name="Oval 15"/>
+          <p:cNvSpPr/>
+          <p:nvPr/>
+        </p:nvSpPr>
+        <p:spPr>
+          <a:xfrm>
+            <a:off x="2540000" y="2540000"/>
+            <a:ext cx="317500" cy="317500"/>
+          </a:xfrm>
+          <a:prstGeom prst="ellipse">
+            <a:avLst/>
+          </a:prstGeom>
+          <a:solidFill>
+            <a:srgbClr val="D3D3D3"/>
+          </a:solidFill>
+          <a:ln w="25400" cap="flat" cmpd="sng" algn="ctr">
+            <a:solidFill>
+              <a:schemeClr val="accent1">
+                <a:shade val="50000"/>
+                <a:alpha val="0"/>
+              </a:schemeClr>
+            </a:solidFill>
+            <a:prstDash val="solid"/>
+            <a:round/>
+            <a:headEnd type="none" w="med" len="med"/>
+            <a:tailEnd type="none" w="med" len="med"/>
+          </a:ln>
+        </p:spPr>
+        <p:style>
+          <a:lnRef idx="2">
+            <a:schemeClr val="accent1">
+              <a:shade val="50000"/>
+            </a:schemeClr>
+          </a:lnRef>
+          <a:fillRef idx="1">
+            <a:schemeClr val="accent1"/>
+          </a:fillRef>
+          <a:effectRef idx="0">
+            <a:schemeClr val="accent1"/>
+          </a:effectRef>
+          <a:fontRef idx="minor">
+            <a:schemeClr val="lt1"/>
+          </a:fontRef>
+        </p:style>
+        <p:txBody>
+          <a:bodyPr rtlCol="0" anchor="ctr"/>
+          <a:lstStyle/>
+          <a:p>
+            <a:pPr algn="ctr"/>
+            <a:r>
+              <a:rPr lang="en-SG" sz="1600" smtClean="0">
+                <a:solidFill>
+                  <a:srgbClr val="FFFFFF"/>
+                </a:solidFill>
+              </a:rPr>
+              <a:t>?</a:t>
+            </a:r>
+            <a:endParaRPr lang="en-SG" sz="1600">
+              <a:solidFill>
+                <a:srgbClr val="FFFFFF"/>
+              </a:solidFill>
+            </a:endParaRPr>
+          </a:p>
+        </p:txBody>
+      </p:sp>
+      <p:sp>
+        <p:nvSpPr>
+          <p:cNvPr id="17" name="Rounded Rectangular Callout 16"/>
+          <p:cNvSpPr/>
+          <p:nvPr/>
+        </p:nvSpPr>
+        <p:spPr>
+          <a:xfrm>
+            <a:off x="2143119" y="984250"/>
+            <a:ext cx="1905000" cy="1270000"/>
+          </a:xfrm>
+          <a:prstGeom prst="wedgeRoundRectCallout">
+            <a:avLst/>
+          </a:prstGeom>
+          <a:solidFill>
+            <a:srgbClr val="000000">
+              <a:alpha val="80000"/>
+            </a:srgbClr>
+          </a:solidFill>
+          <a:ln w="635">
+            <a:solidFill>
+              <a:srgbClr val="FFFF00"/>
+            </a:solidFill>
+          </a:ln>
+          <a:effectLst>
+            <a:outerShdw blurRad="63500" sx="102000" sy="102000" algn="ctr">
+              <a:prstClr val="black">
+                <a:alpha val="40000"/>
+              </a:prstClr>
+            </a:outerShdw>
+          </a:effectLst>
+        </p:spPr>
+        <p:style>
+          <a:lnRef idx="2">
+            <a:schemeClr val="accent1">
+              <a:shade val="50000"/>
+            </a:schemeClr>
+          </a:lnRef>
+          <a:fillRef idx="1">
+            <a:schemeClr val="accent1"/>
+          </a:fillRef>
+          <a:effectRef idx="0">
+            <a:schemeClr val="accent1"/>
+          </a:effectRef>
+          <a:fontRef idx="minor">
+            <a:schemeClr val="lt1"/>
+          </a:fontRef>
+        </p:style>
+        <p:txBody>
+          <a:bodyPr rtlCol="0" anchor="ctr">
+            <a:normAutofit/>
+          </a:bodyPr>
+          <a:lstStyle/>
+          <a:p>
+            <a:pPr algn="ctr"/>
+            <a:endParaRPr lang="en-SG" sz="1600">
+              <a:solidFill>
+                <a:srgbClr val="FFFFFF"/>
+              </a:solidFill>
+            </a:endParaRPr>
+          </a:p>
+        </p:txBody>
+      </p:sp>
+    </p:spTree>
+    <p:extLst>
+      <p:ext uri="{BB962C8B-B14F-4D97-AF65-F5344CB8AC3E}">
+        <p14:creationId xmlns:p14="http://schemas.microsoft.com/office/powerpoint/2010/main" val="1714793549"/>
+      </p:ext>
+    </p:extLst>
+  </p:cSld>
+  <p:clrMapOvr>
+    <a:masterClrMapping/>
+  </p:clrMapOvr>
+  <p:timing>
+    <p:tnLst>
+      <p:par>
+        <p:cTn id="1" dur="indefinite" restart="never" nodeType="tmRoot">
+          <p:childTnLst>
+            <p:seq concurrent="1" nextAc="seek">
+              <p:cTn id="2" restart="whenNotActive" fill="hold" evtFilter="cancelBubble" nodeType="interactiveSeq">
+                <p:stCondLst>
+                  <p:cond evt="onClick" delay="0">
+                    <p:tgtEl>
+                      <p:spTgt spid="8"/>
+                    </p:tgtEl>
+                  </p:cond>
+                </p:stCondLst>
+                <p:endSync evt="end" delay="0">
+                  <p:rtn val="all"/>
+                </p:endSync>
+                <p:childTnLst>
+                  <p:par>
+                    <p:cTn id="3" fill="hold">
+                      <p:stCondLst>
+                        <p:cond delay="0"/>
+                      </p:stCondLst>
+                      <p:childTnLst>
+                        <p:par>
+                          <p:cTn id="4" fill="hold">
+                            <p:stCondLst>
+                              <p:cond delay="0"/>
+                            </p:stCondLst>
+                            <p:childTnLst>
+                              <p:par>
+                                <p:cTn id="5" presetID="10" presetClass="entr" presetSubtype="0" fill="hold" grpId="0" nodeType="clickEffect">
+                                  <p:stCondLst>
+                                    <p:cond delay="0"/>
+                                  </p:stCondLst>
+                                  <p:childTnLst>
+                                    <p:set>
+                                      <p:cBhvr>
+                                        <p:cTn id="6" dur="1" fill="hold">
+                                          <p:stCondLst>
+                                            <p:cond delay="0"/>
+                                          </p:stCondLst>
+                                        </p:cTn>
+                                        <p:tgtEl>
+                                          <p:spTgt spid="9"/>
+                                        </p:tgtEl>
+                                        <p:attrNameLst>
+                                          <p:attrName>style.visibility</p:attrName>
+                                        </p:attrNameLst>
+                                      </p:cBhvr>
+                                      <p:to>
+                                        <p:strVal val="visible"/>
+                                      </p:to>
+                                    </p:set>
+                                    <p:animEffect transition="in" filter="fade">
+                                      <p:cBhvr>
+                                        <p:cTn id="7" dur="500"/>
+                                        <p:tgtEl>
+                                          <p:spTgt spid="9"/>
+                                        </p:tgtEl>
+                                      </p:cBhvr>
+                                    </p:animEffect>
+                                  </p:childTnLst>
+                                </p:cTn>
+                              </p:par>
+                            </p:childTnLst>
+                          </p:cTn>
+                        </p:par>
+                      </p:childTnLst>
+                    </p:cTn>
+                  </p:par>
+                  <p:par>
+                    <p:cTn id="8" fill="hold">
+                      <p:stCondLst>
+                        <p:cond delay="indefinite"/>
+                      </p:stCondLst>
+                      <p:childTnLst>
+                        <p:par>
+                          <p:cTn id="9" fill="hold">
+                            <p:stCondLst>
+                              <p:cond delay="0"/>
+                            </p:stCondLst>
+                            <p:childTnLst>
+                              <p:par>
+                                <p:cTn id="10" presetID="10" presetClass="exit" presetSubtype="0" fill="hold" grpId="1" nodeType="clickEffect">
+                                  <p:stCondLst>
+                                    <p:cond delay="0"/>
+                                  </p:stCondLst>
+                                  <p:childTnLst>
+                                    <p:animEffect transition="out" filter="fade">
+                                      <p:cBhvr>
+                                        <p:cTn id="11" dur="500"/>
+                                        <p:tgtEl>
+                                          <p:spTgt spid="9"/>
+                                        </p:tgtEl>
+                                      </p:cBhvr>
+                                    </p:animEffect>
+                                    <p:set>
+                                      <p:cBhvr>
+                                        <p:cTn id="12" dur="1" fill="hold">
+                                          <p:stCondLst>
+                                            <p:cond delay="499"/>
+                                          </p:stCondLst>
+                                        </p:cTn>
+                                        <p:tgtEl>
+                                          <p:spTgt spid="9"/>
+                                        </p:tgtEl>
+                                        <p:attrNameLst>
+                                          <p:attrName>style.visibility</p:attrName>
+                                        </p:attrNameLst>
+                                      </p:cBhvr>
+                                      <p:to>
+                                        <p:strVal val="hidden"/>
+                                      </p:to>
+                                    </p:set>
+                                  </p:childTnLst>
+                                </p:cTn>
+                              </p:par>
+                            </p:childTnLst>
+                          </p:cTn>
+                        </p:par>
+                      </p:childTnLst>
+                    </p:cTn>
+                  </p:par>
+                </p:childTnLst>
+              </p:cTn>
+              <p:nextCondLst>
+                <p:cond evt="onClick" delay="0">
+                  <p:tgtEl>
+                    <p:spTgt spid="8"/>
+                  </p:tgtEl>
+                </p:cond>
+              </p:nextCondLst>
+            </p:seq>
+            <p:seq concurrent="1" nextAc="seek">
+              <p:cTn id="13" restart="whenNotActive" fill="hold" evtFilter="cancelBubble" nodeType="interactiveSeq">
+                <p:stCondLst>
+                  <p:cond evt="onClick" delay="0">
+                    <p:tgtEl>
+                      <p:spTgt spid="10"/>
+                    </p:tgtEl>
+                  </p:cond>
+                </p:stCondLst>
+                <p:endSync evt="end" delay="0">
+                  <p:rtn val="all"/>
+                </p:endSync>
+                <p:childTnLst>
+                  <p:par>
+                    <p:cTn id="14" fill="hold">
+                      <p:stCondLst>
+                        <p:cond delay="0"/>
+                      </p:stCondLst>
+                      <p:childTnLst>
+                        <p:par>
+                          <p:cTn id="15" fill="hold">
+                            <p:stCondLst>
+                              <p:cond delay="0"/>
+                            </p:stCondLst>
+                            <p:childTnLst>
+                              <p:par>
+                                <p:cTn id="16" presetID="10" presetClass="entr" presetSubtype="0" fill="hold" grpId="0" nodeType="clickEffect">
+                                  <p:stCondLst>
+                                    <p:cond delay="0"/>
+                                  </p:stCondLst>
+                                  <p:childTnLst>
+                                    <p:set>
+                                      <p:cBhvr>
+                                        <p:cTn id="17" dur="1" fill="hold">
+                                          <p:stCondLst>
+                                            <p:cond delay="0"/>
+                                          </p:stCondLst>
+                                        </p:cTn>
+                                        <p:tgtEl>
+                                          <p:spTgt spid="11"/>
+                                        </p:tgtEl>
+                                        <p:attrNameLst>
+                                          <p:attrName>style.visibility</p:attrName>
+                                        </p:attrNameLst>
+                                      </p:cBhvr>
+                                      <p:to>
+                                        <p:strVal val="visible"/>
+                                      </p:to>
+                                    </p:set>
+                                    <p:animEffect transition="in" filter="fade">
+                                      <p:cBhvr>
+                                        <p:cTn id="18" dur="500"/>
+                                        <p:tgtEl>
+                                          <p:spTgt spid="11"/>
+                                        </p:tgtEl>
+                                      </p:cBhvr>
+                                    </p:animEffect>
+                                  </p:childTnLst>
+                                </p:cTn>
+                              </p:par>
+                            </p:childTnLst>
+                          </p:cTn>
+                        </p:par>
+                      </p:childTnLst>
+                    </p:cTn>
+                  </p:par>
+                  <p:par>
+                    <p:cTn id="19" fill="hold">
+                      <p:stCondLst>
+                        <p:cond delay="indefinite"/>
+                      </p:stCondLst>
+                      <p:childTnLst>
+                        <p:par>
+                          <p:cTn id="20" fill="hold">
+                            <p:stCondLst>
+                              <p:cond delay="0"/>
+                            </p:stCondLst>
+                            <p:childTnLst>
+                              <p:par>
+                                <p:cTn id="21" presetID="10" presetClass="exit" presetSubtype="0" fill="hold" grpId="1" nodeType="clickEffect">
+                                  <p:stCondLst>
+                                    <p:cond delay="0"/>
+                                  </p:stCondLst>
+                                  <p:childTnLst>
+                                    <p:animEffect transition="out" filter="fade">
+                                      <p:cBhvr>
+                                        <p:cTn id="22" dur="500"/>
+                                        <p:tgtEl>
+                                          <p:spTgt spid="11"/>
+                                        </p:tgtEl>
+                                      </p:cBhvr>
+                                    </p:animEffect>
+                                    <p:set>
+                                      <p:cBhvr>
+                                        <p:cTn id="23" dur="1" fill="hold">
+                                          <p:stCondLst>
+                                            <p:cond delay="499"/>
+                                          </p:stCondLst>
+                                        </p:cTn>
+                                        <p:tgtEl>
+                                          <p:spTgt spid="11"/>
+                                        </p:tgtEl>
+                                        <p:attrNameLst>
+                                          <p:attrName>style.visibility</p:attrName>
+                                        </p:attrNameLst>
+                                      </p:cBhvr>
+                                      <p:to>
+                                        <p:strVal val="hidden"/>
+                                      </p:to>
+                                    </p:set>
+                                  </p:childTnLst>
+                                </p:cTn>
+                              </p:par>
+                            </p:childTnLst>
+                          </p:cTn>
+                        </p:par>
+                      </p:childTnLst>
+                    </p:cTn>
+                  </p:par>
+                </p:childTnLst>
+              </p:cTn>
+              <p:nextCondLst>
+                <p:cond evt="onClick" delay="0">
+                  <p:tgtEl>
+                    <p:spTgt spid="10"/>
+                  </p:tgtEl>
+                </p:cond>
+              </p:nextCondLst>
+            </p:seq>
+            <p:seq concurrent="1" nextAc="seek">
+              <p:cTn id="24" restart="whenNotActive" fill="hold" evtFilter="cancelBubble" nodeType="interactiveSeq">
+                <p:stCondLst>
+                  <p:cond evt="onClick" delay="0">
+                    <p:tgtEl>
+                      <p:spTgt spid="12"/>
+                    </p:tgtEl>
+                  </p:cond>
+                </p:stCondLst>
+                <p:endSync evt="end" delay="0">
+                  <p:rtn val="all"/>
+                </p:endSync>
+                <p:childTnLst>
+                  <p:par>
+                    <p:cTn id="25" fill="hold">
+                      <p:stCondLst>
+                        <p:cond delay="0"/>
+                      </p:stCondLst>
+                      <p:childTnLst>
+                        <p:par>
+                          <p:cTn id="26" fill="hold">
+                            <p:stCondLst>
+                              <p:cond delay="0"/>
+                            </p:stCondLst>
+                            <p:childTnLst>
+                              <p:par>
+                                <p:cTn id="27" presetID="10" presetClass="entr" presetSubtype="0" fill="hold" grpId="0" nodeType="clickEffect">
+                                  <p:stCondLst>
+                                    <p:cond delay="0"/>
+                                  </p:stCondLst>
+                                  <p:childTnLst>
+                                    <p:set>
+                                      <p:cBhvr>
+                                        <p:cTn id="28" dur="1" fill="hold">
+                                          <p:stCondLst>
+                                            <p:cond delay="0"/>
+                                          </p:stCondLst>
+                                        </p:cTn>
+                                        <p:tgtEl>
+                                          <p:spTgt spid="13"/>
+                                        </p:tgtEl>
+                                        <p:attrNameLst>
+                                          <p:attrName>style.visibility</p:attrName>
+                                        </p:attrNameLst>
+                                      </p:cBhvr>
+                                      <p:to>
+                                        <p:strVal val="visible"/>
+                                      </p:to>
+                                    </p:set>
+                                    <p:animEffect transition="in" filter="fade">
+                                      <p:cBhvr>
+                                        <p:cTn id="29" dur="500"/>
+                                        <p:tgtEl>
+                                          <p:spTgt spid="13"/>
+                                        </p:tgtEl>
+                                      </p:cBhvr>
+                                    </p:animEffect>
+                                  </p:childTnLst>
+                                </p:cTn>
+                              </p:par>
+                            </p:childTnLst>
+                          </p:cTn>
+                        </p:par>
+                      </p:childTnLst>
+                    </p:cTn>
+                  </p:par>
+                  <p:par>
+                    <p:cTn id="30" fill="hold">
+                      <p:stCondLst>
+                        <p:cond delay="indefinite"/>
+                      </p:stCondLst>
+                      <p:childTnLst>
+                        <p:par>
+                          <p:cTn id="31" fill="hold">
+                            <p:stCondLst>
+                              <p:cond delay="0"/>
+                            </p:stCondLst>
+                            <p:childTnLst>
+                              <p:par>
+                                <p:cTn id="32" presetID="10" presetClass="exit" presetSubtype="0" fill="hold" grpId="1" nodeType="clickEffect">
+                                  <p:stCondLst>
+                                    <p:cond delay="0"/>
+                                  </p:stCondLst>
+                                  <p:childTnLst>
+                                    <p:animEffect transition="out" filter="fade">
+                                      <p:cBhvr>
+                                        <p:cTn id="33" dur="500"/>
+                                        <p:tgtEl>
+                                          <p:spTgt spid="13"/>
+                                        </p:tgtEl>
+                                      </p:cBhvr>
+                                    </p:animEffect>
+                                    <p:set>
+                                      <p:cBhvr>
+                                        <p:cTn id="34" dur="1" fill="hold">
+                                          <p:stCondLst>
+                                            <p:cond delay="499"/>
+                                          </p:stCondLst>
+                                        </p:cTn>
+                                        <p:tgtEl>
+                                          <p:spTgt spid="13"/>
+                                        </p:tgtEl>
+                                        <p:attrNameLst>
+                                          <p:attrName>style.visibility</p:attrName>
+                                        </p:attrNameLst>
+                                      </p:cBhvr>
+                                      <p:to>
+                                        <p:strVal val="hidden"/>
+                                      </p:to>
+                                    </p:set>
+                                  </p:childTnLst>
+                                </p:cTn>
+                              </p:par>
+                            </p:childTnLst>
+                          </p:cTn>
+                        </p:par>
+                      </p:childTnLst>
+                    </p:cTn>
+                  </p:par>
+                </p:childTnLst>
+              </p:cTn>
+              <p:nextCondLst>
+                <p:cond evt="onClick" delay="0">
+                  <p:tgtEl>
+                    <p:spTgt spid="12"/>
+                  </p:tgtEl>
+                </p:cond>
+              </p:nextCondLst>
+            </p:seq>
+            <p:seq concurrent="1" nextAc="seek">
+              <p:cTn id="35" restart="whenNotActive" fill="hold" evtFilter="cancelBubble" nodeType="interactiveSeq">
+                <p:stCondLst>
+                  <p:cond evt="onClick" delay="0">
+                    <p:tgtEl>
+                      <p:spTgt spid="14"/>
+                    </p:tgtEl>
+                  </p:cond>
+                </p:stCondLst>
+                <p:endSync evt="end" delay="0">
+                  <p:rtn val="all"/>
+                </p:endSync>
+                <p:childTnLst>
+                  <p:par>
+                    <p:cTn id="36" fill="hold">
+                      <p:stCondLst>
+                        <p:cond delay="0"/>
+                      </p:stCondLst>
+                      <p:childTnLst>
+                        <p:par>
+                          <p:cTn id="37" fill="hold">
+                            <p:stCondLst>
+                              <p:cond delay="0"/>
+                            </p:stCondLst>
+                            <p:childTnLst>
+                              <p:par>
+                                <p:cTn id="38" presetID="10" presetClass="entr" presetSubtype="0" fill="hold" grpId="0" nodeType="clickEffect">
+                                  <p:stCondLst>
+                                    <p:cond delay="0"/>
+                                  </p:stCondLst>
+                                  <p:childTnLst>
+                                    <p:set>
+                                      <p:cBhvr>
+                                        <p:cTn id="39" dur="1" fill="hold">
+                                          <p:stCondLst>
+                                            <p:cond delay="0"/>
+                                          </p:stCondLst>
+                                        </p:cTn>
+                                        <p:tgtEl>
+                                          <p:spTgt spid="15"/>
+                                        </p:tgtEl>
+                                        <p:attrNameLst>
+                                          <p:attrName>style.visibility</p:attrName>
+                                        </p:attrNameLst>
+                                      </p:cBhvr>
+                                      <p:to>
+                                        <p:strVal val="visible"/>
+                                      </p:to>
+                                    </p:set>
+                                    <p:animEffect transition="in" filter="fade">
+                                      <p:cBhvr>
+                                        <p:cTn id="40" dur="500"/>
+                                        <p:tgtEl>
+                                          <p:spTgt spid="15"/>
+                                        </p:tgtEl>
+                                      </p:cBhvr>
+                                    </p:animEffect>
+                                  </p:childTnLst>
+                                </p:cTn>
+                              </p:par>
+                            </p:childTnLst>
+                          </p:cTn>
+                        </p:par>
+                      </p:childTnLst>
+                    </p:cTn>
+                  </p:par>
+                  <p:par>
+                    <p:cTn id="41" fill="hold">
+                      <p:stCondLst>
+                        <p:cond delay="indefinite"/>
+                      </p:stCondLst>
+                      <p:childTnLst>
+                        <p:par>
+                          <p:cTn id="42" fill="hold">
+                            <p:stCondLst>
+                              <p:cond delay="0"/>
+                            </p:stCondLst>
+                            <p:childTnLst>
+                              <p:par>
+                                <p:cTn id="43" presetID="10" presetClass="exit" presetSubtype="0" fill="hold" grpId="1" nodeType="clickEffect">
+                                  <p:stCondLst>
+                                    <p:cond delay="0"/>
+                                  </p:stCondLst>
+                                  <p:childTnLst>
+                                    <p:animEffect transition="out" filter="fade">
+                                      <p:cBhvr>
+                                        <p:cTn id="44" dur="500"/>
+                                        <p:tgtEl>
+                                          <p:spTgt spid="15"/>
+                                        </p:tgtEl>
+                                      </p:cBhvr>
+                                    </p:animEffect>
+                                    <p:set>
+                                      <p:cBhvr>
+                                        <p:cTn id="45" dur="1" fill="hold">
+                                          <p:stCondLst>
+                                            <p:cond delay="499"/>
+                                          </p:stCondLst>
+                                        </p:cTn>
+                                        <p:tgtEl>
+                                          <p:spTgt spid="15"/>
+                                        </p:tgtEl>
+                                        <p:attrNameLst>
+                                          <p:attrName>style.visibility</p:attrName>
+                                        </p:attrNameLst>
+                                      </p:cBhvr>
+                                      <p:to>
+                                        <p:strVal val="hidden"/>
+                                      </p:to>
+                                    </p:set>
+                                  </p:childTnLst>
+                                </p:cTn>
+                              </p:par>
+                            </p:childTnLst>
+                          </p:cTn>
+                        </p:par>
+                      </p:childTnLst>
+                    </p:cTn>
+                  </p:par>
+                </p:childTnLst>
+              </p:cTn>
+              <p:nextCondLst>
+                <p:cond evt="onClick" delay="0">
+                  <p:tgtEl>
+                    <p:spTgt spid="14"/>
+                  </p:tgtEl>
+                </p:cond>
+              </p:nextCondLst>
+            </p:seq>
+            <p:seq concurrent="1" nextAc="seek">
+              <p:cTn id="46" restart="whenNotActive" fill="hold" evtFilter="cancelBubble" nodeType="interactiveSeq">
+                <p:stCondLst>
+                  <p:cond evt="onClick" delay="0">
+                    <p:tgtEl>
+                      <p:spTgt spid="16"/>
+                    </p:tgtEl>
+                  </p:cond>
+                </p:stCondLst>
+                <p:endSync evt="end" delay="0">
+                  <p:rtn val="all"/>
+                </p:endSync>
+                <p:childTnLst>
+                  <p:par>
+                    <p:cTn id="47" fill="hold">
+                      <p:stCondLst>
+                        <p:cond delay="0"/>
+                      </p:stCondLst>
+                      <p:childTnLst>
+                        <p:par>
+                          <p:cTn id="48" fill="hold">
+                            <p:stCondLst>
+                              <p:cond delay="0"/>
+                            </p:stCondLst>
+                            <p:childTnLst>
+                              <p:par>
+                                <p:cTn id="49" presetID="10" presetClass="entr" presetSubtype="0" fill="hold" grpId="0" nodeType="clickEffect">
+                                  <p:stCondLst>
+                                    <p:cond delay="0"/>
+                                  </p:stCondLst>
+                                  <p:childTnLst>
+                                    <p:set>
+                                      <p:cBhvr>
+                                        <p:cTn id="50" dur="1" fill="hold">
+                                          <p:stCondLst>
+                                            <p:cond delay="0"/>
+                                          </p:stCondLst>
+                                        </p:cTn>
+                                        <p:tgtEl>
+                                          <p:spTgt spid="17"/>
+                                        </p:tgtEl>
+                                        <p:attrNameLst>
+                                          <p:attrName>style.visibility</p:attrName>
+                                        </p:attrNameLst>
+                                      </p:cBhvr>
+                                      <p:to>
+                                        <p:strVal val="visible"/>
+                                      </p:to>
+                                    </p:set>
+                                    <p:animEffect transition="in" filter="fade">
+                                      <p:cBhvr>
+                                        <p:cTn id="51" dur="500"/>
+                                        <p:tgtEl>
+                                          <p:spTgt spid="17"/>
+                                        </p:tgtEl>
+                                      </p:cBhvr>
+                                    </p:animEffect>
+                                  </p:childTnLst>
+                                </p:cTn>
+                              </p:par>
+                            </p:childTnLst>
+                          </p:cTn>
+                        </p:par>
+                      </p:childTnLst>
+                    </p:cTn>
+                  </p:par>
+                  <p:par>
+                    <p:cTn id="52" fill="hold">
+                      <p:stCondLst>
+                        <p:cond delay="indefinite"/>
+                      </p:stCondLst>
+                      <p:childTnLst>
+                        <p:par>
+                          <p:cTn id="53" fill="hold">
+                            <p:stCondLst>
+                              <p:cond delay="0"/>
+                            </p:stCondLst>
+                            <p:childTnLst>
+                              <p:par>
+                                <p:cTn id="54" presetID="10" presetClass="exit" presetSubtype="0" fill="hold" grpId="1" nodeType="clickEffect">
+                                  <p:stCondLst>
+                                    <p:cond delay="0"/>
+                                  </p:stCondLst>
+                                  <p:childTnLst>
+                                    <p:animEffect transition="out" filter="fade">
+                                      <p:cBhvr>
+                                        <p:cTn id="55" dur="500"/>
+                                        <p:tgtEl>
+                                          <p:spTgt spid="17"/>
+                                        </p:tgtEl>
+                                      </p:cBhvr>
+                                    </p:animEffect>
+                                    <p:set>
+                                      <p:cBhvr>
+                                        <p:cTn id="56" dur="1" fill="hold">
+                                          <p:stCondLst>
+                                            <p:cond delay="499"/>
+                                          </p:stCondLst>
+                                        </p:cTn>
+                                        <p:tgtEl>
+                                          <p:spTgt spid="17"/>
+                                        </p:tgtEl>
+                                        <p:attrNameLst>
+                                          <p:attrName>style.visibility</p:attrName>
+                                        </p:attrNameLst>
+                                      </p:cBhvr>
+                                      <p:to>
+                                        <p:strVal val="hidden"/>
+                                      </p:to>
+                                    </p:set>
+                                  </p:childTnLst>
+                                </p:cTn>
+                              </p:par>
+                            </p:childTnLst>
+                          </p:cTn>
+                        </p:par>
+                      </p:childTnLst>
+                    </p:cTn>
+                  </p:par>
+                </p:childTnLst>
+              </p:cTn>
+              <p:nextCondLst>
+                <p:cond evt="onClick" delay="0">
+                  <p:tgtEl>
+                    <p:spTgt spid="16"/>
+                  </p:tgtEl>
+                </p:cond>
+              </p:nextCondLst>
+            </p:seq>
+          </p:childTnLst>
+        </p:cTn>
+      </p:par>
+    </p:tnLst>
+    <p:bldLst>
+      <p:bldP spid="9" grpId="0" animBg="1"/>
+      <p:bldP spid="9" grpId="1" animBg="1"/>
+      <p:bldP spid="11" grpId="0" animBg="1"/>
+      <p:bldP spid="11" grpId="1" animBg="1"/>
+      <p:bldP spid="13" grpId="0" animBg="1"/>
+      <p:bldP spid="13" grpId="1" animBg="1"/>
+      <p:bldP spid="15" grpId="0" animBg="1"/>
+      <p:bldP spid="15" grpId="1" animBg="1"/>
+      <p:bldP spid="17" grpId="0" animBg="1"/>
+      <p:bldP spid="17" grpId="1" animBg="1"/>
+    </p:bldLst>
+  </p:timing>
+</p:sld>
+</file>
+
+<file path=ppt/slides/slide15.xml><?xml version="1.0" encoding="utf-8"?>
 <p:sld xmlns:a="http://schemas.openxmlformats.org/drawingml/2006/main" xmlns:r="http://schemas.openxmlformats.org/officeDocument/2006/relationships" xmlns:p="http://schemas.openxmlformats.org/presentationml/2006/main" show="0">
   <p:cSld name="PPTLabsAcknowledgementSlide">
     <p:spTree>
@@ -12328,11 +13826,7 @@
           <a:p>
             <a:r>
               <a:rPr lang="en-US" dirty="0" smtClean="0"/>
-              <a:t>Create Tooltip: </a:t>
-            </a:r>
-            <a:r>
-              <a:rPr lang="en-US" dirty="0" smtClean="0"/>
-              <a:t>Existing tooltip present</a:t>
+              <a:t>Create Tooltip: Existing tooltip present</a:t>
             </a:r>
             <a:endParaRPr lang="en-SG" dirty="0"/>
           </a:p>
@@ -12360,15 +13854,7 @@
           <a:p>
             <a:r>
               <a:rPr lang="en-US" dirty="0" smtClean="0"/>
-              <a:t>Click </a:t>
-            </a:r>
-            <a:r>
-              <a:rPr lang="en-US" dirty="0" smtClean="0"/>
-              <a:t>‘Create Tooltip</a:t>
-            </a:r>
-            <a:r>
-              <a:rPr lang="en-US" dirty="0" smtClean="0"/>
-              <a:t>’ (existing tooltips should not affect creation of new tooltips)</a:t>
+              <a:t>Click ‘Create Tooltip’ (existing tooltips should not affect creation of new tooltips)</a:t>
             </a:r>
             <a:endParaRPr lang="en-SG" dirty="0"/>
           </a:p>

</xml_diff>

<commit_message>
Edited CreateTooltip unit test to account for displacement
</commit_message>
<xml_diff>
--- a/doc/test/TooltipsLab/CreateTooltip.pptx
+++ b/doc/test/TooltipsLab/CreateTooltip.pptx
@@ -23,7 +23,7 @@
     <p:sldId id="322" r:id="rId14"/>
     <p:sldId id="323" r:id="rId15"/>
     <p:sldId id="324" r:id="rId16"/>
-    <p:sldId id="325" r:id="rId17"/>
+    <p:sldId id="326" r:id="rId17"/>
     <p:sldId id="305" r:id="rId18"/>
   </p:sldIdLst>
   <p:sldSz cx="9144000" cy="6858000" type="screen4x3"/>
@@ -145,7 +145,7 @@
             <p14:sldId id="322"/>
             <p14:sldId id="323"/>
             <p14:sldId id="324"/>
-            <p14:sldId id="325"/>
+            <p14:sldId id="326"/>
             <p14:sldId id="305"/>
           </p14:sldIdLst>
         </p14:section>
@@ -251,7 +251,7 @@
           <a:p>
             <a:fld id="{7B6B14F6-3F9A-43ED-BCC2-4547CC5017BD}" type="datetimeFigureOut">
               <a:rPr lang="en-SG" smtClean="0"/>
-              <a:t>7/4/2019</a:t>
+              <a:t>27/6/2019</a:t>
             </a:fld>
             <a:endParaRPr lang="en-SG"/>
           </a:p>
@@ -315,35 +315,35 @@
           <a:p>
             <a:pPr lvl="0"/>
             <a:r>
-              <a:rPr lang="zh-CN" altLang="en-US" smtClean="0"/>
+              <a:rPr lang="zh-CN" altLang="en-US"/>
               <a:t>单击此处编辑母版文本样式</a:t>
             </a:r>
           </a:p>
           <a:p>
             <a:pPr lvl="1"/>
             <a:r>
-              <a:rPr lang="zh-CN" altLang="en-US" smtClean="0"/>
+              <a:rPr lang="zh-CN" altLang="en-US"/>
               <a:t>第二级</a:t>
             </a:r>
           </a:p>
           <a:p>
             <a:pPr lvl="2"/>
             <a:r>
-              <a:rPr lang="zh-CN" altLang="en-US" smtClean="0"/>
+              <a:rPr lang="zh-CN" altLang="en-US"/>
               <a:t>第三级</a:t>
             </a:r>
           </a:p>
           <a:p>
             <a:pPr lvl="3"/>
             <a:r>
-              <a:rPr lang="zh-CN" altLang="en-US" smtClean="0"/>
+              <a:rPr lang="zh-CN" altLang="en-US"/>
               <a:t>第四级</a:t>
             </a:r>
           </a:p>
           <a:p>
             <a:pPr lvl="4"/>
             <a:r>
-              <a:rPr lang="zh-CN" altLang="en-US" smtClean="0"/>
+              <a:rPr lang="zh-CN" altLang="en-US"/>
               <a:t>第五级</a:t>
             </a:r>
             <a:endParaRPr lang="en-SG"/>
@@ -557,10 +557,9 @@
           <a:lstStyle/>
           <a:p>
             <a:r>
-              <a:rPr lang="en-US" smtClean="0"/>
+              <a:rPr lang="en-US"/>
               <a:t>Click to edit Master title style</a:t>
             </a:r>
-            <a:endParaRPr lang="en-US"/>
           </a:p>
         </p:txBody>
       </p:sp>
@@ -676,10 +675,9 @@
           </a:lstStyle>
           <a:p>
             <a:r>
-              <a:rPr lang="en-US" smtClean="0"/>
+              <a:rPr lang="en-US"/>
               <a:t>Click to edit Master subtitle style</a:t>
             </a:r>
-            <a:endParaRPr lang="en-US"/>
           </a:p>
         </p:txBody>
       </p:sp>
@@ -700,7 +698,7 @@
           <a:p>
             <a:fld id="{699DC775-C286-4358-8C92-D7E584E969B3}" type="datetimeFigureOut">
               <a:rPr lang="en-US" smtClean="0"/>
-              <a:t>4/7/2019</a:t>
+              <a:t>6/27/2019</a:t>
             </a:fld>
             <a:endParaRPr lang="en-US"/>
           </a:p>
@@ -794,10 +792,9 @@
           <a:lstStyle/>
           <a:p>
             <a:r>
-              <a:rPr lang="en-US" smtClean="0"/>
+              <a:rPr lang="en-US"/>
               <a:t>Click to edit Master title style</a:t>
             </a:r>
-            <a:endParaRPr lang="en-US"/>
           </a:p>
         </p:txBody>
       </p:sp>
@@ -818,38 +815,37 @@
           <a:p>
             <a:pPr lvl="0"/>
             <a:r>
-              <a:rPr lang="en-US" smtClean="0"/>
+              <a:rPr lang="en-US"/>
               <a:t>Click to edit Master text styles</a:t>
             </a:r>
           </a:p>
           <a:p>
             <a:pPr lvl="1"/>
             <a:r>
-              <a:rPr lang="en-US" smtClean="0"/>
+              <a:rPr lang="en-US"/>
               <a:t>Second level</a:t>
             </a:r>
           </a:p>
           <a:p>
             <a:pPr lvl="2"/>
             <a:r>
-              <a:rPr lang="en-US" smtClean="0"/>
+              <a:rPr lang="en-US"/>
               <a:t>Third level</a:t>
             </a:r>
           </a:p>
           <a:p>
             <a:pPr lvl="3"/>
             <a:r>
-              <a:rPr lang="en-US" smtClean="0"/>
+              <a:rPr lang="en-US"/>
               <a:t>Fourth level</a:t>
             </a:r>
           </a:p>
           <a:p>
             <a:pPr lvl="4"/>
             <a:r>
-              <a:rPr lang="en-US" smtClean="0"/>
+              <a:rPr lang="en-US"/>
               <a:t>Fifth level</a:t>
             </a:r>
-            <a:endParaRPr lang="en-US"/>
           </a:p>
         </p:txBody>
       </p:sp>
@@ -870,7 +866,7 @@
           <a:p>
             <a:fld id="{699DC775-C286-4358-8C92-D7E584E969B3}" type="datetimeFigureOut">
               <a:rPr lang="en-US" smtClean="0"/>
-              <a:t>4/7/2019</a:t>
+              <a:t>6/27/2019</a:t>
             </a:fld>
             <a:endParaRPr lang="en-US"/>
           </a:p>
@@ -969,10 +965,9 @@
           <a:lstStyle/>
           <a:p>
             <a:r>
-              <a:rPr lang="en-US" smtClean="0"/>
+              <a:rPr lang="en-US"/>
               <a:t>Click to edit Master title style</a:t>
             </a:r>
-            <a:endParaRPr lang="en-US"/>
           </a:p>
         </p:txBody>
       </p:sp>
@@ -998,38 +993,37 @@
           <a:p>
             <a:pPr lvl="0"/>
             <a:r>
-              <a:rPr lang="en-US" smtClean="0"/>
+              <a:rPr lang="en-US"/>
               <a:t>Click to edit Master text styles</a:t>
             </a:r>
           </a:p>
           <a:p>
             <a:pPr lvl="1"/>
             <a:r>
-              <a:rPr lang="en-US" smtClean="0"/>
+              <a:rPr lang="en-US"/>
               <a:t>Second level</a:t>
             </a:r>
           </a:p>
           <a:p>
             <a:pPr lvl="2"/>
             <a:r>
-              <a:rPr lang="en-US" smtClean="0"/>
+              <a:rPr lang="en-US"/>
               <a:t>Third level</a:t>
             </a:r>
           </a:p>
           <a:p>
             <a:pPr lvl="3"/>
             <a:r>
-              <a:rPr lang="en-US" smtClean="0"/>
+              <a:rPr lang="en-US"/>
               <a:t>Fourth level</a:t>
             </a:r>
           </a:p>
           <a:p>
             <a:pPr lvl="4"/>
             <a:r>
-              <a:rPr lang="en-US" smtClean="0"/>
+              <a:rPr lang="en-US"/>
               <a:t>Fifth level</a:t>
             </a:r>
-            <a:endParaRPr lang="en-US"/>
           </a:p>
         </p:txBody>
       </p:sp>
@@ -1050,7 +1044,7 @@
           <a:p>
             <a:fld id="{699DC775-C286-4358-8C92-D7E584E969B3}" type="datetimeFigureOut">
               <a:rPr lang="en-US" smtClean="0"/>
-              <a:t>4/7/2019</a:t>
+              <a:t>6/27/2019</a:t>
             </a:fld>
             <a:endParaRPr lang="en-US"/>
           </a:p>
@@ -1149,10 +1143,9 @@
           <a:lstStyle/>
           <a:p>
             <a:r>
-              <a:rPr lang="en-US" smtClean="0"/>
+              <a:rPr lang="en-US"/>
               <a:t>Click to edit Master title style</a:t>
             </a:r>
-            <a:endParaRPr lang="en-US"/>
           </a:p>
         </p:txBody>
       </p:sp>
@@ -1268,10 +1261,9 @@
           </a:lstStyle>
           <a:p>
             <a:r>
-              <a:rPr lang="en-US" smtClean="0"/>
+              <a:rPr lang="en-US"/>
               <a:t>Click to edit Master subtitle style</a:t>
             </a:r>
-            <a:endParaRPr lang="en-US"/>
           </a:p>
         </p:txBody>
       </p:sp>
@@ -1292,7 +1284,7 @@
           <a:p>
             <a:fld id="{699DC775-C286-4358-8C92-D7E584E969B3}" type="datetimeFigureOut">
               <a:rPr lang="en-US" smtClean="0"/>
-              <a:t>4/7/2019</a:t>
+              <a:t>6/27/2019</a:t>
             </a:fld>
             <a:endParaRPr lang="en-US"/>
           </a:p>
@@ -1386,10 +1378,9 @@
           <a:lstStyle/>
           <a:p>
             <a:r>
-              <a:rPr lang="en-US" smtClean="0"/>
+              <a:rPr lang="en-US"/>
               <a:t>Click to edit Master title style</a:t>
             </a:r>
-            <a:endParaRPr lang="en-US"/>
           </a:p>
         </p:txBody>
       </p:sp>
@@ -1410,38 +1401,37 @@
           <a:p>
             <a:pPr lvl="0"/>
             <a:r>
-              <a:rPr lang="en-US" smtClean="0"/>
+              <a:rPr lang="en-US"/>
               <a:t>Click to edit Master text styles</a:t>
             </a:r>
           </a:p>
           <a:p>
             <a:pPr lvl="1"/>
             <a:r>
-              <a:rPr lang="en-US" smtClean="0"/>
+              <a:rPr lang="en-US"/>
               <a:t>Second level</a:t>
             </a:r>
           </a:p>
           <a:p>
             <a:pPr lvl="2"/>
             <a:r>
-              <a:rPr lang="en-US" smtClean="0"/>
+              <a:rPr lang="en-US"/>
               <a:t>Third level</a:t>
             </a:r>
           </a:p>
           <a:p>
             <a:pPr lvl="3"/>
             <a:r>
-              <a:rPr lang="en-US" smtClean="0"/>
+              <a:rPr lang="en-US"/>
               <a:t>Fourth level</a:t>
             </a:r>
           </a:p>
           <a:p>
             <a:pPr lvl="4"/>
             <a:r>
-              <a:rPr lang="en-US" smtClean="0"/>
+              <a:rPr lang="en-US"/>
               <a:t>Fifth level</a:t>
             </a:r>
-            <a:endParaRPr lang="en-US"/>
           </a:p>
         </p:txBody>
       </p:sp>
@@ -1462,7 +1452,7 @@
           <a:p>
             <a:fld id="{699DC775-C286-4358-8C92-D7E584E969B3}" type="datetimeFigureOut">
               <a:rPr lang="en-US" smtClean="0"/>
-              <a:t>4/7/2019</a:t>
+              <a:t>6/27/2019</a:t>
             </a:fld>
             <a:endParaRPr lang="en-US"/>
           </a:p>
@@ -1565,10 +1555,9 @@
           </a:lstStyle>
           <a:p>
             <a:r>
-              <a:rPr lang="en-US" smtClean="0"/>
+              <a:rPr lang="en-US"/>
               <a:t>Click to edit Master title style</a:t>
             </a:r>
-            <a:endParaRPr lang="en-US"/>
           </a:p>
         </p:txBody>
       </p:sp>
@@ -1685,7 +1674,7 @@
           <a:p>
             <a:pPr lvl="0"/>
             <a:r>
-              <a:rPr lang="en-US" smtClean="0"/>
+              <a:rPr lang="en-US"/>
               <a:t>Click to edit Master text styles</a:t>
             </a:r>
           </a:p>
@@ -1708,7 +1697,7 @@
           <a:p>
             <a:fld id="{699DC775-C286-4358-8C92-D7E584E969B3}" type="datetimeFigureOut">
               <a:rPr lang="en-US" smtClean="0"/>
-              <a:t>4/7/2019</a:t>
+              <a:t>6/27/2019</a:t>
             </a:fld>
             <a:endParaRPr lang="en-US"/>
           </a:p>
@@ -1802,10 +1791,9 @@
           <a:lstStyle/>
           <a:p>
             <a:r>
-              <a:rPr lang="en-US" smtClean="0"/>
+              <a:rPr lang="en-US"/>
               <a:t>Click to edit Master title style</a:t>
             </a:r>
-            <a:endParaRPr lang="en-US"/>
           </a:p>
         </p:txBody>
       </p:sp>
@@ -1859,38 +1847,37 @@
           <a:p>
             <a:pPr lvl="0"/>
             <a:r>
-              <a:rPr lang="en-US" smtClean="0"/>
+              <a:rPr lang="en-US"/>
               <a:t>Click to edit Master text styles</a:t>
             </a:r>
           </a:p>
           <a:p>
             <a:pPr lvl="1"/>
             <a:r>
-              <a:rPr lang="en-US" smtClean="0"/>
+              <a:rPr lang="en-US"/>
               <a:t>Second level</a:t>
             </a:r>
           </a:p>
           <a:p>
             <a:pPr lvl="2"/>
             <a:r>
-              <a:rPr lang="en-US" smtClean="0"/>
+              <a:rPr lang="en-US"/>
               <a:t>Third level</a:t>
             </a:r>
           </a:p>
           <a:p>
             <a:pPr lvl="3"/>
             <a:r>
-              <a:rPr lang="en-US" smtClean="0"/>
+              <a:rPr lang="en-US"/>
               <a:t>Fourth level</a:t>
             </a:r>
           </a:p>
           <a:p>
             <a:pPr lvl="4"/>
             <a:r>
-              <a:rPr lang="en-US" smtClean="0"/>
+              <a:rPr lang="en-US"/>
               <a:t>Fifth level</a:t>
             </a:r>
-            <a:endParaRPr lang="en-US"/>
           </a:p>
         </p:txBody>
       </p:sp>
@@ -1944,38 +1931,37 @@
           <a:p>
             <a:pPr lvl="0"/>
             <a:r>
-              <a:rPr lang="en-US" smtClean="0"/>
+              <a:rPr lang="en-US"/>
               <a:t>Click to edit Master text styles</a:t>
             </a:r>
           </a:p>
           <a:p>
             <a:pPr lvl="1"/>
             <a:r>
-              <a:rPr lang="en-US" smtClean="0"/>
+              <a:rPr lang="en-US"/>
               <a:t>Second level</a:t>
             </a:r>
           </a:p>
           <a:p>
             <a:pPr lvl="2"/>
             <a:r>
-              <a:rPr lang="en-US" smtClean="0"/>
+              <a:rPr lang="en-US"/>
               <a:t>Third level</a:t>
             </a:r>
           </a:p>
           <a:p>
             <a:pPr lvl="3"/>
             <a:r>
-              <a:rPr lang="en-US" smtClean="0"/>
+              <a:rPr lang="en-US"/>
               <a:t>Fourth level</a:t>
             </a:r>
           </a:p>
           <a:p>
             <a:pPr lvl="4"/>
             <a:r>
-              <a:rPr lang="en-US" smtClean="0"/>
+              <a:rPr lang="en-US"/>
               <a:t>Fifth level</a:t>
             </a:r>
-            <a:endParaRPr lang="en-US"/>
           </a:p>
         </p:txBody>
       </p:sp>
@@ -1996,7 +1982,7 @@
           <a:p>
             <a:fld id="{699DC775-C286-4358-8C92-D7E584E969B3}" type="datetimeFigureOut">
               <a:rPr lang="en-US" smtClean="0"/>
-              <a:t>4/7/2019</a:t>
+              <a:t>6/27/2019</a:t>
             </a:fld>
             <a:endParaRPr lang="en-US"/>
           </a:p>
@@ -2094,10 +2080,9 @@
           </a:lstStyle>
           <a:p>
             <a:r>
-              <a:rPr lang="en-US" smtClean="0"/>
+              <a:rPr lang="en-US"/>
               <a:t>Click to edit Master title style</a:t>
             </a:r>
-            <a:endParaRPr lang="en-US"/>
           </a:p>
         </p:txBody>
       </p:sp>
@@ -2160,7 +2145,7 @@
           <a:p>
             <a:pPr lvl="0"/>
             <a:r>
-              <a:rPr lang="en-US" smtClean="0"/>
+              <a:rPr lang="en-US"/>
               <a:t>Click to edit Master text styles</a:t>
             </a:r>
           </a:p>
@@ -2216,38 +2201,37 @@
           <a:p>
             <a:pPr lvl="0"/>
             <a:r>
-              <a:rPr lang="en-US" smtClean="0"/>
+              <a:rPr lang="en-US"/>
               <a:t>Click to edit Master text styles</a:t>
             </a:r>
           </a:p>
           <a:p>
             <a:pPr lvl="1"/>
             <a:r>
-              <a:rPr lang="en-US" smtClean="0"/>
+              <a:rPr lang="en-US"/>
               <a:t>Second level</a:t>
             </a:r>
           </a:p>
           <a:p>
             <a:pPr lvl="2"/>
             <a:r>
-              <a:rPr lang="en-US" smtClean="0"/>
+              <a:rPr lang="en-US"/>
               <a:t>Third level</a:t>
             </a:r>
           </a:p>
           <a:p>
             <a:pPr lvl="3"/>
             <a:r>
-              <a:rPr lang="en-US" smtClean="0"/>
+              <a:rPr lang="en-US"/>
               <a:t>Fourth level</a:t>
             </a:r>
           </a:p>
           <a:p>
             <a:pPr lvl="4"/>
             <a:r>
-              <a:rPr lang="en-US" smtClean="0"/>
+              <a:rPr lang="en-US"/>
               <a:t>Fifth level</a:t>
             </a:r>
-            <a:endParaRPr lang="en-US"/>
           </a:p>
         </p:txBody>
       </p:sp>
@@ -2310,7 +2294,7 @@
           <a:p>
             <a:pPr lvl="0"/>
             <a:r>
-              <a:rPr lang="en-US" smtClean="0"/>
+              <a:rPr lang="en-US"/>
               <a:t>Click to edit Master text styles</a:t>
             </a:r>
           </a:p>
@@ -2366,38 +2350,37 @@
           <a:p>
             <a:pPr lvl="0"/>
             <a:r>
-              <a:rPr lang="en-US" smtClean="0"/>
+              <a:rPr lang="en-US"/>
               <a:t>Click to edit Master text styles</a:t>
             </a:r>
           </a:p>
           <a:p>
             <a:pPr lvl="1"/>
             <a:r>
-              <a:rPr lang="en-US" smtClean="0"/>
+              <a:rPr lang="en-US"/>
               <a:t>Second level</a:t>
             </a:r>
           </a:p>
           <a:p>
             <a:pPr lvl="2"/>
             <a:r>
-              <a:rPr lang="en-US" smtClean="0"/>
+              <a:rPr lang="en-US"/>
               <a:t>Third level</a:t>
             </a:r>
           </a:p>
           <a:p>
             <a:pPr lvl="3"/>
             <a:r>
-              <a:rPr lang="en-US" smtClean="0"/>
+              <a:rPr lang="en-US"/>
               <a:t>Fourth level</a:t>
             </a:r>
           </a:p>
           <a:p>
             <a:pPr lvl="4"/>
             <a:r>
-              <a:rPr lang="en-US" smtClean="0"/>
+              <a:rPr lang="en-US"/>
               <a:t>Fifth level</a:t>
             </a:r>
-            <a:endParaRPr lang="en-US"/>
           </a:p>
         </p:txBody>
       </p:sp>
@@ -2418,7 +2401,7 @@
           <a:p>
             <a:fld id="{699DC775-C286-4358-8C92-D7E584E969B3}" type="datetimeFigureOut">
               <a:rPr lang="en-US" smtClean="0"/>
-              <a:t>4/7/2019</a:t>
+              <a:t>6/27/2019</a:t>
             </a:fld>
             <a:endParaRPr lang="en-US"/>
           </a:p>
@@ -2512,10 +2495,9 @@
           <a:lstStyle/>
           <a:p>
             <a:r>
-              <a:rPr lang="en-US" smtClean="0"/>
+              <a:rPr lang="en-US"/>
               <a:t>Click to edit Master title style</a:t>
             </a:r>
-            <a:endParaRPr lang="en-US"/>
           </a:p>
         </p:txBody>
       </p:sp>
@@ -2536,7 +2518,7 @@
           <a:p>
             <a:fld id="{699DC775-C286-4358-8C92-D7E584E969B3}" type="datetimeFigureOut">
               <a:rPr lang="en-US" smtClean="0"/>
-              <a:t>4/7/2019</a:t>
+              <a:t>6/27/2019</a:t>
             </a:fld>
             <a:endParaRPr lang="en-US"/>
           </a:p>
@@ -2631,7 +2613,7 @@
           <a:p>
             <a:fld id="{699DC775-C286-4358-8C92-D7E584E969B3}" type="datetimeFigureOut">
               <a:rPr lang="en-US" smtClean="0"/>
-              <a:t>4/7/2019</a:t>
+              <a:t>6/27/2019</a:t>
             </a:fld>
             <a:endParaRPr lang="en-US"/>
           </a:p>
@@ -2734,10 +2716,9 @@
           </a:lstStyle>
           <a:p>
             <a:r>
-              <a:rPr lang="en-US" smtClean="0"/>
+              <a:rPr lang="en-US"/>
               <a:t>Click to edit Master title style</a:t>
             </a:r>
-            <a:endParaRPr lang="en-US"/>
           </a:p>
         </p:txBody>
       </p:sp>
@@ -2791,38 +2772,37 @@
           <a:p>
             <a:pPr lvl="0"/>
             <a:r>
-              <a:rPr lang="en-US" smtClean="0"/>
+              <a:rPr lang="en-US"/>
               <a:t>Click to edit Master text styles</a:t>
             </a:r>
           </a:p>
           <a:p>
             <a:pPr lvl="1"/>
             <a:r>
-              <a:rPr lang="en-US" smtClean="0"/>
+              <a:rPr lang="en-US"/>
               <a:t>Second level</a:t>
             </a:r>
           </a:p>
           <a:p>
             <a:pPr lvl="2"/>
             <a:r>
-              <a:rPr lang="en-US" smtClean="0"/>
+              <a:rPr lang="en-US"/>
               <a:t>Third level</a:t>
             </a:r>
           </a:p>
           <a:p>
             <a:pPr lvl="3"/>
             <a:r>
-              <a:rPr lang="en-US" smtClean="0"/>
+              <a:rPr lang="en-US"/>
               <a:t>Fourth level</a:t>
             </a:r>
           </a:p>
           <a:p>
             <a:pPr lvl="4"/>
             <a:r>
-              <a:rPr lang="en-US" smtClean="0"/>
+              <a:rPr lang="en-US"/>
               <a:t>Fifth level</a:t>
             </a:r>
-            <a:endParaRPr lang="en-US"/>
           </a:p>
         </p:txBody>
       </p:sp>
@@ -2885,7 +2865,7 @@
           <a:p>
             <a:pPr lvl="0"/>
             <a:r>
-              <a:rPr lang="en-US" smtClean="0"/>
+              <a:rPr lang="en-US"/>
               <a:t>Click to edit Master text styles</a:t>
             </a:r>
           </a:p>
@@ -2908,7 +2888,7 @@
           <a:p>
             <a:fld id="{699DC775-C286-4358-8C92-D7E584E969B3}" type="datetimeFigureOut">
               <a:rPr lang="en-US" smtClean="0"/>
-              <a:t>4/7/2019</a:t>
+              <a:t>6/27/2019</a:t>
             </a:fld>
             <a:endParaRPr lang="en-US"/>
           </a:p>
@@ -3002,10 +2982,9 @@
           <a:lstStyle/>
           <a:p>
             <a:r>
-              <a:rPr lang="en-US" smtClean="0"/>
+              <a:rPr lang="en-US"/>
               <a:t>Click to edit Master title style</a:t>
             </a:r>
-            <a:endParaRPr lang="en-US"/>
           </a:p>
         </p:txBody>
       </p:sp>
@@ -3026,38 +3005,37 @@
           <a:p>
             <a:pPr lvl="0"/>
             <a:r>
-              <a:rPr lang="en-US" smtClean="0"/>
+              <a:rPr lang="en-US"/>
               <a:t>Click to edit Master text styles</a:t>
             </a:r>
           </a:p>
           <a:p>
             <a:pPr lvl="1"/>
             <a:r>
-              <a:rPr lang="en-US" smtClean="0"/>
+              <a:rPr lang="en-US"/>
               <a:t>Second level</a:t>
             </a:r>
           </a:p>
           <a:p>
             <a:pPr lvl="2"/>
             <a:r>
-              <a:rPr lang="en-US" smtClean="0"/>
+              <a:rPr lang="en-US"/>
               <a:t>Third level</a:t>
             </a:r>
           </a:p>
           <a:p>
             <a:pPr lvl="3"/>
             <a:r>
-              <a:rPr lang="en-US" smtClean="0"/>
+              <a:rPr lang="en-US"/>
               <a:t>Fourth level</a:t>
             </a:r>
           </a:p>
           <a:p>
             <a:pPr lvl="4"/>
             <a:r>
-              <a:rPr lang="en-US" smtClean="0"/>
+              <a:rPr lang="en-US"/>
               <a:t>Fifth level</a:t>
             </a:r>
-            <a:endParaRPr lang="en-US"/>
           </a:p>
         </p:txBody>
       </p:sp>
@@ -3078,7 +3056,7 @@
           <a:p>
             <a:fld id="{699DC775-C286-4358-8C92-D7E584E969B3}" type="datetimeFigureOut">
               <a:rPr lang="en-US" smtClean="0"/>
-              <a:t>4/7/2019</a:t>
+              <a:t>6/27/2019</a:t>
             </a:fld>
             <a:endParaRPr lang="en-US"/>
           </a:p>
@@ -3181,10 +3159,9 @@
           </a:lstStyle>
           <a:p>
             <a:r>
-              <a:rPr lang="en-US" smtClean="0"/>
+              <a:rPr lang="en-US"/>
               <a:t>Click to edit Master title style</a:t>
             </a:r>
-            <a:endParaRPr lang="en-US"/>
           </a:p>
         </p:txBody>
       </p:sp>
@@ -3308,7 +3285,7 @@
           <a:p>
             <a:pPr lvl="0"/>
             <a:r>
-              <a:rPr lang="en-US" smtClean="0"/>
+              <a:rPr lang="en-US"/>
               <a:t>Click to edit Master text styles</a:t>
             </a:r>
           </a:p>
@@ -3331,7 +3308,7 @@
           <a:p>
             <a:fld id="{699DC775-C286-4358-8C92-D7E584E969B3}" type="datetimeFigureOut">
               <a:rPr lang="en-US" smtClean="0"/>
-              <a:t>4/7/2019</a:t>
+              <a:t>6/27/2019</a:t>
             </a:fld>
             <a:endParaRPr lang="en-US"/>
           </a:p>
@@ -3425,10 +3402,9 @@
           <a:lstStyle/>
           <a:p>
             <a:r>
-              <a:rPr lang="en-US" smtClean="0"/>
+              <a:rPr lang="en-US"/>
               <a:t>Click to edit Master title style</a:t>
             </a:r>
-            <a:endParaRPr lang="en-US"/>
           </a:p>
         </p:txBody>
       </p:sp>
@@ -3449,38 +3425,37 @@
           <a:p>
             <a:pPr lvl="0"/>
             <a:r>
-              <a:rPr lang="en-US" smtClean="0"/>
+              <a:rPr lang="en-US"/>
               <a:t>Click to edit Master text styles</a:t>
             </a:r>
           </a:p>
           <a:p>
             <a:pPr lvl="1"/>
             <a:r>
-              <a:rPr lang="en-US" smtClean="0"/>
+              <a:rPr lang="en-US"/>
               <a:t>Second level</a:t>
             </a:r>
           </a:p>
           <a:p>
             <a:pPr lvl="2"/>
             <a:r>
-              <a:rPr lang="en-US" smtClean="0"/>
+              <a:rPr lang="en-US"/>
               <a:t>Third level</a:t>
             </a:r>
           </a:p>
           <a:p>
             <a:pPr lvl="3"/>
             <a:r>
-              <a:rPr lang="en-US" smtClean="0"/>
+              <a:rPr lang="en-US"/>
               <a:t>Fourth level</a:t>
             </a:r>
           </a:p>
           <a:p>
             <a:pPr lvl="4"/>
             <a:r>
-              <a:rPr lang="en-US" smtClean="0"/>
+              <a:rPr lang="en-US"/>
               <a:t>Fifth level</a:t>
             </a:r>
-            <a:endParaRPr lang="en-US"/>
           </a:p>
         </p:txBody>
       </p:sp>
@@ -3501,7 +3476,7 @@
           <a:p>
             <a:fld id="{699DC775-C286-4358-8C92-D7E584E969B3}" type="datetimeFigureOut">
               <a:rPr lang="en-US" smtClean="0"/>
-              <a:t>4/7/2019</a:t>
+              <a:t>6/27/2019</a:t>
             </a:fld>
             <a:endParaRPr lang="en-US"/>
           </a:p>
@@ -3600,10 +3575,9 @@
           <a:lstStyle/>
           <a:p>
             <a:r>
-              <a:rPr lang="en-US" smtClean="0"/>
+              <a:rPr lang="en-US"/>
               <a:t>Click to edit Master title style</a:t>
             </a:r>
-            <a:endParaRPr lang="en-US"/>
           </a:p>
         </p:txBody>
       </p:sp>
@@ -3629,38 +3603,37 @@
           <a:p>
             <a:pPr lvl="0"/>
             <a:r>
-              <a:rPr lang="en-US" smtClean="0"/>
+              <a:rPr lang="en-US"/>
               <a:t>Click to edit Master text styles</a:t>
             </a:r>
           </a:p>
           <a:p>
             <a:pPr lvl="1"/>
             <a:r>
-              <a:rPr lang="en-US" smtClean="0"/>
+              <a:rPr lang="en-US"/>
               <a:t>Second level</a:t>
             </a:r>
           </a:p>
           <a:p>
             <a:pPr lvl="2"/>
             <a:r>
-              <a:rPr lang="en-US" smtClean="0"/>
+              <a:rPr lang="en-US"/>
               <a:t>Third level</a:t>
             </a:r>
           </a:p>
           <a:p>
             <a:pPr lvl="3"/>
             <a:r>
-              <a:rPr lang="en-US" smtClean="0"/>
+              <a:rPr lang="en-US"/>
               <a:t>Fourth level</a:t>
             </a:r>
           </a:p>
           <a:p>
             <a:pPr lvl="4"/>
             <a:r>
-              <a:rPr lang="en-US" smtClean="0"/>
+              <a:rPr lang="en-US"/>
               <a:t>Fifth level</a:t>
             </a:r>
-            <a:endParaRPr lang="en-US"/>
           </a:p>
         </p:txBody>
       </p:sp>
@@ -3681,7 +3654,7 @@
           <a:p>
             <a:fld id="{699DC775-C286-4358-8C92-D7E584E969B3}" type="datetimeFigureOut">
               <a:rPr lang="en-US" smtClean="0"/>
-              <a:t>4/7/2019</a:t>
+              <a:t>6/27/2019</a:t>
             </a:fld>
             <a:endParaRPr lang="en-US"/>
           </a:p>
@@ -3780,10 +3753,9 @@
           <a:lstStyle/>
           <a:p>
             <a:r>
-              <a:rPr lang="en-US" smtClean="0"/>
+              <a:rPr lang="en-US"/>
               <a:t>Click to edit Master title style</a:t>
             </a:r>
-            <a:endParaRPr lang="en-US"/>
           </a:p>
         </p:txBody>
       </p:sp>
@@ -3899,10 +3871,9 @@
           </a:lstStyle>
           <a:p>
             <a:r>
-              <a:rPr lang="en-US" smtClean="0"/>
+              <a:rPr lang="en-US"/>
               <a:t>Click to edit Master subtitle style</a:t>
             </a:r>
-            <a:endParaRPr lang="en-US"/>
           </a:p>
         </p:txBody>
       </p:sp>
@@ -3923,7 +3894,7 @@
           <a:p>
             <a:fld id="{699DC775-C286-4358-8C92-D7E584E969B3}" type="datetimeFigureOut">
               <a:rPr lang="en-US" smtClean="0"/>
-              <a:t>4/7/2019</a:t>
+              <a:t>6/27/2019</a:t>
             </a:fld>
             <a:endParaRPr lang="en-US"/>
           </a:p>
@@ -4017,10 +3988,9 @@
           <a:lstStyle/>
           <a:p>
             <a:r>
-              <a:rPr lang="en-US" smtClean="0"/>
+              <a:rPr lang="en-US"/>
               <a:t>Click to edit Master title style</a:t>
             </a:r>
-            <a:endParaRPr lang="en-US"/>
           </a:p>
         </p:txBody>
       </p:sp>
@@ -4041,38 +4011,37 @@
           <a:p>
             <a:pPr lvl="0"/>
             <a:r>
-              <a:rPr lang="en-US" smtClean="0"/>
+              <a:rPr lang="en-US"/>
               <a:t>Click to edit Master text styles</a:t>
             </a:r>
           </a:p>
           <a:p>
             <a:pPr lvl="1"/>
             <a:r>
-              <a:rPr lang="en-US" smtClean="0"/>
+              <a:rPr lang="en-US"/>
               <a:t>Second level</a:t>
             </a:r>
           </a:p>
           <a:p>
             <a:pPr lvl="2"/>
             <a:r>
-              <a:rPr lang="en-US" smtClean="0"/>
+              <a:rPr lang="en-US"/>
               <a:t>Third level</a:t>
             </a:r>
           </a:p>
           <a:p>
             <a:pPr lvl="3"/>
             <a:r>
-              <a:rPr lang="en-US" smtClean="0"/>
+              <a:rPr lang="en-US"/>
               <a:t>Fourth level</a:t>
             </a:r>
           </a:p>
           <a:p>
             <a:pPr lvl="4"/>
             <a:r>
-              <a:rPr lang="en-US" smtClean="0"/>
+              <a:rPr lang="en-US"/>
               <a:t>Fifth level</a:t>
             </a:r>
-            <a:endParaRPr lang="en-US"/>
           </a:p>
         </p:txBody>
       </p:sp>
@@ -4093,7 +4062,7 @@
           <a:p>
             <a:fld id="{699DC775-C286-4358-8C92-D7E584E969B3}" type="datetimeFigureOut">
               <a:rPr lang="en-US" smtClean="0"/>
-              <a:t>4/7/2019</a:t>
+              <a:t>6/27/2019</a:t>
             </a:fld>
             <a:endParaRPr lang="en-US"/>
           </a:p>
@@ -4196,10 +4165,9 @@
           </a:lstStyle>
           <a:p>
             <a:r>
-              <a:rPr lang="en-US" smtClean="0"/>
+              <a:rPr lang="en-US"/>
               <a:t>Click to edit Master title style</a:t>
             </a:r>
-            <a:endParaRPr lang="en-US"/>
           </a:p>
         </p:txBody>
       </p:sp>
@@ -4316,7 +4284,7 @@
           <a:p>
             <a:pPr lvl="0"/>
             <a:r>
-              <a:rPr lang="en-US" smtClean="0"/>
+              <a:rPr lang="en-US"/>
               <a:t>Click to edit Master text styles</a:t>
             </a:r>
           </a:p>
@@ -4339,7 +4307,7 @@
           <a:p>
             <a:fld id="{699DC775-C286-4358-8C92-D7E584E969B3}" type="datetimeFigureOut">
               <a:rPr lang="en-US" smtClean="0"/>
-              <a:t>4/7/2019</a:t>
+              <a:t>6/27/2019</a:t>
             </a:fld>
             <a:endParaRPr lang="en-US"/>
           </a:p>
@@ -4433,10 +4401,9 @@
           <a:lstStyle/>
           <a:p>
             <a:r>
-              <a:rPr lang="en-US" smtClean="0"/>
+              <a:rPr lang="en-US"/>
               <a:t>Click to edit Master title style</a:t>
             </a:r>
-            <a:endParaRPr lang="en-US"/>
           </a:p>
         </p:txBody>
       </p:sp>
@@ -4490,38 +4457,37 @@
           <a:p>
             <a:pPr lvl="0"/>
             <a:r>
-              <a:rPr lang="en-US" smtClean="0"/>
+              <a:rPr lang="en-US"/>
               <a:t>Click to edit Master text styles</a:t>
             </a:r>
           </a:p>
           <a:p>
             <a:pPr lvl="1"/>
             <a:r>
-              <a:rPr lang="en-US" smtClean="0"/>
+              <a:rPr lang="en-US"/>
               <a:t>Second level</a:t>
             </a:r>
           </a:p>
           <a:p>
             <a:pPr lvl="2"/>
             <a:r>
-              <a:rPr lang="en-US" smtClean="0"/>
+              <a:rPr lang="en-US"/>
               <a:t>Third level</a:t>
             </a:r>
           </a:p>
           <a:p>
             <a:pPr lvl="3"/>
             <a:r>
-              <a:rPr lang="en-US" smtClean="0"/>
+              <a:rPr lang="en-US"/>
               <a:t>Fourth level</a:t>
             </a:r>
           </a:p>
           <a:p>
             <a:pPr lvl="4"/>
             <a:r>
-              <a:rPr lang="en-US" smtClean="0"/>
+              <a:rPr lang="en-US"/>
               <a:t>Fifth level</a:t>
             </a:r>
-            <a:endParaRPr lang="en-US"/>
           </a:p>
         </p:txBody>
       </p:sp>
@@ -4575,38 +4541,37 @@
           <a:p>
             <a:pPr lvl="0"/>
             <a:r>
-              <a:rPr lang="en-US" smtClean="0"/>
+              <a:rPr lang="en-US"/>
               <a:t>Click to edit Master text styles</a:t>
             </a:r>
           </a:p>
           <a:p>
             <a:pPr lvl="1"/>
             <a:r>
-              <a:rPr lang="en-US" smtClean="0"/>
+              <a:rPr lang="en-US"/>
               <a:t>Second level</a:t>
             </a:r>
           </a:p>
           <a:p>
             <a:pPr lvl="2"/>
             <a:r>
-              <a:rPr lang="en-US" smtClean="0"/>
+              <a:rPr lang="en-US"/>
               <a:t>Third level</a:t>
             </a:r>
           </a:p>
           <a:p>
             <a:pPr lvl="3"/>
             <a:r>
-              <a:rPr lang="en-US" smtClean="0"/>
+              <a:rPr lang="en-US"/>
               <a:t>Fourth level</a:t>
             </a:r>
           </a:p>
           <a:p>
             <a:pPr lvl="4"/>
             <a:r>
-              <a:rPr lang="en-US" smtClean="0"/>
+              <a:rPr lang="en-US"/>
               <a:t>Fifth level</a:t>
             </a:r>
-            <a:endParaRPr lang="en-US"/>
           </a:p>
         </p:txBody>
       </p:sp>
@@ -4627,7 +4592,7 @@
           <a:p>
             <a:fld id="{699DC775-C286-4358-8C92-D7E584E969B3}" type="datetimeFigureOut">
               <a:rPr lang="en-US" smtClean="0"/>
-              <a:t>4/7/2019</a:t>
+              <a:t>6/27/2019</a:t>
             </a:fld>
             <a:endParaRPr lang="en-US"/>
           </a:p>
@@ -4725,10 +4690,9 @@
           </a:lstStyle>
           <a:p>
             <a:r>
-              <a:rPr lang="en-US" smtClean="0"/>
+              <a:rPr lang="en-US"/>
               <a:t>Click to edit Master title style</a:t>
             </a:r>
-            <a:endParaRPr lang="en-US"/>
           </a:p>
         </p:txBody>
       </p:sp>
@@ -4791,7 +4755,7 @@
           <a:p>
             <a:pPr lvl="0"/>
             <a:r>
-              <a:rPr lang="en-US" smtClean="0"/>
+              <a:rPr lang="en-US"/>
               <a:t>Click to edit Master text styles</a:t>
             </a:r>
           </a:p>
@@ -4847,38 +4811,37 @@
           <a:p>
             <a:pPr lvl="0"/>
             <a:r>
-              <a:rPr lang="en-US" smtClean="0"/>
+              <a:rPr lang="en-US"/>
               <a:t>Click to edit Master text styles</a:t>
             </a:r>
           </a:p>
           <a:p>
             <a:pPr lvl="1"/>
             <a:r>
-              <a:rPr lang="en-US" smtClean="0"/>
+              <a:rPr lang="en-US"/>
               <a:t>Second level</a:t>
             </a:r>
           </a:p>
           <a:p>
             <a:pPr lvl="2"/>
             <a:r>
-              <a:rPr lang="en-US" smtClean="0"/>
+              <a:rPr lang="en-US"/>
               <a:t>Third level</a:t>
             </a:r>
           </a:p>
           <a:p>
             <a:pPr lvl="3"/>
             <a:r>
-              <a:rPr lang="en-US" smtClean="0"/>
+              <a:rPr lang="en-US"/>
               <a:t>Fourth level</a:t>
             </a:r>
           </a:p>
           <a:p>
             <a:pPr lvl="4"/>
             <a:r>
-              <a:rPr lang="en-US" smtClean="0"/>
+              <a:rPr lang="en-US"/>
               <a:t>Fifth level</a:t>
             </a:r>
-            <a:endParaRPr lang="en-US"/>
           </a:p>
         </p:txBody>
       </p:sp>
@@ -4941,7 +4904,7 @@
           <a:p>
             <a:pPr lvl="0"/>
             <a:r>
-              <a:rPr lang="en-US" smtClean="0"/>
+              <a:rPr lang="en-US"/>
               <a:t>Click to edit Master text styles</a:t>
             </a:r>
           </a:p>
@@ -4997,38 +4960,37 @@
           <a:p>
             <a:pPr lvl="0"/>
             <a:r>
-              <a:rPr lang="en-US" smtClean="0"/>
+              <a:rPr lang="en-US"/>
               <a:t>Click to edit Master text styles</a:t>
             </a:r>
           </a:p>
           <a:p>
             <a:pPr lvl="1"/>
             <a:r>
-              <a:rPr lang="en-US" smtClean="0"/>
+              <a:rPr lang="en-US"/>
               <a:t>Second level</a:t>
             </a:r>
           </a:p>
           <a:p>
             <a:pPr lvl="2"/>
             <a:r>
-              <a:rPr lang="en-US" smtClean="0"/>
+              <a:rPr lang="en-US"/>
               <a:t>Third level</a:t>
             </a:r>
           </a:p>
           <a:p>
             <a:pPr lvl="3"/>
             <a:r>
-              <a:rPr lang="en-US" smtClean="0"/>
+              <a:rPr lang="en-US"/>
               <a:t>Fourth level</a:t>
             </a:r>
           </a:p>
           <a:p>
             <a:pPr lvl="4"/>
             <a:r>
-              <a:rPr lang="en-US" smtClean="0"/>
+              <a:rPr lang="en-US"/>
               <a:t>Fifth level</a:t>
             </a:r>
-            <a:endParaRPr lang="en-US"/>
           </a:p>
         </p:txBody>
       </p:sp>
@@ -5049,7 +5011,7 @@
           <a:p>
             <a:fld id="{699DC775-C286-4358-8C92-D7E584E969B3}" type="datetimeFigureOut">
               <a:rPr lang="en-US" smtClean="0"/>
-              <a:t>4/7/2019</a:t>
+              <a:t>6/27/2019</a:t>
             </a:fld>
             <a:endParaRPr lang="en-US"/>
           </a:p>
@@ -5143,10 +5105,9 @@
           <a:lstStyle/>
           <a:p>
             <a:r>
-              <a:rPr lang="en-US" smtClean="0"/>
+              <a:rPr lang="en-US"/>
               <a:t>Click to edit Master title style</a:t>
             </a:r>
-            <a:endParaRPr lang="en-US"/>
           </a:p>
         </p:txBody>
       </p:sp>
@@ -5167,7 +5128,7 @@
           <a:p>
             <a:fld id="{699DC775-C286-4358-8C92-D7E584E969B3}" type="datetimeFigureOut">
               <a:rPr lang="en-US" smtClean="0"/>
-              <a:t>4/7/2019</a:t>
+              <a:t>6/27/2019</a:t>
             </a:fld>
             <a:endParaRPr lang="en-US"/>
           </a:p>
@@ -5262,7 +5223,7 @@
           <a:p>
             <a:fld id="{699DC775-C286-4358-8C92-D7E584E969B3}" type="datetimeFigureOut">
               <a:rPr lang="en-US" smtClean="0"/>
-              <a:t>4/7/2019</a:t>
+              <a:t>6/27/2019</a:t>
             </a:fld>
             <a:endParaRPr lang="en-US"/>
           </a:p>
@@ -5365,10 +5326,9 @@
           </a:lstStyle>
           <a:p>
             <a:r>
-              <a:rPr lang="en-US" smtClean="0"/>
+              <a:rPr lang="en-US"/>
               <a:t>Click to edit Master title style</a:t>
             </a:r>
-            <a:endParaRPr lang="en-US"/>
           </a:p>
         </p:txBody>
       </p:sp>
@@ -5485,7 +5445,7 @@
           <a:p>
             <a:pPr lvl="0"/>
             <a:r>
-              <a:rPr lang="en-US" smtClean="0"/>
+              <a:rPr lang="en-US"/>
               <a:t>Click to edit Master text styles</a:t>
             </a:r>
           </a:p>
@@ -5508,7 +5468,7 @@
           <a:p>
             <a:fld id="{699DC775-C286-4358-8C92-D7E584E969B3}" type="datetimeFigureOut">
               <a:rPr lang="en-US" smtClean="0"/>
-              <a:t>4/7/2019</a:t>
+              <a:t>6/27/2019</a:t>
             </a:fld>
             <a:endParaRPr lang="en-US"/>
           </a:p>
@@ -5611,10 +5571,9 @@
           </a:lstStyle>
           <a:p>
             <a:r>
-              <a:rPr lang="en-US" smtClean="0"/>
+              <a:rPr lang="en-US"/>
               <a:t>Click to edit Master title style</a:t>
             </a:r>
-            <a:endParaRPr lang="en-US"/>
           </a:p>
         </p:txBody>
       </p:sp>
@@ -5668,38 +5627,37 @@
           <a:p>
             <a:pPr lvl="0"/>
             <a:r>
-              <a:rPr lang="en-US" smtClean="0"/>
+              <a:rPr lang="en-US"/>
               <a:t>Click to edit Master text styles</a:t>
             </a:r>
           </a:p>
           <a:p>
             <a:pPr lvl="1"/>
             <a:r>
-              <a:rPr lang="en-US" smtClean="0"/>
+              <a:rPr lang="en-US"/>
               <a:t>Second level</a:t>
             </a:r>
           </a:p>
           <a:p>
             <a:pPr lvl="2"/>
             <a:r>
-              <a:rPr lang="en-US" smtClean="0"/>
+              <a:rPr lang="en-US"/>
               <a:t>Third level</a:t>
             </a:r>
           </a:p>
           <a:p>
             <a:pPr lvl="3"/>
             <a:r>
-              <a:rPr lang="en-US" smtClean="0"/>
+              <a:rPr lang="en-US"/>
               <a:t>Fourth level</a:t>
             </a:r>
           </a:p>
           <a:p>
             <a:pPr lvl="4"/>
             <a:r>
-              <a:rPr lang="en-US" smtClean="0"/>
+              <a:rPr lang="en-US"/>
               <a:t>Fifth level</a:t>
             </a:r>
-            <a:endParaRPr lang="en-US"/>
           </a:p>
         </p:txBody>
       </p:sp>
@@ -5762,7 +5720,7 @@
           <a:p>
             <a:pPr lvl="0"/>
             <a:r>
-              <a:rPr lang="en-US" smtClean="0"/>
+              <a:rPr lang="en-US"/>
               <a:t>Click to edit Master text styles</a:t>
             </a:r>
           </a:p>
@@ -5785,7 +5743,7 @@
           <a:p>
             <a:fld id="{699DC775-C286-4358-8C92-D7E584E969B3}" type="datetimeFigureOut">
               <a:rPr lang="en-US" smtClean="0"/>
-              <a:t>4/7/2019</a:t>
+              <a:t>6/27/2019</a:t>
             </a:fld>
             <a:endParaRPr lang="en-US"/>
           </a:p>
@@ -5888,10 +5846,9 @@
           </a:lstStyle>
           <a:p>
             <a:r>
-              <a:rPr lang="en-US" smtClean="0"/>
+              <a:rPr lang="en-US"/>
               <a:t>Click to edit Master title style</a:t>
             </a:r>
-            <a:endParaRPr lang="en-US"/>
           </a:p>
         </p:txBody>
       </p:sp>
@@ -6015,7 +5972,7 @@
           <a:p>
             <a:pPr lvl="0"/>
             <a:r>
-              <a:rPr lang="en-US" smtClean="0"/>
+              <a:rPr lang="en-US"/>
               <a:t>Click to edit Master text styles</a:t>
             </a:r>
           </a:p>
@@ -6038,7 +5995,7 @@
           <a:p>
             <a:fld id="{699DC775-C286-4358-8C92-D7E584E969B3}" type="datetimeFigureOut">
               <a:rPr lang="en-US" smtClean="0"/>
-              <a:t>4/7/2019</a:t>
+              <a:t>6/27/2019</a:t>
             </a:fld>
             <a:endParaRPr lang="en-US"/>
           </a:p>
@@ -6132,10 +6089,9 @@
           <a:lstStyle/>
           <a:p>
             <a:r>
-              <a:rPr lang="en-US" smtClean="0"/>
+              <a:rPr lang="en-US"/>
               <a:t>Click to edit Master title style</a:t>
             </a:r>
-            <a:endParaRPr lang="en-US"/>
           </a:p>
         </p:txBody>
       </p:sp>
@@ -6156,38 +6112,37 @@
           <a:p>
             <a:pPr lvl="0"/>
             <a:r>
-              <a:rPr lang="en-US" smtClean="0"/>
+              <a:rPr lang="en-US"/>
               <a:t>Click to edit Master text styles</a:t>
             </a:r>
           </a:p>
           <a:p>
             <a:pPr lvl="1"/>
             <a:r>
-              <a:rPr lang="en-US" smtClean="0"/>
+              <a:rPr lang="en-US"/>
               <a:t>Second level</a:t>
             </a:r>
           </a:p>
           <a:p>
             <a:pPr lvl="2"/>
             <a:r>
-              <a:rPr lang="en-US" smtClean="0"/>
+              <a:rPr lang="en-US"/>
               <a:t>Third level</a:t>
             </a:r>
           </a:p>
           <a:p>
             <a:pPr lvl="3"/>
             <a:r>
-              <a:rPr lang="en-US" smtClean="0"/>
+              <a:rPr lang="en-US"/>
               <a:t>Fourth level</a:t>
             </a:r>
           </a:p>
           <a:p>
             <a:pPr lvl="4"/>
             <a:r>
-              <a:rPr lang="en-US" smtClean="0"/>
+              <a:rPr lang="en-US"/>
               <a:t>Fifth level</a:t>
             </a:r>
-            <a:endParaRPr lang="en-US"/>
           </a:p>
         </p:txBody>
       </p:sp>
@@ -6208,7 +6163,7 @@
           <a:p>
             <a:fld id="{699DC775-C286-4358-8C92-D7E584E969B3}" type="datetimeFigureOut">
               <a:rPr lang="en-US" smtClean="0"/>
-              <a:t>4/7/2019</a:t>
+              <a:t>6/27/2019</a:t>
             </a:fld>
             <a:endParaRPr lang="en-US"/>
           </a:p>
@@ -6307,10 +6262,9 @@
           <a:lstStyle/>
           <a:p>
             <a:r>
-              <a:rPr lang="en-US" smtClean="0"/>
+              <a:rPr lang="en-US"/>
               <a:t>Click to edit Master title style</a:t>
             </a:r>
-            <a:endParaRPr lang="en-US"/>
           </a:p>
         </p:txBody>
       </p:sp>
@@ -6336,38 +6290,37 @@
           <a:p>
             <a:pPr lvl="0"/>
             <a:r>
-              <a:rPr lang="en-US" smtClean="0"/>
+              <a:rPr lang="en-US"/>
               <a:t>Click to edit Master text styles</a:t>
             </a:r>
           </a:p>
           <a:p>
             <a:pPr lvl="1"/>
             <a:r>
-              <a:rPr lang="en-US" smtClean="0"/>
+              <a:rPr lang="en-US"/>
               <a:t>Second level</a:t>
             </a:r>
           </a:p>
           <a:p>
             <a:pPr lvl="2"/>
             <a:r>
-              <a:rPr lang="en-US" smtClean="0"/>
+              <a:rPr lang="en-US"/>
               <a:t>Third level</a:t>
             </a:r>
           </a:p>
           <a:p>
             <a:pPr lvl="3"/>
             <a:r>
-              <a:rPr lang="en-US" smtClean="0"/>
+              <a:rPr lang="en-US"/>
               <a:t>Fourth level</a:t>
             </a:r>
           </a:p>
           <a:p>
             <a:pPr lvl="4"/>
             <a:r>
-              <a:rPr lang="en-US" smtClean="0"/>
+              <a:rPr lang="en-US"/>
               <a:t>Fifth level</a:t>
             </a:r>
-            <a:endParaRPr lang="en-US"/>
           </a:p>
         </p:txBody>
       </p:sp>
@@ -6388,7 +6341,7 @@
           <a:p>
             <a:fld id="{699DC775-C286-4358-8C92-D7E584E969B3}" type="datetimeFigureOut">
               <a:rPr lang="en-US" smtClean="0"/>
-              <a:t>4/7/2019</a:t>
+              <a:t>6/27/2019</a:t>
             </a:fld>
             <a:endParaRPr lang="en-US"/>
           </a:p>
@@ -6482,10 +6435,9 @@
           <a:lstStyle/>
           <a:p>
             <a:r>
-              <a:rPr lang="en-US" smtClean="0"/>
+              <a:rPr lang="en-US"/>
               <a:t>Click to edit Master title style</a:t>
             </a:r>
-            <a:endParaRPr lang="en-US"/>
           </a:p>
         </p:txBody>
       </p:sp>
@@ -6539,38 +6491,37 @@
           <a:p>
             <a:pPr lvl="0"/>
             <a:r>
-              <a:rPr lang="en-US" smtClean="0"/>
+              <a:rPr lang="en-US"/>
               <a:t>Click to edit Master text styles</a:t>
             </a:r>
           </a:p>
           <a:p>
             <a:pPr lvl="1"/>
             <a:r>
-              <a:rPr lang="en-US" smtClean="0"/>
+              <a:rPr lang="en-US"/>
               <a:t>Second level</a:t>
             </a:r>
           </a:p>
           <a:p>
             <a:pPr lvl="2"/>
             <a:r>
-              <a:rPr lang="en-US" smtClean="0"/>
+              <a:rPr lang="en-US"/>
               <a:t>Third level</a:t>
             </a:r>
           </a:p>
           <a:p>
             <a:pPr lvl="3"/>
             <a:r>
-              <a:rPr lang="en-US" smtClean="0"/>
+              <a:rPr lang="en-US"/>
               <a:t>Fourth level</a:t>
             </a:r>
           </a:p>
           <a:p>
             <a:pPr lvl="4"/>
             <a:r>
-              <a:rPr lang="en-US" smtClean="0"/>
+              <a:rPr lang="en-US"/>
               <a:t>Fifth level</a:t>
             </a:r>
-            <a:endParaRPr lang="en-US"/>
           </a:p>
         </p:txBody>
       </p:sp>
@@ -6624,38 +6575,37 @@
           <a:p>
             <a:pPr lvl="0"/>
             <a:r>
-              <a:rPr lang="en-US" smtClean="0"/>
+              <a:rPr lang="en-US"/>
               <a:t>Click to edit Master text styles</a:t>
             </a:r>
           </a:p>
           <a:p>
             <a:pPr lvl="1"/>
             <a:r>
-              <a:rPr lang="en-US" smtClean="0"/>
+              <a:rPr lang="en-US"/>
               <a:t>Second level</a:t>
             </a:r>
           </a:p>
           <a:p>
             <a:pPr lvl="2"/>
             <a:r>
-              <a:rPr lang="en-US" smtClean="0"/>
+              <a:rPr lang="en-US"/>
               <a:t>Third level</a:t>
             </a:r>
           </a:p>
           <a:p>
             <a:pPr lvl="3"/>
             <a:r>
-              <a:rPr lang="en-US" smtClean="0"/>
+              <a:rPr lang="en-US"/>
               <a:t>Fourth level</a:t>
             </a:r>
           </a:p>
           <a:p>
             <a:pPr lvl="4"/>
             <a:r>
-              <a:rPr lang="en-US" smtClean="0"/>
+              <a:rPr lang="en-US"/>
               <a:t>Fifth level</a:t>
             </a:r>
-            <a:endParaRPr lang="en-US"/>
           </a:p>
         </p:txBody>
       </p:sp>
@@ -6676,7 +6626,7 @@
           <a:p>
             <a:fld id="{699DC775-C286-4358-8C92-D7E584E969B3}" type="datetimeFigureOut">
               <a:rPr lang="en-US" smtClean="0"/>
-              <a:t>4/7/2019</a:t>
+              <a:t>6/27/2019</a:t>
             </a:fld>
             <a:endParaRPr lang="en-US"/>
           </a:p>
@@ -6774,10 +6724,9 @@
           </a:lstStyle>
           <a:p>
             <a:r>
-              <a:rPr lang="en-US" smtClean="0"/>
+              <a:rPr lang="en-US"/>
               <a:t>Click to edit Master title style</a:t>
             </a:r>
-            <a:endParaRPr lang="en-US"/>
           </a:p>
         </p:txBody>
       </p:sp>
@@ -6840,7 +6789,7 @@
           <a:p>
             <a:pPr lvl="0"/>
             <a:r>
-              <a:rPr lang="en-US" smtClean="0"/>
+              <a:rPr lang="en-US"/>
               <a:t>Click to edit Master text styles</a:t>
             </a:r>
           </a:p>
@@ -6896,38 +6845,37 @@
           <a:p>
             <a:pPr lvl="0"/>
             <a:r>
-              <a:rPr lang="en-US" smtClean="0"/>
+              <a:rPr lang="en-US"/>
               <a:t>Click to edit Master text styles</a:t>
             </a:r>
           </a:p>
           <a:p>
             <a:pPr lvl="1"/>
             <a:r>
-              <a:rPr lang="en-US" smtClean="0"/>
+              <a:rPr lang="en-US"/>
               <a:t>Second level</a:t>
             </a:r>
           </a:p>
           <a:p>
             <a:pPr lvl="2"/>
             <a:r>
-              <a:rPr lang="en-US" smtClean="0"/>
+              <a:rPr lang="en-US"/>
               <a:t>Third level</a:t>
             </a:r>
           </a:p>
           <a:p>
             <a:pPr lvl="3"/>
             <a:r>
-              <a:rPr lang="en-US" smtClean="0"/>
+              <a:rPr lang="en-US"/>
               <a:t>Fourth level</a:t>
             </a:r>
           </a:p>
           <a:p>
             <a:pPr lvl="4"/>
             <a:r>
-              <a:rPr lang="en-US" smtClean="0"/>
+              <a:rPr lang="en-US"/>
               <a:t>Fifth level</a:t>
             </a:r>
-            <a:endParaRPr lang="en-US"/>
           </a:p>
         </p:txBody>
       </p:sp>
@@ -6990,7 +6938,7 @@
           <a:p>
             <a:pPr lvl="0"/>
             <a:r>
-              <a:rPr lang="en-US" smtClean="0"/>
+              <a:rPr lang="en-US"/>
               <a:t>Click to edit Master text styles</a:t>
             </a:r>
           </a:p>
@@ -7046,38 +6994,37 @@
           <a:p>
             <a:pPr lvl="0"/>
             <a:r>
-              <a:rPr lang="en-US" smtClean="0"/>
+              <a:rPr lang="en-US"/>
               <a:t>Click to edit Master text styles</a:t>
             </a:r>
           </a:p>
           <a:p>
             <a:pPr lvl="1"/>
             <a:r>
-              <a:rPr lang="en-US" smtClean="0"/>
+              <a:rPr lang="en-US"/>
               <a:t>Second level</a:t>
             </a:r>
           </a:p>
           <a:p>
             <a:pPr lvl="2"/>
             <a:r>
-              <a:rPr lang="en-US" smtClean="0"/>
+              <a:rPr lang="en-US"/>
               <a:t>Third level</a:t>
             </a:r>
           </a:p>
           <a:p>
             <a:pPr lvl="3"/>
             <a:r>
-              <a:rPr lang="en-US" smtClean="0"/>
+              <a:rPr lang="en-US"/>
               <a:t>Fourth level</a:t>
             </a:r>
           </a:p>
           <a:p>
             <a:pPr lvl="4"/>
             <a:r>
-              <a:rPr lang="en-US" smtClean="0"/>
+              <a:rPr lang="en-US"/>
               <a:t>Fifth level</a:t>
             </a:r>
-            <a:endParaRPr lang="en-US"/>
           </a:p>
         </p:txBody>
       </p:sp>
@@ -7098,7 +7045,7 @@
           <a:p>
             <a:fld id="{699DC775-C286-4358-8C92-D7E584E969B3}" type="datetimeFigureOut">
               <a:rPr lang="en-US" smtClean="0"/>
-              <a:t>4/7/2019</a:t>
+              <a:t>6/27/2019</a:t>
             </a:fld>
             <a:endParaRPr lang="en-US"/>
           </a:p>
@@ -7192,10 +7139,9 @@
           <a:lstStyle/>
           <a:p>
             <a:r>
-              <a:rPr lang="en-US" smtClean="0"/>
+              <a:rPr lang="en-US"/>
               <a:t>Click to edit Master title style</a:t>
             </a:r>
-            <a:endParaRPr lang="en-US"/>
           </a:p>
         </p:txBody>
       </p:sp>
@@ -7216,7 +7162,7 @@
           <a:p>
             <a:fld id="{699DC775-C286-4358-8C92-D7E584E969B3}" type="datetimeFigureOut">
               <a:rPr lang="en-US" smtClean="0"/>
-              <a:t>4/7/2019</a:t>
+              <a:t>6/27/2019</a:t>
             </a:fld>
             <a:endParaRPr lang="en-US"/>
           </a:p>
@@ -7311,7 +7257,7 @@
           <a:p>
             <a:fld id="{699DC775-C286-4358-8C92-D7E584E969B3}" type="datetimeFigureOut">
               <a:rPr lang="en-US" smtClean="0"/>
-              <a:t>4/7/2019</a:t>
+              <a:t>6/27/2019</a:t>
             </a:fld>
             <a:endParaRPr lang="en-US"/>
           </a:p>
@@ -7414,10 +7360,9 @@
           </a:lstStyle>
           <a:p>
             <a:r>
-              <a:rPr lang="en-US" smtClean="0"/>
+              <a:rPr lang="en-US"/>
               <a:t>Click to edit Master title style</a:t>
             </a:r>
-            <a:endParaRPr lang="en-US"/>
           </a:p>
         </p:txBody>
       </p:sp>
@@ -7471,38 +7416,37 @@
           <a:p>
             <a:pPr lvl="0"/>
             <a:r>
-              <a:rPr lang="en-US" smtClean="0"/>
+              <a:rPr lang="en-US"/>
               <a:t>Click to edit Master text styles</a:t>
             </a:r>
           </a:p>
           <a:p>
             <a:pPr lvl="1"/>
             <a:r>
-              <a:rPr lang="en-US" smtClean="0"/>
+              <a:rPr lang="en-US"/>
               <a:t>Second level</a:t>
             </a:r>
           </a:p>
           <a:p>
             <a:pPr lvl="2"/>
             <a:r>
-              <a:rPr lang="en-US" smtClean="0"/>
+              <a:rPr lang="en-US"/>
               <a:t>Third level</a:t>
             </a:r>
           </a:p>
           <a:p>
             <a:pPr lvl="3"/>
             <a:r>
-              <a:rPr lang="en-US" smtClean="0"/>
+              <a:rPr lang="en-US"/>
               <a:t>Fourth level</a:t>
             </a:r>
           </a:p>
           <a:p>
             <a:pPr lvl="4"/>
             <a:r>
-              <a:rPr lang="en-US" smtClean="0"/>
+              <a:rPr lang="en-US"/>
               <a:t>Fifth level</a:t>
             </a:r>
-            <a:endParaRPr lang="en-US"/>
           </a:p>
         </p:txBody>
       </p:sp>
@@ -7565,7 +7509,7 @@
           <a:p>
             <a:pPr lvl="0"/>
             <a:r>
-              <a:rPr lang="en-US" smtClean="0"/>
+              <a:rPr lang="en-US"/>
               <a:t>Click to edit Master text styles</a:t>
             </a:r>
           </a:p>
@@ -7588,7 +7532,7 @@
           <a:p>
             <a:fld id="{699DC775-C286-4358-8C92-D7E584E969B3}" type="datetimeFigureOut">
               <a:rPr lang="en-US" smtClean="0"/>
-              <a:t>4/7/2019</a:t>
+              <a:t>6/27/2019</a:t>
             </a:fld>
             <a:endParaRPr lang="en-US"/>
           </a:p>
@@ -7691,10 +7635,9 @@
           </a:lstStyle>
           <a:p>
             <a:r>
-              <a:rPr lang="en-US" smtClean="0"/>
+              <a:rPr lang="en-US"/>
               <a:t>Click to edit Master title style</a:t>
             </a:r>
-            <a:endParaRPr lang="en-US"/>
           </a:p>
         </p:txBody>
       </p:sp>
@@ -7818,7 +7761,7 @@
           <a:p>
             <a:pPr lvl="0"/>
             <a:r>
-              <a:rPr lang="en-US" smtClean="0"/>
+              <a:rPr lang="en-US"/>
               <a:t>Click to edit Master text styles</a:t>
             </a:r>
           </a:p>
@@ -7841,7 +7784,7 @@
           <a:p>
             <a:fld id="{699DC775-C286-4358-8C92-D7E584E969B3}" type="datetimeFigureOut">
               <a:rPr lang="en-US" smtClean="0"/>
-              <a:t>4/7/2019</a:t>
+              <a:t>6/27/2019</a:t>
             </a:fld>
             <a:endParaRPr lang="en-US"/>
           </a:p>
@@ -7953,10 +7896,9 @@
           <a:lstStyle/>
           <a:p>
             <a:r>
-              <a:rPr lang="en-US" smtClean="0"/>
+              <a:rPr lang="en-US"/>
               <a:t>Click to edit Master title style</a:t>
             </a:r>
-            <a:endParaRPr lang="en-US"/>
           </a:p>
         </p:txBody>
       </p:sp>
@@ -7987,38 +7929,37 @@
           <a:p>
             <a:pPr lvl="0"/>
             <a:r>
-              <a:rPr lang="en-US" smtClean="0"/>
+              <a:rPr lang="en-US"/>
               <a:t>Click to edit Master text styles</a:t>
             </a:r>
           </a:p>
           <a:p>
             <a:pPr lvl="1"/>
             <a:r>
-              <a:rPr lang="en-US" smtClean="0"/>
+              <a:rPr lang="en-US"/>
               <a:t>Second level</a:t>
             </a:r>
           </a:p>
           <a:p>
             <a:pPr lvl="2"/>
             <a:r>
-              <a:rPr lang="en-US" smtClean="0"/>
+              <a:rPr lang="en-US"/>
               <a:t>Third level</a:t>
             </a:r>
           </a:p>
           <a:p>
             <a:pPr lvl="3"/>
             <a:r>
-              <a:rPr lang="en-US" smtClean="0"/>
+              <a:rPr lang="en-US"/>
               <a:t>Fourth level</a:t>
             </a:r>
           </a:p>
           <a:p>
             <a:pPr lvl="4"/>
             <a:r>
-              <a:rPr lang="en-US" smtClean="0"/>
+              <a:rPr lang="en-US"/>
               <a:t>Fifth level</a:t>
             </a:r>
-            <a:endParaRPr lang="en-US"/>
           </a:p>
         </p:txBody>
       </p:sp>
@@ -8057,7 +7998,7 @@
           <a:p>
             <a:fld id="{699DC775-C286-4358-8C92-D7E584E969B3}" type="datetimeFigureOut">
               <a:rPr lang="en-US" smtClean="0"/>
-              <a:t>4/7/2019</a:t>
+              <a:t>6/27/2019</a:t>
             </a:fld>
             <a:endParaRPr lang="en-US"/>
           </a:p>
@@ -8466,10 +8407,9 @@
           <a:lstStyle/>
           <a:p>
             <a:r>
-              <a:rPr lang="en-US" smtClean="0"/>
+              <a:rPr lang="en-US"/>
               <a:t>Click to edit Master title style</a:t>
             </a:r>
-            <a:endParaRPr lang="en-US"/>
           </a:p>
         </p:txBody>
       </p:sp>
@@ -8500,38 +8440,37 @@
           <a:p>
             <a:pPr lvl="0"/>
             <a:r>
-              <a:rPr lang="en-US" smtClean="0"/>
+              <a:rPr lang="en-US"/>
               <a:t>Click to edit Master text styles</a:t>
             </a:r>
           </a:p>
           <a:p>
             <a:pPr lvl="1"/>
             <a:r>
-              <a:rPr lang="en-US" smtClean="0"/>
+              <a:rPr lang="en-US"/>
               <a:t>Second level</a:t>
             </a:r>
           </a:p>
           <a:p>
             <a:pPr lvl="2"/>
             <a:r>
-              <a:rPr lang="en-US" smtClean="0"/>
+              <a:rPr lang="en-US"/>
               <a:t>Third level</a:t>
             </a:r>
           </a:p>
           <a:p>
             <a:pPr lvl="3"/>
             <a:r>
-              <a:rPr lang="en-US" smtClean="0"/>
+              <a:rPr lang="en-US"/>
               <a:t>Fourth level</a:t>
             </a:r>
           </a:p>
           <a:p>
             <a:pPr lvl="4"/>
             <a:r>
-              <a:rPr lang="en-US" smtClean="0"/>
+              <a:rPr lang="en-US"/>
               <a:t>Fifth level</a:t>
             </a:r>
-            <a:endParaRPr lang="en-US"/>
           </a:p>
         </p:txBody>
       </p:sp>
@@ -8570,7 +8509,7 @@
           <a:p>
             <a:fld id="{699DC775-C286-4358-8C92-D7E584E969B3}" type="datetimeFigureOut">
               <a:rPr lang="en-US" smtClean="0"/>
-              <a:t>4/7/2019</a:t>
+              <a:t>6/27/2019</a:t>
             </a:fld>
             <a:endParaRPr lang="en-US"/>
           </a:p>
@@ -8979,10 +8918,9 @@
           <a:lstStyle/>
           <a:p>
             <a:r>
-              <a:rPr lang="en-US" dirty="0" smtClean="0"/>
+              <a:rPr lang="en-US" dirty="0"/>
               <a:t>Click to edit Master title style</a:t>
             </a:r>
-            <a:endParaRPr lang="en-US" dirty="0"/>
           </a:p>
         </p:txBody>
       </p:sp>
@@ -9013,38 +8951,37 @@
           <a:p>
             <a:pPr lvl="0"/>
             <a:r>
-              <a:rPr lang="en-US" smtClean="0"/>
+              <a:rPr lang="en-US"/>
               <a:t>Click to edit Master text styles</a:t>
             </a:r>
           </a:p>
           <a:p>
             <a:pPr lvl="1"/>
             <a:r>
-              <a:rPr lang="en-US" smtClean="0"/>
+              <a:rPr lang="en-US"/>
               <a:t>Second level</a:t>
             </a:r>
           </a:p>
           <a:p>
             <a:pPr lvl="2"/>
             <a:r>
-              <a:rPr lang="en-US" smtClean="0"/>
+              <a:rPr lang="en-US"/>
               <a:t>Third level</a:t>
             </a:r>
           </a:p>
           <a:p>
             <a:pPr lvl="3"/>
             <a:r>
-              <a:rPr lang="en-US" smtClean="0"/>
+              <a:rPr lang="en-US"/>
               <a:t>Fourth level</a:t>
             </a:r>
           </a:p>
           <a:p>
             <a:pPr lvl="4"/>
             <a:r>
-              <a:rPr lang="en-US" smtClean="0"/>
+              <a:rPr lang="en-US"/>
               <a:t>Fifth level</a:t>
             </a:r>
-            <a:endParaRPr lang="en-US"/>
           </a:p>
         </p:txBody>
       </p:sp>
@@ -9083,7 +9020,7 @@
           <a:p>
             <a:fld id="{699DC775-C286-4358-8C92-D7E584E969B3}" type="datetimeFigureOut">
               <a:rPr lang="en-US" smtClean="0"/>
-              <a:t>4/7/2019</a:t>
+              <a:t>6/27/2019</a:t>
             </a:fld>
             <a:endParaRPr lang="en-US"/>
           </a:p>
@@ -9476,7 +9413,7 @@
           <a:lstStyle/>
           <a:p>
             <a:r>
-              <a:rPr lang="en-US" sz="5400" b="1" dirty="0" err="1" smtClean="0">
+              <a:rPr lang="en-US" sz="5400" b="1" dirty="0" err="1">
                 <a:solidFill>
                   <a:schemeClr val="accent6">
                     <a:lumMod val="75000"/>
@@ -9486,7 +9423,7 @@
               <a:t>PowerPointLabs</a:t>
             </a:r>
             <a:r>
-              <a:rPr lang="en-US" sz="5400" b="1" dirty="0" smtClean="0">
+              <a:rPr lang="en-US" sz="5400" b="1" dirty="0">
                 <a:solidFill>
                   <a:schemeClr val="accent6">
                     <a:lumMod val="75000"/>
@@ -9524,7 +9461,7 @@
               <a:buNone/>
             </a:pPr>
             <a:r>
-              <a:rPr lang="en-US" b="1" dirty="0" smtClean="0">
+              <a:rPr lang="en-US" b="1" dirty="0">
                 <a:solidFill>
                   <a:srgbClr val="0070C0"/>
                 </a:solidFill>
@@ -9535,34 +9472,21 @@
           <a:p>
             <a:pPr marL="285750" indent="-285750"/>
             <a:r>
-              <a:rPr lang="en-US" b="1" dirty="0" smtClean="0">
-                <a:solidFill>
-                  <a:srgbClr val="0070C0"/>
-                </a:solidFill>
-              </a:rPr>
-              <a:t>DO </a:t>
-            </a:r>
-            <a:r>
               <a:rPr lang="en-US" b="1" dirty="0">
                 <a:solidFill>
                   <a:srgbClr val="0070C0"/>
                 </a:solidFill>
               </a:rPr>
-              <a:t>NOT SAVE </a:t>
-            </a:r>
-            <a:r>
-              <a:rPr lang="en-US" dirty="0" smtClean="0">
+              <a:t>DO NOT SAVE </a:t>
+            </a:r>
+            <a:r>
+              <a:rPr lang="en-US" dirty="0">
                 <a:solidFill>
                   <a:srgbClr val="0070C0"/>
                 </a:solidFill>
               </a:rPr>
               <a:t>these slides after testing. Keep this file in its original form.</a:t>
             </a:r>
-            <a:endParaRPr lang="en-US" dirty="0">
-              <a:solidFill>
-                <a:srgbClr val="0070C0"/>
-              </a:solidFill>
-            </a:endParaRPr>
           </a:p>
           <a:p>
             <a:pPr marL="285750" indent="-285750"/>
@@ -9572,47 +9496,7 @@
                   <a:srgbClr val="0070C0"/>
                 </a:solidFill>
               </a:rPr>
-              <a:t>If </a:t>
-            </a:r>
-            <a:r>
-              <a:rPr lang="en-US" dirty="0" smtClean="0">
-                <a:solidFill>
-                  <a:srgbClr val="0070C0"/>
-                </a:solidFill>
-              </a:rPr>
-              <a:t>your </a:t>
-            </a:r>
-            <a:r>
-              <a:rPr lang="en-US" dirty="0">
-                <a:solidFill>
-                  <a:srgbClr val="0070C0"/>
-                </a:solidFill>
-              </a:rPr>
-              <a:t>result </a:t>
-            </a:r>
-            <a:r>
-              <a:rPr lang="en-US" dirty="0" smtClean="0">
-                <a:solidFill>
-                  <a:srgbClr val="0070C0"/>
-                </a:solidFill>
-              </a:rPr>
-              <a:t>is different from the </a:t>
-            </a:r>
-            <a:r>
-              <a:rPr lang="en-US" dirty="0">
-                <a:solidFill>
-                  <a:srgbClr val="0070C0"/>
-                </a:solidFill>
-              </a:rPr>
-              <a:t>expected output, </a:t>
-            </a:r>
-            <a:r>
-              <a:rPr lang="en-US" dirty="0" smtClean="0">
-                <a:solidFill>
-                  <a:srgbClr val="0070C0"/>
-                </a:solidFill>
-              </a:rPr>
-              <a:t>please submit a bug report (attach slides/screenshots as necessary).</a:t>
+              <a:t>If your result is different from the expected output, please submit a bug report (attach slides/screenshots as necessary).</a:t>
             </a:r>
             <a:endParaRPr lang="en-SG" dirty="0">
               <a:solidFill>
@@ -9635,13 +9519,6 @@
   <p:clrMapOvr>
     <a:masterClrMapping/>
   </p:clrMapOvr>
-  <p:timing>
-    <p:tnLst>
-      <p:par>
-        <p:cTn id="1" dur="indefinite" restart="never" nodeType="tmRoot"/>
-      </p:par>
-    </p:tnLst>
-  </p:timing>
 </p:sld>
 </file>
 
@@ -9714,18 +9591,13 @@
           <a:p>
             <a:pPr algn="ctr"/>
             <a:r>
-              <a:rPr lang="en-SG" sz="1600" smtClean="0">
+              <a:rPr lang="en-SG" sz="1600">
                 <a:solidFill>
                   <a:srgbClr val="FFFFFF"/>
                 </a:solidFill>
               </a:rPr>
               <a:t>?</a:t>
             </a:r>
-            <a:endParaRPr lang="en-SG" sz="1600">
-              <a:solidFill>
-                <a:srgbClr val="FFFFFF"/>
-              </a:solidFill>
-            </a:endParaRPr>
           </a:p>
         </p:txBody>
       </p:sp>
@@ -9785,7 +9657,7 @@
           <a:p>
             <a:pPr algn="ctr"/>
             <a:r>
-              <a:rPr lang="en-US" sz="1600" dirty="0" smtClean="0">
+              <a:rPr lang="en-US" sz="1600" dirty="0">
                 <a:solidFill>
                   <a:srgbClr val="FFFFFF"/>
                 </a:solidFill>
@@ -9852,18 +9724,13 @@
           <a:p>
             <a:pPr algn="ctr"/>
             <a:r>
-              <a:rPr lang="en-SG" sz="1600" smtClean="0">
+              <a:rPr lang="en-SG" sz="1600">
                 <a:solidFill>
                   <a:srgbClr val="FFFFFF"/>
                 </a:solidFill>
               </a:rPr>
               <a:t>?</a:t>
             </a:r>
-            <a:endParaRPr lang="en-SG" sz="1600">
-              <a:solidFill>
-                <a:srgbClr val="FFFFFF"/>
-              </a:solidFill>
-            </a:endParaRPr>
           </a:p>
         </p:txBody>
       </p:sp>
@@ -9923,7 +9790,7 @@
           <a:p>
             <a:pPr algn="ctr"/>
             <a:r>
-              <a:rPr lang="en-US" sz="1600" dirty="0" smtClean="0">
+              <a:rPr lang="en-US" sz="1600" dirty="0">
                 <a:solidFill>
                   <a:srgbClr val="FFFFFF"/>
                 </a:solidFill>
@@ -10294,18 +10161,13 @@
           <a:p>
             <a:pPr algn="ctr"/>
             <a:r>
-              <a:rPr lang="en-SG" sz="1600" smtClean="0">
+              <a:rPr lang="en-SG" sz="1600">
                 <a:solidFill>
                   <a:srgbClr val="FFFFFF"/>
                 </a:solidFill>
               </a:rPr>
               <a:t>?</a:t>
             </a:r>
-            <a:endParaRPr lang="en-SG" sz="1600">
-              <a:solidFill>
-                <a:srgbClr val="FFFFFF"/>
-              </a:solidFill>
-            </a:endParaRPr>
           </a:p>
         </p:txBody>
       </p:sp>
@@ -10365,7 +10227,7 @@
           <a:p>
             <a:pPr algn="ctr"/>
             <a:r>
-              <a:rPr lang="en-US" sz="1600" dirty="0" smtClean="0">
+              <a:rPr lang="en-US" sz="1600" dirty="0">
                 <a:solidFill>
                   <a:srgbClr val="FFFFFF"/>
                 </a:solidFill>
@@ -10432,18 +10294,13 @@
           <a:p>
             <a:pPr algn="ctr"/>
             <a:r>
-              <a:rPr lang="en-SG" sz="1600" smtClean="0">
+              <a:rPr lang="en-SG" sz="1600">
                 <a:solidFill>
                   <a:srgbClr val="FFFFFF"/>
                 </a:solidFill>
               </a:rPr>
               <a:t>?</a:t>
             </a:r>
-            <a:endParaRPr lang="en-SG" sz="1600">
-              <a:solidFill>
-                <a:srgbClr val="FFFFFF"/>
-              </a:solidFill>
-            </a:endParaRPr>
           </a:p>
         </p:txBody>
       </p:sp>
@@ -10503,7 +10360,7 @@
           <a:p>
             <a:pPr algn="ctr"/>
             <a:r>
-              <a:rPr lang="en-US" sz="1600" dirty="0" smtClean="0">
+              <a:rPr lang="en-US" sz="1600" dirty="0">
                 <a:solidFill>
                   <a:srgbClr val="FFFFFF"/>
                 </a:solidFill>
@@ -10570,18 +10427,13 @@
           <a:p>
             <a:pPr algn="ctr"/>
             <a:r>
-              <a:rPr lang="en-SG" sz="1600" smtClean="0">
+              <a:rPr lang="en-SG" sz="1600">
                 <a:solidFill>
                   <a:srgbClr val="FFFFFF"/>
                 </a:solidFill>
               </a:rPr>
               <a:t>?</a:t>
             </a:r>
-            <a:endParaRPr lang="en-SG" sz="1600">
-              <a:solidFill>
-                <a:srgbClr val="FFFFFF"/>
-              </a:solidFill>
-            </a:endParaRPr>
           </a:p>
         </p:txBody>
       </p:sp>
@@ -11111,12 +10963,8 @@
           <a:lstStyle/>
           <a:p>
             <a:r>
-              <a:rPr lang="en-US" dirty="0" smtClean="0"/>
-              <a:t>Create Tooltip: </a:t>
-            </a:r>
-            <a:r>
-              <a:rPr lang="en-US" dirty="0" smtClean="0"/>
-              <a:t>Create multiple tooltips</a:t>
+              <a:rPr lang="en-US" dirty="0"/>
+              <a:t>Create Tooltip: Create multiple tooltips</a:t>
             </a:r>
             <a:endParaRPr lang="en-SG" dirty="0"/>
           </a:p>
@@ -11143,12 +10991,8 @@
           <a:lstStyle/>
           <a:p>
             <a:r>
-              <a:rPr lang="en-US" dirty="0" smtClean="0"/>
-              <a:t>Click ‘Create Tooltip’ </a:t>
-            </a:r>
-            <a:r>
-              <a:rPr lang="en-US" dirty="0" smtClean="0"/>
-              <a:t>5 times in succession.</a:t>
+              <a:rPr lang="en-US" dirty="0"/>
+              <a:t>Click ‘Create Tooltip’ 5 times in succession.</a:t>
             </a:r>
             <a:endParaRPr lang="en-SG" dirty="0"/>
           </a:p>
@@ -11164,13 +11008,6 @@
   <p:clrMapOvr>
     <a:masterClrMapping/>
   </p:clrMapOvr>
-  <p:timing>
-    <p:tnLst>
-      <p:par>
-        <p:cTn id="1" dur="indefinite" restart="never" nodeType="tmRoot"/>
-      </p:par>
-    </p:tnLst>
-  </p:timing>
 </p:sld>
 </file>
 
@@ -11201,13 +11038,6 @@
   <p:clrMapOvr>
     <a:masterClrMapping/>
   </p:clrMapOvr>
-  <p:timing>
-    <p:tnLst>
-      <p:par>
-        <p:cTn id="1" dur="indefinite" restart="never" nodeType="tmRoot"/>
-      </p:par>
-    </p:tnLst>
-  </p:timing>
 </p:sld>
 </file>
 
@@ -11230,7 +11060,13 @@
       </p:grpSpPr>
       <p:sp>
         <p:nvSpPr>
-          <p:cNvPr id="8" name="Oval 7"/>
+          <p:cNvPr id="2" name="Oval 1">
+            <a:extLst>
+              <a:ext uri="{FF2B5EF4-FFF2-40B4-BE49-F238E27FC236}">
+                <a16:creationId xmlns:a16="http://schemas.microsoft.com/office/drawing/2014/main" id="{D220FAEC-3F34-40AC-90C4-8DF52DE96852}"/>
+              </a:ext>
+            </a:extLst>
+          </p:cNvPr>
           <p:cNvSpPr/>
           <p:nvPr/>
         </p:nvSpPr>
@@ -11280,24 +11116,25 @@
           <a:p>
             <a:pPr algn="ctr"/>
             <a:r>
-              <a:rPr lang="en-SG" sz="1600" smtClean="0">
+              <a:rPr lang="en-SG" sz="1600">
                 <a:solidFill>
                   <a:srgbClr val="FFFFFF"/>
                 </a:solidFill>
               </a:rPr>
               <a:t>?</a:t>
             </a:r>
-            <a:endParaRPr lang="en-SG" sz="1600">
-              <a:solidFill>
-                <a:srgbClr val="FFFFFF"/>
-              </a:solidFill>
-            </a:endParaRPr>
-          </a:p>
-        </p:txBody>
-      </p:sp>
-      <p:sp>
-        <p:nvSpPr>
-          <p:cNvPr id="9" name="Rounded Rectangular Callout 8"/>
+          </a:p>
+        </p:txBody>
+      </p:sp>
+      <p:sp>
+        <p:nvSpPr>
+          <p:cNvPr id="3" name="Speech Bubble: Rectangle with Corners Rounded 2">
+            <a:extLst>
+              <a:ext uri="{FF2B5EF4-FFF2-40B4-BE49-F238E27FC236}">
+                <a16:creationId xmlns:a16="http://schemas.microsoft.com/office/drawing/2014/main" id="{7026585D-D5D6-447E-A822-BFABA2271EEC}"/>
+              </a:ext>
+            </a:extLst>
+          </p:cNvPr>
           <p:cNvSpPr/>
           <p:nvPr/>
         </p:nvSpPr>
@@ -11344,7 +11181,7 @@
           </a:fontRef>
         </p:style>
         <p:txBody>
-          <a:bodyPr rtlCol="0" anchor="ctr">
+          <a:bodyPr wrap="square" rtlCol="0" anchor="ctr">
             <a:normAutofit/>
           </a:bodyPr>
           <a:lstStyle/>
@@ -11360,13 +11197,19 @@
       </p:sp>
       <p:sp>
         <p:nvSpPr>
-          <p:cNvPr id="10" name="Oval 9"/>
+          <p:cNvPr id="4" name="Oval 3">
+            <a:extLst>
+              <a:ext uri="{FF2B5EF4-FFF2-40B4-BE49-F238E27FC236}">
+                <a16:creationId xmlns:a16="http://schemas.microsoft.com/office/drawing/2014/main" id="{9A8BB90C-CE84-4833-9A5F-CE9FACE77ABD}"/>
+              </a:ext>
+            </a:extLst>
+          </p:cNvPr>
           <p:cNvSpPr/>
           <p:nvPr/>
         </p:nvSpPr>
         <p:spPr>
           <a:xfrm>
-            <a:off x="2540000" y="2540000"/>
+            <a:off x="2794000" y="2794000"/>
             <a:ext cx="317500" cy="317500"/>
           </a:xfrm>
           <a:prstGeom prst="ellipse">
@@ -11410,30 +11253,31 @@
           <a:p>
             <a:pPr algn="ctr"/>
             <a:r>
-              <a:rPr lang="en-SG" sz="1600" smtClean="0">
+              <a:rPr lang="en-SG" sz="1600">
                 <a:solidFill>
                   <a:srgbClr val="FFFFFF"/>
                 </a:solidFill>
               </a:rPr>
               <a:t>?</a:t>
             </a:r>
-            <a:endParaRPr lang="en-SG" sz="1600">
-              <a:solidFill>
-                <a:srgbClr val="FFFFFF"/>
-              </a:solidFill>
-            </a:endParaRPr>
-          </a:p>
-        </p:txBody>
-      </p:sp>
-      <p:sp>
-        <p:nvSpPr>
-          <p:cNvPr id="11" name="Rounded Rectangular Callout 10"/>
+          </a:p>
+        </p:txBody>
+      </p:sp>
+      <p:sp>
+        <p:nvSpPr>
+          <p:cNvPr id="5" name="Speech Bubble: Rectangle with Corners Rounded 4">
+            <a:extLst>
+              <a:ext uri="{FF2B5EF4-FFF2-40B4-BE49-F238E27FC236}">
+                <a16:creationId xmlns:a16="http://schemas.microsoft.com/office/drawing/2014/main" id="{15F49016-14DE-491E-8A6E-D6BB0C1956D2}"/>
+              </a:ext>
+            </a:extLst>
+          </p:cNvPr>
           <p:cNvSpPr/>
           <p:nvPr/>
         </p:nvSpPr>
         <p:spPr>
           <a:xfrm>
-            <a:off x="2143119" y="984250"/>
+            <a:off x="2397119" y="1238250"/>
             <a:ext cx="1905000" cy="1270000"/>
           </a:xfrm>
           <a:prstGeom prst="wedgeRoundRectCallout">
@@ -11474,7 +11318,7 @@
           </a:fontRef>
         </p:style>
         <p:txBody>
-          <a:bodyPr rtlCol="0" anchor="ctr">
+          <a:bodyPr wrap="square" rtlCol="0" anchor="ctr">
             <a:normAutofit/>
           </a:bodyPr>
           <a:lstStyle/>
@@ -11490,13 +11334,19 @@
       </p:sp>
       <p:sp>
         <p:nvSpPr>
-          <p:cNvPr id="12" name="Oval 11"/>
+          <p:cNvPr id="6" name="Oval 5">
+            <a:extLst>
+              <a:ext uri="{FF2B5EF4-FFF2-40B4-BE49-F238E27FC236}">
+                <a16:creationId xmlns:a16="http://schemas.microsoft.com/office/drawing/2014/main" id="{EA2B30FA-5B62-44A6-B3D0-CF5AD0AD7145}"/>
+              </a:ext>
+            </a:extLst>
+          </p:cNvPr>
           <p:cNvSpPr/>
           <p:nvPr/>
         </p:nvSpPr>
         <p:spPr>
           <a:xfrm>
-            <a:off x="2540000" y="2540000"/>
+            <a:off x="3048000" y="3048000"/>
             <a:ext cx="317500" cy="317500"/>
           </a:xfrm>
           <a:prstGeom prst="ellipse">
@@ -11540,30 +11390,31 @@
           <a:p>
             <a:pPr algn="ctr"/>
             <a:r>
-              <a:rPr lang="en-SG" sz="1600" smtClean="0">
+              <a:rPr lang="en-SG" sz="1600">
                 <a:solidFill>
                   <a:srgbClr val="FFFFFF"/>
                 </a:solidFill>
               </a:rPr>
               <a:t>?</a:t>
             </a:r>
-            <a:endParaRPr lang="en-SG" sz="1600">
-              <a:solidFill>
-                <a:srgbClr val="FFFFFF"/>
-              </a:solidFill>
-            </a:endParaRPr>
-          </a:p>
-        </p:txBody>
-      </p:sp>
-      <p:sp>
-        <p:nvSpPr>
-          <p:cNvPr id="13" name="Rounded Rectangular Callout 12"/>
+          </a:p>
+        </p:txBody>
+      </p:sp>
+      <p:sp>
+        <p:nvSpPr>
+          <p:cNvPr id="7" name="Speech Bubble: Rectangle with Corners Rounded 6">
+            <a:extLst>
+              <a:ext uri="{FF2B5EF4-FFF2-40B4-BE49-F238E27FC236}">
+                <a16:creationId xmlns:a16="http://schemas.microsoft.com/office/drawing/2014/main" id="{BD713C19-D9BD-4752-BE7B-8254D91EF854}"/>
+              </a:ext>
+            </a:extLst>
+          </p:cNvPr>
           <p:cNvSpPr/>
           <p:nvPr/>
         </p:nvSpPr>
         <p:spPr>
           <a:xfrm>
-            <a:off x="2143119" y="984250"/>
+            <a:off x="2651119" y="1492250"/>
             <a:ext cx="1905000" cy="1270000"/>
           </a:xfrm>
           <a:prstGeom prst="wedgeRoundRectCallout">
@@ -11604,7 +11455,7 @@
           </a:fontRef>
         </p:style>
         <p:txBody>
-          <a:bodyPr rtlCol="0" anchor="ctr">
+          <a:bodyPr wrap="square" rtlCol="0" anchor="ctr">
             <a:normAutofit/>
           </a:bodyPr>
           <a:lstStyle/>
@@ -11620,13 +11471,19 @@
       </p:sp>
       <p:sp>
         <p:nvSpPr>
-          <p:cNvPr id="14" name="Oval 13"/>
+          <p:cNvPr id="8" name="Oval 7">
+            <a:extLst>
+              <a:ext uri="{FF2B5EF4-FFF2-40B4-BE49-F238E27FC236}">
+                <a16:creationId xmlns:a16="http://schemas.microsoft.com/office/drawing/2014/main" id="{9AB7F7CD-D7A0-41D1-B747-3B0AF714C17F}"/>
+              </a:ext>
+            </a:extLst>
+          </p:cNvPr>
           <p:cNvSpPr/>
           <p:nvPr/>
         </p:nvSpPr>
         <p:spPr>
           <a:xfrm>
-            <a:off x="2540000" y="2540000"/>
+            <a:off x="3302000" y="3302000"/>
             <a:ext cx="317500" cy="317500"/>
           </a:xfrm>
           <a:prstGeom prst="ellipse">
@@ -11670,30 +11527,31 @@
           <a:p>
             <a:pPr algn="ctr"/>
             <a:r>
-              <a:rPr lang="en-SG" sz="1600" smtClean="0">
+              <a:rPr lang="en-SG" sz="1600">
                 <a:solidFill>
                   <a:srgbClr val="FFFFFF"/>
                 </a:solidFill>
               </a:rPr>
               <a:t>?</a:t>
             </a:r>
-            <a:endParaRPr lang="en-SG" sz="1600">
-              <a:solidFill>
-                <a:srgbClr val="FFFFFF"/>
-              </a:solidFill>
-            </a:endParaRPr>
-          </a:p>
-        </p:txBody>
-      </p:sp>
-      <p:sp>
-        <p:nvSpPr>
-          <p:cNvPr id="15" name="Rounded Rectangular Callout 14"/>
+          </a:p>
+        </p:txBody>
+      </p:sp>
+      <p:sp>
+        <p:nvSpPr>
+          <p:cNvPr id="9" name="Speech Bubble: Rectangle with Corners Rounded 8">
+            <a:extLst>
+              <a:ext uri="{FF2B5EF4-FFF2-40B4-BE49-F238E27FC236}">
+                <a16:creationId xmlns:a16="http://schemas.microsoft.com/office/drawing/2014/main" id="{8852CDFB-EECA-490D-BD4E-0C48301F4975}"/>
+              </a:ext>
+            </a:extLst>
+          </p:cNvPr>
           <p:cNvSpPr/>
           <p:nvPr/>
         </p:nvSpPr>
         <p:spPr>
           <a:xfrm>
-            <a:off x="2143119" y="984250"/>
+            <a:off x="2905119" y="1746250"/>
             <a:ext cx="1905000" cy="1270000"/>
           </a:xfrm>
           <a:prstGeom prst="wedgeRoundRectCallout">
@@ -11734,7 +11592,7 @@
           </a:fontRef>
         </p:style>
         <p:txBody>
-          <a:bodyPr rtlCol="0" anchor="ctr">
+          <a:bodyPr wrap="square" rtlCol="0" anchor="ctr">
             <a:normAutofit/>
           </a:bodyPr>
           <a:lstStyle/>
@@ -11750,13 +11608,19 @@
       </p:sp>
       <p:sp>
         <p:nvSpPr>
-          <p:cNvPr id="16" name="Oval 15"/>
+          <p:cNvPr id="10" name="Oval 9">
+            <a:extLst>
+              <a:ext uri="{FF2B5EF4-FFF2-40B4-BE49-F238E27FC236}">
+                <a16:creationId xmlns:a16="http://schemas.microsoft.com/office/drawing/2014/main" id="{C0982F9F-2BF8-4085-82E5-7594DC23EA08}"/>
+              </a:ext>
+            </a:extLst>
+          </p:cNvPr>
           <p:cNvSpPr/>
           <p:nvPr/>
         </p:nvSpPr>
         <p:spPr>
           <a:xfrm>
-            <a:off x="2540000" y="2540000"/>
+            <a:off x="3556000" y="3556000"/>
             <a:ext cx="317500" cy="317500"/>
           </a:xfrm>
           <a:prstGeom prst="ellipse">
@@ -11800,30 +11664,31 @@
           <a:p>
             <a:pPr algn="ctr"/>
             <a:r>
-              <a:rPr lang="en-SG" sz="1600" smtClean="0">
+              <a:rPr lang="en-SG" sz="1600">
                 <a:solidFill>
                   <a:srgbClr val="FFFFFF"/>
                 </a:solidFill>
               </a:rPr>
               <a:t>?</a:t>
             </a:r>
-            <a:endParaRPr lang="en-SG" sz="1600">
-              <a:solidFill>
-                <a:srgbClr val="FFFFFF"/>
-              </a:solidFill>
-            </a:endParaRPr>
-          </a:p>
-        </p:txBody>
-      </p:sp>
-      <p:sp>
-        <p:nvSpPr>
-          <p:cNvPr id="17" name="Rounded Rectangular Callout 16"/>
+          </a:p>
+        </p:txBody>
+      </p:sp>
+      <p:sp>
+        <p:nvSpPr>
+          <p:cNvPr id="11" name="Speech Bubble: Rectangle with Corners Rounded 10">
+            <a:extLst>
+              <a:ext uri="{FF2B5EF4-FFF2-40B4-BE49-F238E27FC236}">
+                <a16:creationId xmlns:a16="http://schemas.microsoft.com/office/drawing/2014/main" id="{43E5418F-1861-46B4-A816-6B1EBAA52E81}"/>
+              </a:ext>
+            </a:extLst>
+          </p:cNvPr>
           <p:cNvSpPr/>
           <p:nvPr/>
         </p:nvSpPr>
         <p:spPr>
           <a:xfrm>
-            <a:off x="2143119" y="984250"/>
+            <a:off x="3159119" y="2000250"/>
             <a:ext cx="1905000" cy="1270000"/>
           </a:xfrm>
           <a:prstGeom prst="wedgeRoundRectCallout">
@@ -11864,7 +11729,7 @@
           </a:fontRef>
         </p:style>
         <p:txBody>
-          <a:bodyPr rtlCol="0" anchor="ctr">
+          <a:bodyPr wrap="square" rtlCol="0" anchor="ctr">
             <a:normAutofit/>
           </a:bodyPr>
           <a:lstStyle/>
@@ -11881,7 +11746,7 @@
     </p:spTree>
     <p:extLst>
       <p:ext uri="{BB962C8B-B14F-4D97-AF65-F5344CB8AC3E}">
-        <p14:creationId xmlns:p14="http://schemas.microsoft.com/office/powerpoint/2010/main" val="1714793549"/>
+        <p14:creationId xmlns:p14="http://schemas.microsoft.com/office/powerpoint/2010/main" val="1115305802"/>
       </p:ext>
     </p:extLst>
   </p:cSld>
@@ -11898,7 +11763,7 @@
                 <p:stCondLst>
                   <p:cond evt="onClick" delay="0">
                     <p:tgtEl>
-                      <p:spTgt spid="8"/>
+                      <p:spTgt spid="2"/>
                     </p:tgtEl>
                   </p:cond>
                 </p:stCondLst>
@@ -11932,7 +11797,7 @@
                                           </p:stCondLst>
                                         </p:cTn>
                                         <p:tgtEl>
-                                          <p:spTgt spid="9"/>
+                                          <p:spTgt spid="3"/>
                                         </p:tgtEl>
                                         <p:attrNameLst>
                                           <p:attrName>style.visibility</p:attrName>
@@ -11946,7 +11811,7 @@
                                       <p:cBhvr>
                                         <p:cTn id="7" dur="500"/>
                                         <p:tgtEl>
-                                          <p:spTgt spid="9"/>
+                                          <p:spTgt spid="3"/>
                                         </p:tgtEl>
                                       </p:cBhvr>
                                     </p:animEffect>
@@ -11981,13 +11846,400 @@
                                       <p:cBhvr>
                                         <p:cTn id="11" dur="500"/>
                                         <p:tgtEl>
+                                          <p:spTgt spid="3"/>
+                                        </p:tgtEl>
+                                      </p:cBhvr>
+                                    </p:animEffect>
+                                    <p:set>
+                                      <p:cBhvr>
+                                        <p:cTn id="12" dur="1" fill="hold">
+                                          <p:stCondLst>
+                                            <p:cond delay="499"/>
+                                          </p:stCondLst>
+                                        </p:cTn>
+                                        <p:tgtEl>
+                                          <p:spTgt spid="3"/>
+                                        </p:tgtEl>
+                                        <p:attrNameLst>
+                                          <p:attrName>style.visibility</p:attrName>
+                                        </p:attrNameLst>
+                                      </p:cBhvr>
+                                      <p:to>
+                                        <p:strVal val="hidden"/>
+                                      </p:to>
+                                    </p:set>
+                                  </p:childTnLst>
+                                </p:cTn>
+                              </p:par>
+                            </p:childTnLst>
+                          </p:cTn>
+                        </p:par>
+                      </p:childTnLst>
+                    </p:cTn>
+                  </p:par>
+                </p:childTnLst>
+              </p:cTn>
+              <p:nextCondLst>
+                <p:cond evt="onClick" delay="0">
+                  <p:tgtEl>
+                    <p:spTgt spid="2"/>
+                  </p:tgtEl>
+                </p:cond>
+              </p:nextCondLst>
+            </p:seq>
+            <p:seq concurrent="1" nextAc="seek">
+              <p:cTn id="13" restart="whenNotActive" fill="hold" evtFilter="cancelBubble" nodeType="interactiveSeq">
+                <p:stCondLst>
+                  <p:cond evt="onClick" delay="0">
+                    <p:tgtEl>
+                      <p:spTgt spid="4"/>
+                    </p:tgtEl>
+                  </p:cond>
+                </p:stCondLst>
+                <p:endSync evt="end" delay="0">
+                  <p:rtn val="all"/>
+                </p:endSync>
+                <p:childTnLst>
+                  <p:par>
+                    <p:cTn id="14" fill="hold">
+                      <p:stCondLst>
+                        <p:cond delay="0"/>
+                      </p:stCondLst>
+                      <p:childTnLst>
+                        <p:par>
+                          <p:cTn id="15" fill="hold">
+                            <p:stCondLst>
+                              <p:cond delay="0"/>
+                            </p:stCondLst>
+                            <p:childTnLst>
+                              <p:par>
+                                <p:cTn id="16" presetID="10" presetClass="entr" presetSubtype="0" fill="hold" grpId="0" nodeType="clickEffect">
+                                  <p:stCondLst>
+                                    <p:cond delay="0"/>
+                                  </p:stCondLst>
+                                  <p:childTnLst>
+                                    <p:set>
+                                      <p:cBhvr>
+                                        <p:cTn id="17" dur="1" fill="hold">
+                                          <p:stCondLst>
+                                            <p:cond delay="0"/>
+                                          </p:stCondLst>
+                                        </p:cTn>
+                                        <p:tgtEl>
+                                          <p:spTgt spid="5"/>
+                                        </p:tgtEl>
+                                        <p:attrNameLst>
+                                          <p:attrName>style.visibility</p:attrName>
+                                        </p:attrNameLst>
+                                      </p:cBhvr>
+                                      <p:to>
+                                        <p:strVal val="visible"/>
+                                      </p:to>
+                                    </p:set>
+                                    <p:animEffect transition="in" filter="fade">
+                                      <p:cBhvr>
+                                        <p:cTn id="18" dur="500"/>
+                                        <p:tgtEl>
+                                          <p:spTgt spid="5"/>
+                                        </p:tgtEl>
+                                      </p:cBhvr>
+                                    </p:animEffect>
+                                  </p:childTnLst>
+                                </p:cTn>
+                              </p:par>
+                            </p:childTnLst>
+                          </p:cTn>
+                        </p:par>
+                      </p:childTnLst>
+                    </p:cTn>
+                  </p:par>
+                  <p:par>
+                    <p:cTn id="19" fill="hold">
+                      <p:stCondLst>
+                        <p:cond delay="indefinite"/>
+                      </p:stCondLst>
+                      <p:childTnLst>
+                        <p:par>
+                          <p:cTn id="20" fill="hold">
+                            <p:stCondLst>
+                              <p:cond delay="0"/>
+                            </p:stCondLst>
+                            <p:childTnLst>
+                              <p:par>
+                                <p:cTn id="21" presetID="10" presetClass="exit" presetSubtype="0" fill="hold" grpId="1" nodeType="clickEffect">
+                                  <p:stCondLst>
+                                    <p:cond delay="0"/>
+                                  </p:stCondLst>
+                                  <p:childTnLst>
+                                    <p:animEffect transition="out" filter="fade">
+                                      <p:cBhvr>
+                                        <p:cTn id="22" dur="500"/>
+                                        <p:tgtEl>
+                                          <p:spTgt spid="5"/>
+                                        </p:tgtEl>
+                                      </p:cBhvr>
+                                    </p:animEffect>
+                                    <p:set>
+                                      <p:cBhvr>
+                                        <p:cTn id="23" dur="1" fill="hold">
+                                          <p:stCondLst>
+                                            <p:cond delay="499"/>
+                                          </p:stCondLst>
+                                        </p:cTn>
+                                        <p:tgtEl>
+                                          <p:spTgt spid="5"/>
+                                        </p:tgtEl>
+                                        <p:attrNameLst>
+                                          <p:attrName>style.visibility</p:attrName>
+                                        </p:attrNameLst>
+                                      </p:cBhvr>
+                                      <p:to>
+                                        <p:strVal val="hidden"/>
+                                      </p:to>
+                                    </p:set>
+                                  </p:childTnLst>
+                                </p:cTn>
+                              </p:par>
+                            </p:childTnLst>
+                          </p:cTn>
+                        </p:par>
+                      </p:childTnLst>
+                    </p:cTn>
+                  </p:par>
+                </p:childTnLst>
+              </p:cTn>
+              <p:nextCondLst>
+                <p:cond evt="onClick" delay="0">
+                  <p:tgtEl>
+                    <p:spTgt spid="4"/>
+                  </p:tgtEl>
+                </p:cond>
+              </p:nextCondLst>
+            </p:seq>
+            <p:seq concurrent="1" nextAc="seek">
+              <p:cTn id="24" restart="whenNotActive" fill="hold" evtFilter="cancelBubble" nodeType="interactiveSeq">
+                <p:stCondLst>
+                  <p:cond evt="onClick" delay="0">
+                    <p:tgtEl>
+                      <p:spTgt spid="6"/>
+                    </p:tgtEl>
+                  </p:cond>
+                </p:stCondLst>
+                <p:endSync evt="end" delay="0">
+                  <p:rtn val="all"/>
+                </p:endSync>
+                <p:childTnLst>
+                  <p:par>
+                    <p:cTn id="25" fill="hold">
+                      <p:stCondLst>
+                        <p:cond delay="0"/>
+                      </p:stCondLst>
+                      <p:childTnLst>
+                        <p:par>
+                          <p:cTn id="26" fill="hold">
+                            <p:stCondLst>
+                              <p:cond delay="0"/>
+                            </p:stCondLst>
+                            <p:childTnLst>
+                              <p:par>
+                                <p:cTn id="27" presetID="10" presetClass="entr" presetSubtype="0" fill="hold" grpId="0" nodeType="clickEffect">
+                                  <p:stCondLst>
+                                    <p:cond delay="0"/>
+                                  </p:stCondLst>
+                                  <p:childTnLst>
+                                    <p:set>
+                                      <p:cBhvr>
+                                        <p:cTn id="28" dur="1" fill="hold">
+                                          <p:stCondLst>
+                                            <p:cond delay="0"/>
+                                          </p:stCondLst>
+                                        </p:cTn>
+                                        <p:tgtEl>
+                                          <p:spTgt spid="7"/>
+                                        </p:tgtEl>
+                                        <p:attrNameLst>
+                                          <p:attrName>style.visibility</p:attrName>
+                                        </p:attrNameLst>
+                                      </p:cBhvr>
+                                      <p:to>
+                                        <p:strVal val="visible"/>
+                                      </p:to>
+                                    </p:set>
+                                    <p:animEffect transition="in" filter="fade">
+                                      <p:cBhvr>
+                                        <p:cTn id="29" dur="500"/>
+                                        <p:tgtEl>
+                                          <p:spTgt spid="7"/>
+                                        </p:tgtEl>
+                                      </p:cBhvr>
+                                    </p:animEffect>
+                                  </p:childTnLst>
+                                </p:cTn>
+                              </p:par>
+                            </p:childTnLst>
+                          </p:cTn>
+                        </p:par>
+                      </p:childTnLst>
+                    </p:cTn>
+                  </p:par>
+                  <p:par>
+                    <p:cTn id="30" fill="hold">
+                      <p:stCondLst>
+                        <p:cond delay="indefinite"/>
+                      </p:stCondLst>
+                      <p:childTnLst>
+                        <p:par>
+                          <p:cTn id="31" fill="hold">
+                            <p:stCondLst>
+                              <p:cond delay="0"/>
+                            </p:stCondLst>
+                            <p:childTnLst>
+                              <p:par>
+                                <p:cTn id="32" presetID="10" presetClass="exit" presetSubtype="0" fill="hold" grpId="1" nodeType="clickEffect">
+                                  <p:stCondLst>
+                                    <p:cond delay="0"/>
+                                  </p:stCondLst>
+                                  <p:childTnLst>
+                                    <p:animEffect transition="out" filter="fade">
+                                      <p:cBhvr>
+                                        <p:cTn id="33" dur="500"/>
+                                        <p:tgtEl>
+                                          <p:spTgt spid="7"/>
+                                        </p:tgtEl>
+                                      </p:cBhvr>
+                                    </p:animEffect>
+                                    <p:set>
+                                      <p:cBhvr>
+                                        <p:cTn id="34" dur="1" fill="hold">
+                                          <p:stCondLst>
+                                            <p:cond delay="499"/>
+                                          </p:stCondLst>
+                                        </p:cTn>
+                                        <p:tgtEl>
+                                          <p:spTgt spid="7"/>
+                                        </p:tgtEl>
+                                        <p:attrNameLst>
+                                          <p:attrName>style.visibility</p:attrName>
+                                        </p:attrNameLst>
+                                      </p:cBhvr>
+                                      <p:to>
+                                        <p:strVal val="hidden"/>
+                                      </p:to>
+                                    </p:set>
+                                  </p:childTnLst>
+                                </p:cTn>
+                              </p:par>
+                            </p:childTnLst>
+                          </p:cTn>
+                        </p:par>
+                      </p:childTnLst>
+                    </p:cTn>
+                  </p:par>
+                </p:childTnLst>
+              </p:cTn>
+              <p:nextCondLst>
+                <p:cond evt="onClick" delay="0">
+                  <p:tgtEl>
+                    <p:spTgt spid="6"/>
+                  </p:tgtEl>
+                </p:cond>
+              </p:nextCondLst>
+            </p:seq>
+            <p:seq concurrent="1" nextAc="seek">
+              <p:cTn id="35" restart="whenNotActive" fill="hold" evtFilter="cancelBubble" nodeType="interactiveSeq">
+                <p:stCondLst>
+                  <p:cond evt="onClick" delay="0">
+                    <p:tgtEl>
+                      <p:spTgt spid="8"/>
+                    </p:tgtEl>
+                  </p:cond>
+                </p:stCondLst>
+                <p:endSync evt="end" delay="0">
+                  <p:rtn val="all"/>
+                </p:endSync>
+                <p:childTnLst>
+                  <p:par>
+                    <p:cTn id="36" fill="hold">
+                      <p:stCondLst>
+                        <p:cond delay="0"/>
+                      </p:stCondLst>
+                      <p:childTnLst>
+                        <p:par>
+                          <p:cTn id="37" fill="hold">
+                            <p:stCondLst>
+                              <p:cond delay="0"/>
+                            </p:stCondLst>
+                            <p:childTnLst>
+                              <p:par>
+                                <p:cTn id="38" presetID="10" presetClass="entr" presetSubtype="0" fill="hold" grpId="0" nodeType="clickEffect">
+                                  <p:stCondLst>
+                                    <p:cond delay="0"/>
+                                  </p:stCondLst>
+                                  <p:childTnLst>
+                                    <p:set>
+                                      <p:cBhvr>
+                                        <p:cTn id="39" dur="1" fill="hold">
+                                          <p:stCondLst>
+                                            <p:cond delay="0"/>
+                                          </p:stCondLst>
+                                        </p:cTn>
+                                        <p:tgtEl>
+                                          <p:spTgt spid="9"/>
+                                        </p:tgtEl>
+                                        <p:attrNameLst>
+                                          <p:attrName>style.visibility</p:attrName>
+                                        </p:attrNameLst>
+                                      </p:cBhvr>
+                                      <p:to>
+                                        <p:strVal val="visible"/>
+                                      </p:to>
+                                    </p:set>
+                                    <p:animEffect transition="in" filter="fade">
+                                      <p:cBhvr>
+                                        <p:cTn id="40" dur="500"/>
+                                        <p:tgtEl>
+                                          <p:spTgt spid="9"/>
+                                        </p:tgtEl>
+                                      </p:cBhvr>
+                                    </p:animEffect>
+                                  </p:childTnLst>
+                                </p:cTn>
+                              </p:par>
+                            </p:childTnLst>
+                          </p:cTn>
+                        </p:par>
+                      </p:childTnLst>
+                    </p:cTn>
+                  </p:par>
+                  <p:par>
+                    <p:cTn id="41" fill="hold">
+                      <p:stCondLst>
+                        <p:cond delay="indefinite"/>
+                      </p:stCondLst>
+                      <p:childTnLst>
+                        <p:par>
+                          <p:cTn id="42" fill="hold">
+                            <p:stCondLst>
+                              <p:cond delay="0"/>
+                            </p:stCondLst>
+                            <p:childTnLst>
+                              <p:par>
+                                <p:cTn id="43" presetID="10" presetClass="exit" presetSubtype="0" fill="hold" grpId="1" nodeType="clickEffect">
+                                  <p:stCondLst>
+                                    <p:cond delay="0"/>
+                                  </p:stCondLst>
+                                  <p:childTnLst>
+                                    <p:animEffect transition="out" filter="fade">
+                                      <p:cBhvr>
+                                        <p:cTn id="44" dur="500"/>
+                                        <p:tgtEl>
                                           <p:spTgt spid="9"/>
                                         </p:tgtEl>
                                       </p:cBhvr>
                                     </p:animEffect>
                                     <p:set>
                                       <p:cBhvr>
-                                        <p:cTn id="12" dur="1" fill="hold">
+                                        <p:cTn id="45" dur="1" fill="hold">
                                           <p:stCondLst>
                                             <p:cond delay="499"/>
                                           </p:stCondLst>
@@ -12023,7 +12275,7 @@
               </p:nextCondLst>
             </p:seq>
             <p:seq concurrent="1" nextAc="seek">
-              <p:cTn id="13" restart="whenNotActive" fill="hold" evtFilter="cancelBubble" nodeType="interactiveSeq">
+              <p:cTn id="46" restart="whenNotActive" fill="hold" evtFilter="cancelBubble" nodeType="interactiveSeq">
                 <p:stCondLst>
                   <p:cond evt="onClick" delay="0">
                     <p:tgtEl>
@@ -12036,26 +12288,26 @@
                 </p:endSync>
                 <p:childTnLst>
                   <p:par>
-                    <p:cTn id="14" fill="hold">
+                    <p:cTn id="47" fill="hold">
                       <p:stCondLst>
                         <p:cond delay="0"/>
                       </p:stCondLst>
                       <p:childTnLst>
                         <p:par>
-                          <p:cTn id="15" fill="hold">
+                          <p:cTn id="48" fill="hold">
                             <p:stCondLst>
                               <p:cond delay="0"/>
                             </p:stCondLst>
                             <p:childTnLst>
                               <p:par>
-                                <p:cTn id="16" presetID="10" presetClass="entr" presetSubtype="0" fill="hold" grpId="0" nodeType="clickEffect">
+                                <p:cTn id="49" presetID="10" presetClass="entr" presetSubtype="0" fill="hold" grpId="0" nodeType="clickEffect">
                                   <p:stCondLst>
                                     <p:cond delay="0"/>
                                   </p:stCondLst>
                                   <p:childTnLst>
                                     <p:set>
                                       <p:cBhvr>
-                                        <p:cTn id="17" dur="1" fill="hold">
+                                        <p:cTn id="50" dur="1" fill="hold">
                                           <p:stCondLst>
                                             <p:cond delay="0"/>
                                           </p:stCondLst>
@@ -12073,7 +12325,7 @@
                                     </p:set>
                                     <p:animEffect transition="in" filter="fade">
                                       <p:cBhvr>
-                                        <p:cTn id="18" dur="500"/>
+                                        <p:cTn id="51" dur="500"/>
                                         <p:tgtEl>
                                           <p:spTgt spid="11"/>
                                         </p:tgtEl>
@@ -12089,26 +12341,26 @@
                     </p:cTn>
                   </p:par>
                   <p:par>
-                    <p:cTn id="19" fill="hold">
+                    <p:cTn id="52" fill="hold">
                       <p:stCondLst>
                         <p:cond delay="indefinite"/>
                       </p:stCondLst>
                       <p:childTnLst>
                         <p:par>
-                          <p:cTn id="20" fill="hold">
+                          <p:cTn id="53" fill="hold">
                             <p:stCondLst>
                               <p:cond delay="0"/>
                             </p:stCondLst>
                             <p:childTnLst>
                               <p:par>
-                                <p:cTn id="21" presetID="10" presetClass="exit" presetSubtype="0" fill="hold" grpId="1" nodeType="clickEffect">
+                                <p:cTn id="54" presetID="10" presetClass="exit" presetSubtype="0" fill="hold" grpId="1" nodeType="clickEffect">
                                   <p:stCondLst>
                                     <p:cond delay="0"/>
                                   </p:stCondLst>
                                   <p:childTnLst>
                                     <p:animEffect transition="out" filter="fade">
                                       <p:cBhvr>
-                                        <p:cTn id="22" dur="500"/>
+                                        <p:cTn id="55" dur="500"/>
                                         <p:tgtEl>
                                           <p:spTgt spid="11"/>
                                         </p:tgtEl>
@@ -12116,7 +12368,7 @@
                                     </p:animEffect>
                                     <p:set>
                                       <p:cBhvr>
-                                        <p:cTn id="23" dur="1" fill="hold">
+                                        <p:cTn id="56" dur="1" fill="hold">
                                           <p:stCondLst>
                                             <p:cond delay="499"/>
                                           </p:stCondLst>
@@ -12151,408 +12403,21 @@
                 </p:cond>
               </p:nextCondLst>
             </p:seq>
-            <p:seq concurrent="1" nextAc="seek">
-              <p:cTn id="24" restart="whenNotActive" fill="hold" evtFilter="cancelBubble" nodeType="interactiveSeq">
-                <p:stCondLst>
-                  <p:cond evt="onClick" delay="0">
-                    <p:tgtEl>
-                      <p:spTgt spid="12"/>
-                    </p:tgtEl>
-                  </p:cond>
-                </p:stCondLst>
-                <p:endSync evt="end" delay="0">
-                  <p:rtn val="all"/>
-                </p:endSync>
-                <p:childTnLst>
-                  <p:par>
-                    <p:cTn id="25" fill="hold">
-                      <p:stCondLst>
-                        <p:cond delay="0"/>
-                      </p:stCondLst>
-                      <p:childTnLst>
-                        <p:par>
-                          <p:cTn id="26" fill="hold">
-                            <p:stCondLst>
-                              <p:cond delay="0"/>
-                            </p:stCondLst>
-                            <p:childTnLst>
-                              <p:par>
-                                <p:cTn id="27" presetID="10" presetClass="entr" presetSubtype="0" fill="hold" grpId="0" nodeType="clickEffect">
-                                  <p:stCondLst>
-                                    <p:cond delay="0"/>
-                                  </p:stCondLst>
-                                  <p:childTnLst>
-                                    <p:set>
-                                      <p:cBhvr>
-                                        <p:cTn id="28" dur="1" fill="hold">
-                                          <p:stCondLst>
-                                            <p:cond delay="0"/>
-                                          </p:stCondLst>
-                                        </p:cTn>
-                                        <p:tgtEl>
-                                          <p:spTgt spid="13"/>
-                                        </p:tgtEl>
-                                        <p:attrNameLst>
-                                          <p:attrName>style.visibility</p:attrName>
-                                        </p:attrNameLst>
-                                      </p:cBhvr>
-                                      <p:to>
-                                        <p:strVal val="visible"/>
-                                      </p:to>
-                                    </p:set>
-                                    <p:animEffect transition="in" filter="fade">
-                                      <p:cBhvr>
-                                        <p:cTn id="29" dur="500"/>
-                                        <p:tgtEl>
-                                          <p:spTgt spid="13"/>
-                                        </p:tgtEl>
-                                      </p:cBhvr>
-                                    </p:animEffect>
-                                  </p:childTnLst>
-                                </p:cTn>
-                              </p:par>
-                            </p:childTnLst>
-                          </p:cTn>
-                        </p:par>
-                      </p:childTnLst>
-                    </p:cTn>
-                  </p:par>
-                  <p:par>
-                    <p:cTn id="30" fill="hold">
-                      <p:stCondLst>
-                        <p:cond delay="indefinite"/>
-                      </p:stCondLst>
-                      <p:childTnLst>
-                        <p:par>
-                          <p:cTn id="31" fill="hold">
-                            <p:stCondLst>
-                              <p:cond delay="0"/>
-                            </p:stCondLst>
-                            <p:childTnLst>
-                              <p:par>
-                                <p:cTn id="32" presetID="10" presetClass="exit" presetSubtype="0" fill="hold" grpId="1" nodeType="clickEffect">
-                                  <p:stCondLst>
-                                    <p:cond delay="0"/>
-                                  </p:stCondLst>
-                                  <p:childTnLst>
-                                    <p:animEffect transition="out" filter="fade">
-                                      <p:cBhvr>
-                                        <p:cTn id="33" dur="500"/>
-                                        <p:tgtEl>
-                                          <p:spTgt spid="13"/>
-                                        </p:tgtEl>
-                                      </p:cBhvr>
-                                    </p:animEffect>
-                                    <p:set>
-                                      <p:cBhvr>
-                                        <p:cTn id="34" dur="1" fill="hold">
-                                          <p:stCondLst>
-                                            <p:cond delay="499"/>
-                                          </p:stCondLst>
-                                        </p:cTn>
-                                        <p:tgtEl>
-                                          <p:spTgt spid="13"/>
-                                        </p:tgtEl>
-                                        <p:attrNameLst>
-                                          <p:attrName>style.visibility</p:attrName>
-                                        </p:attrNameLst>
-                                      </p:cBhvr>
-                                      <p:to>
-                                        <p:strVal val="hidden"/>
-                                      </p:to>
-                                    </p:set>
-                                  </p:childTnLst>
-                                </p:cTn>
-                              </p:par>
-                            </p:childTnLst>
-                          </p:cTn>
-                        </p:par>
-                      </p:childTnLst>
-                    </p:cTn>
-                  </p:par>
-                </p:childTnLst>
-              </p:cTn>
-              <p:nextCondLst>
-                <p:cond evt="onClick" delay="0">
-                  <p:tgtEl>
-                    <p:spTgt spid="12"/>
-                  </p:tgtEl>
-                </p:cond>
-              </p:nextCondLst>
-            </p:seq>
-            <p:seq concurrent="1" nextAc="seek">
-              <p:cTn id="35" restart="whenNotActive" fill="hold" evtFilter="cancelBubble" nodeType="interactiveSeq">
-                <p:stCondLst>
-                  <p:cond evt="onClick" delay="0">
-                    <p:tgtEl>
-                      <p:spTgt spid="14"/>
-                    </p:tgtEl>
-                  </p:cond>
-                </p:stCondLst>
-                <p:endSync evt="end" delay="0">
-                  <p:rtn val="all"/>
-                </p:endSync>
-                <p:childTnLst>
-                  <p:par>
-                    <p:cTn id="36" fill="hold">
-                      <p:stCondLst>
-                        <p:cond delay="0"/>
-                      </p:stCondLst>
-                      <p:childTnLst>
-                        <p:par>
-                          <p:cTn id="37" fill="hold">
-                            <p:stCondLst>
-                              <p:cond delay="0"/>
-                            </p:stCondLst>
-                            <p:childTnLst>
-                              <p:par>
-                                <p:cTn id="38" presetID="10" presetClass="entr" presetSubtype="0" fill="hold" grpId="0" nodeType="clickEffect">
-                                  <p:stCondLst>
-                                    <p:cond delay="0"/>
-                                  </p:stCondLst>
-                                  <p:childTnLst>
-                                    <p:set>
-                                      <p:cBhvr>
-                                        <p:cTn id="39" dur="1" fill="hold">
-                                          <p:stCondLst>
-                                            <p:cond delay="0"/>
-                                          </p:stCondLst>
-                                        </p:cTn>
-                                        <p:tgtEl>
-                                          <p:spTgt spid="15"/>
-                                        </p:tgtEl>
-                                        <p:attrNameLst>
-                                          <p:attrName>style.visibility</p:attrName>
-                                        </p:attrNameLst>
-                                      </p:cBhvr>
-                                      <p:to>
-                                        <p:strVal val="visible"/>
-                                      </p:to>
-                                    </p:set>
-                                    <p:animEffect transition="in" filter="fade">
-                                      <p:cBhvr>
-                                        <p:cTn id="40" dur="500"/>
-                                        <p:tgtEl>
-                                          <p:spTgt spid="15"/>
-                                        </p:tgtEl>
-                                      </p:cBhvr>
-                                    </p:animEffect>
-                                  </p:childTnLst>
-                                </p:cTn>
-                              </p:par>
-                            </p:childTnLst>
-                          </p:cTn>
-                        </p:par>
-                      </p:childTnLst>
-                    </p:cTn>
-                  </p:par>
-                  <p:par>
-                    <p:cTn id="41" fill="hold">
-                      <p:stCondLst>
-                        <p:cond delay="indefinite"/>
-                      </p:stCondLst>
-                      <p:childTnLst>
-                        <p:par>
-                          <p:cTn id="42" fill="hold">
-                            <p:stCondLst>
-                              <p:cond delay="0"/>
-                            </p:stCondLst>
-                            <p:childTnLst>
-                              <p:par>
-                                <p:cTn id="43" presetID="10" presetClass="exit" presetSubtype="0" fill="hold" grpId="1" nodeType="clickEffect">
-                                  <p:stCondLst>
-                                    <p:cond delay="0"/>
-                                  </p:stCondLst>
-                                  <p:childTnLst>
-                                    <p:animEffect transition="out" filter="fade">
-                                      <p:cBhvr>
-                                        <p:cTn id="44" dur="500"/>
-                                        <p:tgtEl>
-                                          <p:spTgt spid="15"/>
-                                        </p:tgtEl>
-                                      </p:cBhvr>
-                                    </p:animEffect>
-                                    <p:set>
-                                      <p:cBhvr>
-                                        <p:cTn id="45" dur="1" fill="hold">
-                                          <p:stCondLst>
-                                            <p:cond delay="499"/>
-                                          </p:stCondLst>
-                                        </p:cTn>
-                                        <p:tgtEl>
-                                          <p:spTgt spid="15"/>
-                                        </p:tgtEl>
-                                        <p:attrNameLst>
-                                          <p:attrName>style.visibility</p:attrName>
-                                        </p:attrNameLst>
-                                      </p:cBhvr>
-                                      <p:to>
-                                        <p:strVal val="hidden"/>
-                                      </p:to>
-                                    </p:set>
-                                  </p:childTnLst>
-                                </p:cTn>
-                              </p:par>
-                            </p:childTnLst>
-                          </p:cTn>
-                        </p:par>
-                      </p:childTnLst>
-                    </p:cTn>
-                  </p:par>
-                </p:childTnLst>
-              </p:cTn>
-              <p:nextCondLst>
-                <p:cond evt="onClick" delay="0">
-                  <p:tgtEl>
-                    <p:spTgt spid="14"/>
-                  </p:tgtEl>
-                </p:cond>
-              </p:nextCondLst>
-            </p:seq>
-            <p:seq concurrent="1" nextAc="seek">
-              <p:cTn id="46" restart="whenNotActive" fill="hold" evtFilter="cancelBubble" nodeType="interactiveSeq">
-                <p:stCondLst>
-                  <p:cond evt="onClick" delay="0">
-                    <p:tgtEl>
-                      <p:spTgt spid="16"/>
-                    </p:tgtEl>
-                  </p:cond>
-                </p:stCondLst>
-                <p:endSync evt="end" delay="0">
-                  <p:rtn val="all"/>
-                </p:endSync>
-                <p:childTnLst>
-                  <p:par>
-                    <p:cTn id="47" fill="hold">
-                      <p:stCondLst>
-                        <p:cond delay="0"/>
-                      </p:stCondLst>
-                      <p:childTnLst>
-                        <p:par>
-                          <p:cTn id="48" fill="hold">
-                            <p:stCondLst>
-                              <p:cond delay="0"/>
-                            </p:stCondLst>
-                            <p:childTnLst>
-                              <p:par>
-                                <p:cTn id="49" presetID="10" presetClass="entr" presetSubtype="0" fill="hold" grpId="0" nodeType="clickEffect">
-                                  <p:stCondLst>
-                                    <p:cond delay="0"/>
-                                  </p:stCondLst>
-                                  <p:childTnLst>
-                                    <p:set>
-                                      <p:cBhvr>
-                                        <p:cTn id="50" dur="1" fill="hold">
-                                          <p:stCondLst>
-                                            <p:cond delay="0"/>
-                                          </p:stCondLst>
-                                        </p:cTn>
-                                        <p:tgtEl>
-                                          <p:spTgt spid="17"/>
-                                        </p:tgtEl>
-                                        <p:attrNameLst>
-                                          <p:attrName>style.visibility</p:attrName>
-                                        </p:attrNameLst>
-                                      </p:cBhvr>
-                                      <p:to>
-                                        <p:strVal val="visible"/>
-                                      </p:to>
-                                    </p:set>
-                                    <p:animEffect transition="in" filter="fade">
-                                      <p:cBhvr>
-                                        <p:cTn id="51" dur="500"/>
-                                        <p:tgtEl>
-                                          <p:spTgt spid="17"/>
-                                        </p:tgtEl>
-                                      </p:cBhvr>
-                                    </p:animEffect>
-                                  </p:childTnLst>
-                                </p:cTn>
-                              </p:par>
-                            </p:childTnLst>
-                          </p:cTn>
-                        </p:par>
-                      </p:childTnLst>
-                    </p:cTn>
-                  </p:par>
-                  <p:par>
-                    <p:cTn id="52" fill="hold">
-                      <p:stCondLst>
-                        <p:cond delay="indefinite"/>
-                      </p:stCondLst>
-                      <p:childTnLst>
-                        <p:par>
-                          <p:cTn id="53" fill="hold">
-                            <p:stCondLst>
-                              <p:cond delay="0"/>
-                            </p:stCondLst>
-                            <p:childTnLst>
-                              <p:par>
-                                <p:cTn id="54" presetID="10" presetClass="exit" presetSubtype="0" fill="hold" grpId="1" nodeType="clickEffect">
-                                  <p:stCondLst>
-                                    <p:cond delay="0"/>
-                                  </p:stCondLst>
-                                  <p:childTnLst>
-                                    <p:animEffect transition="out" filter="fade">
-                                      <p:cBhvr>
-                                        <p:cTn id="55" dur="500"/>
-                                        <p:tgtEl>
-                                          <p:spTgt spid="17"/>
-                                        </p:tgtEl>
-                                      </p:cBhvr>
-                                    </p:animEffect>
-                                    <p:set>
-                                      <p:cBhvr>
-                                        <p:cTn id="56" dur="1" fill="hold">
-                                          <p:stCondLst>
-                                            <p:cond delay="499"/>
-                                          </p:stCondLst>
-                                        </p:cTn>
-                                        <p:tgtEl>
-                                          <p:spTgt spid="17"/>
-                                        </p:tgtEl>
-                                        <p:attrNameLst>
-                                          <p:attrName>style.visibility</p:attrName>
-                                        </p:attrNameLst>
-                                      </p:cBhvr>
-                                      <p:to>
-                                        <p:strVal val="hidden"/>
-                                      </p:to>
-                                    </p:set>
-                                  </p:childTnLst>
-                                </p:cTn>
-                              </p:par>
-                            </p:childTnLst>
-                          </p:cTn>
-                        </p:par>
-                      </p:childTnLst>
-                    </p:cTn>
-                  </p:par>
-                </p:childTnLst>
-              </p:cTn>
-              <p:nextCondLst>
-                <p:cond evt="onClick" delay="0">
-                  <p:tgtEl>
-                    <p:spTgt spid="16"/>
-                  </p:tgtEl>
-                </p:cond>
-              </p:nextCondLst>
-            </p:seq>
           </p:childTnLst>
         </p:cTn>
       </p:par>
     </p:tnLst>
     <p:bldLst>
+      <p:bldP spid="3" grpId="0" animBg="1"/>
+      <p:bldP spid="3" grpId="1" animBg="1"/>
+      <p:bldP spid="5" grpId="0" animBg="1"/>
+      <p:bldP spid="5" grpId="1" animBg="1"/>
+      <p:bldP spid="7" grpId="0" animBg="1"/>
+      <p:bldP spid="7" grpId="1" animBg="1"/>
       <p:bldP spid="9" grpId="0" animBg="1"/>
       <p:bldP spid="9" grpId="1" animBg="1"/>
       <p:bldP spid="11" grpId="0" animBg="1"/>
       <p:bldP spid="11" grpId="1" animBg="1"/>
-      <p:bldP spid="13" grpId="0" animBg="1"/>
-      <p:bldP spid="13" grpId="1" animBg="1"/>
-      <p:bldP spid="15" grpId="0" animBg="1"/>
-      <p:bldP spid="15" grpId="1" animBg="1"/>
-      <p:bldP spid="17" grpId="0" animBg="1"/>
-      <p:bldP spid="17" grpId="1" animBg="1"/>
     </p:bldLst>
   </p:timing>
 </p:sld>
@@ -12615,21 +12480,6 @@
   <p:clrMapOvr>
     <a:masterClrMapping/>
   </p:clrMapOvr>
-  <mc:AlternateContent xmlns:mc="http://schemas.openxmlformats.org/markup-compatibility/2006" xmlns:p14="http://schemas.microsoft.com/office/powerpoint/2010/main">
-    <mc:Choice Requires="p14">
-      <p:transition spd="slow" p14:dur="2000"/>
-    </mc:Choice>
-    <mc:Fallback xmlns="">
-      <p:transition spd="slow"/>
-    </mc:Fallback>
-  </mc:AlternateContent>
-  <p:timing>
-    <p:tnLst>
-      <p:par>
-        <p:cTn id="1" dur="indefinite" restart="never" nodeType="tmRoot"/>
-      </p:par>
-    </p:tnLst>
-  </p:timing>
 </p:sld>
 </file>
 
@@ -12685,7 +12535,7 @@
           <a:p>
             <a:pPr algn="l"/>
             <a:r>
-              <a:rPr lang="en-US" sz="7200" dirty="0" smtClean="0">
+              <a:rPr lang="en-US" sz="7200" dirty="0">
                 <a:solidFill>
                   <a:schemeClr val="bg1"/>
                 </a:solidFill>
@@ -12710,13 +12560,6 @@
   <p:clrMapOvr>
     <a:masterClrMapping/>
   </p:clrMapOvr>
-  <p:timing>
-    <p:tnLst>
-      <p:par>
-        <p:cTn id="1" dur="indefinite" restart="never" nodeType="tmRoot"/>
-      </p:par>
-    </p:tnLst>
-  </p:timing>
 </p:sld>
 </file>
 
@@ -12765,7 +12608,7 @@
           <a:lstStyle/>
           <a:p>
             <a:r>
-              <a:rPr lang="en-US" dirty="0" smtClean="0"/>
+              <a:rPr lang="en-US" dirty="0"/>
               <a:t>Create Tooltip: None Selected</a:t>
             </a:r>
             <a:endParaRPr lang="en-SG" dirty="0"/>
@@ -12793,13 +12636,13 @@
           <a:lstStyle/>
           <a:p>
             <a:r>
-              <a:rPr lang="en-US" dirty="0" smtClean="0"/>
+              <a:rPr lang="en-US" dirty="0"/>
               <a:t>Unselect everything</a:t>
             </a:r>
           </a:p>
           <a:p>
             <a:r>
-              <a:rPr lang="en-US" dirty="0" smtClean="0"/>
+              <a:rPr lang="en-US" dirty="0"/>
               <a:t>Click ‘Create Tooltip’</a:t>
             </a:r>
             <a:endParaRPr lang="en-SG" dirty="0"/>
@@ -12816,13 +12659,6 @@
   <p:clrMapOvr>
     <a:masterClrMapping/>
   </p:clrMapOvr>
-  <p:timing>
-    <p:tnLst>
-      <p:par>
-        <p:cTn id="1" dur="indefinite" restart="never" nodeType="tmRoot"/>
-      </p:par>
-    </p:tnLst>
-  </p:timing>
 </p:sld>
 </file>
 
@@ -12893,13 +12729,6 @@
   <p:clrMapOvr>
     <a:masterClrMapping/>
   </p:clrMapOvr>
-  <p:timing>
-    <p:tnLst>
-      <p:par>
-        <p:cTn id="1" dur="indefinite" restart="never" nodeType="tmRoot"/>
-      </p:par>
-    </p:tnLst>
-  </p:timing>
 </p:sld>
 </file>
 
@@ -12972,18 +12801,13 @@
           <a:p>
             <a:pPr algn="ctr"/>
             <a:r>
-              <a:rPr lang="en-SG" sz="1600" smtClean="0">
+              <a:rPr lang="en-SG" sz="1600">
                 <a:solidFill>
                   <a:srgbClr val="FFFFFF"/>
                 </a:solidFill>
               </a:rPr>
               <a:t>?</a:t>
             </a:r>
-            <a:endParaRPr lang="en-SG" sz="1600">
-              <a:solidFill>
-                <a:srgbClr val="FFFFFF"/>
-              </a:solidFill>
-            </a:endParaRPr>
           </a:p>
         </p:txBody>
       </p:sp>
@@ -13291,7 +13115,7 @@
           <a:lstStyle/>
           <a:p>
             <a:r>
-              <a:rPr lang="en-US" dirty="0" smtClean="0"/>
+              <a:rPr lang="en-US" dirty="0"/>
               <a:t>Create Tooltip: Shape Selected</a:t>
             </a:r>
             <a:endParaRPr lang="en-SG" dirty="0"/>
@@ -13319,13 +13143,13 @@
           <a:lstStyle/>
           <a:p>
             <a:r>
-              <a:rPr lang="en-US" dirty="0" smtClean="0"/>
+              <a:rPr lang="en-US" dirty="0"/>
               <a:t>Select the shape</a:t>
             </a:r>
           </a:p>
           <a:p>
             <a:r>
-              <a:rPr lang="en-US" dirty="0" smtClean="0"/>
+              <a:rPr lang="en-US" dirty="0"/>
               <a:t>Click ‘Create Tooltip’</a:t>
             </a:r>
             <a:endParaRPr lang="en-SG" dirty="0"/>
@@ -13342,13 +13166,6 @@
   <p:clrMapOvr>
     <a:masterClrMapping/>
   </p:clrMapOvr>
-  <p:timing>
-    <p:tnLst>
-      <p:par>
-        <p:cTn id="1" dur="indefinite" restart="never" nodeType="tmRoot"/>
-      </p:par>
-    </p:tnLst>
-  </p:timing>
 </p:sld>
 </file>
 
@@ -13406,7 +13223,7 @@
           <a:p>
             <a:pPr algn="ctr"/>
             <a:r>
-              <a:rPr lang="en-US" dirty="0" smtClean="0"/>
+              <a:rPr lang="en-US" dirty="0"/>
               <a:t>Select me!</a:t>
             </a:r>
             <a:endParaRPr lang="en-SG" dirty="0"/>
@@ -13423,13 +13240,6 @@
   <p:clrMapOvr>
     <a:masterClrMapping/>
   </p:clrMapOvr>
-  <p:timing>
-    <p:tnLst>
-      <p:par>
-        <p:cTn id="1" dur="indefinite" restart="never" nodeType="tmRoot"/>
-      </p:par>
-    </p:tnLst>
-  </p:timing>
 </p:sld>
 </file>
 
@@ -13487,7 +13297,7 @@
           <a:p>
             <a:pPr algn="ctr"/>
             <a:r>
-              <a:rPr lang="en-US" dirty="0" smtClean="0"/>
+              <a:rPr lang="en-US" dirty="0"/>
               <a:t>Select me!</a:t>
             </a:r>
             <a:endParaRPr lang="en-SG" dirty="0"/>
@@ -13546,18 +13356,13 @@
           <a:p>
             <a:pPr algn="ctr"/>
             <a:r>
-              <a:rPr lang="en-SG" sz="1600" smtClean="0">
+              <a:rPr lang="en-SG" sz="1600">
                 <a:solidFill>
                   <a:srgbClr val="FFFFFF"/>
                 </a:solidFill>
               </a:rPr>
               <a:t>?</a:t>
             </a:r>
-            <a:endParaRPr lang="en-SG" sz="1600">
-              <a:solidFill>
-                <a:srgbClr val="FFFFFF"/>
-              </a:solidFill>
-            </a:endParaRPr>
           </a:p>
         </p:txBody>
       </p:sp>
@@ -13825,7 +13630,7 @@
           <a:lstStyle/>
           <a:p>
             <a:r>
-              <a:rPr lang="en-US" dirty="0" smtClean="0"/>
+              <a:rPr lang="en-US" dirty="0"/>
               <a:t>Create Tooltip: Existing tooltip present</a:t>
             </a:r>
             <a:endParaRPr lang="en-SG" dirty="0"/>
@@ -13853,7 +13658,7 @@
           <a:lstStyle/>
           <a:p>
             <a:r>
-              <a:rPr lang="en-US" dirty="0" smtClean="0"/>
+              <a:rPr lang="en-US" dirty="0"/>
               <a:t>Click ‘Create Tooltip’ (existing tooltips should not affect creation of new tooltips)</a:t>
             </a:r>
             <a:endParaRPr lang="en-SG" dirty="0"/>
@@ -13870,13 +13675,6 @@
   <p:clrMapOvr>
     <a:masterClrMapping/>
   </p:clrMapOvr>
-  <p:timing>
-    <p:tnLst>
-      <p:par>
-        <p:cTn id="1" dur="indefinite" restart="never" nodeType="tmRoot"/>
-      </p:par>
-    </p:tnLst>
-  </p:timing>
 </p:sld>
 </file>
 

</xml_diff>

<commit_message>
#1854 create tooltip stack instead of cascade (#1943)
* wip

* Add tooltip displacement

* Edited CreateTooltip unit test to account for displacement

* remove unnecessary using directives

* add comments to shapeutil methods
</commit_message>
<xml_diff>
--- a/doc/test/TooltipsLab/CreateTooltip.pptx
+++ b/doc/test/TooltipsLab/CreateTooltip.pptx
@@ -23,7 +23,7 @@
     <p:sldId id="322" r:id="rId14"/>
     <p:sldId id="323" r:id="rId15"/>
     <p:sldId id="324" r:id="rId16"/>
-    <p:sldId id="325" r:id="rId17"/>
+    <p:sldId id="326" r:id="rId17"/>
     <p:sldId id="305" r:id="rId18"/>
   </p:sldIdLst>
   <p:sldSz cx="9144000" cy="6858000" type="screen4x3"/>
@@ -145,7 +145,7 @@
             <p14:sldId id="322"/>
             <p14:sldId id="323"/>
             <p14:sldId id="324"/>
-            <p14:sldId id="325"/>
+            <p14:sldId id="326"/>
             <p14:sldId id="305"/>
           </p14:sldIdLst>
         </p14:section>
@@ -251,7 +251,7 @@
           <a:p>
             <a:fld id="{7B6B14F6-3F9A-43ED-BCC2-4547CC5017BD}" type="datetimeFigureOut">
               <a:rPr lang="en-SG" smtClean="0"/>
-              <a:t>7/4/2019</a:t>
+              <a:t>27/6/2019</a:t>
             </a:fld>
             <a:endParaRPr lang="en-SG"/>
           </a:p>
@@ -315,35 +315,35 @@
           <a:p>
             <a:pPr lvl="0"/>
             <a:r>
-              <a:rPr lang="zh-CN" altLang="en-US" smtClean="0"/>
+              <a:rPr lang="zh-CN" altLang="en-US"/>
               <a:t>单击此处编辑母版文本样式</a:t>
             </a:r>
           </a:p>
           <a:p>
             <a:pPr lvl="1"/>
             <a:r>
-              <a:rPr lang="zh-CN" altLang="en-US" smtClean="0"/>
+              <a:rPr lang="zh-CN" altLang="en-US"/>
               <a:t>第二级</a:t>
             </a:r>
           </a:p>
           <a:p>
             <a:pPr lvl="2"/>
             <a:r>
-              <a:rPr lang="zh-CN" altLang="en-US" smtClean="0"/>
+              <a:rPr lang="zh-CN" altLang="en-US"/>
               <a:t>第三级</a:t>
             </a:r>
           </a:p>
           <a:p>
             <a:pPr lvl="3"/>
             <a:r>
-              <a:rPr lang="zh-CN" altLang="en-US" smtClean="0"/>
+              <a:rPr lang="zh-CN" altLang="en-US"/>
               <a:t>第四级</a:t>
             </a:r>
           </a:p>
           <a:p>
             <a:pPr lvl="4"/>
             <a:r>
-              <a:rPr lang="zh-CN" altLang="en-US" smtClean="0"/>
+              <a:rPr lang="zh-CN" altLang="en-US"/>
               <a:t>第五级</a:t>
             </a:r>
             <a:endParaRPr lang="en-SG"/>
@@ -557,10 +557,9 @@
           <a:lstStyle/>
           <a:p>
             <a:r>
-              <a:rPr lang="en-US" smtClean="0"/>
+              <a:rPr lang="en-US"/>
               <a:t>Click to edit Master title style</a:t>
             </a:r>
-            <a:endParaRPr lang="en-US"/>
           </a:p>
         </p:txBody>
       </p:sp>
@@ -676,10 +675,9 @@
           </a:lstStyle>
           <a:p>
             <a:r>
-              <a:rPr lang="en-US" smtClean="0"/>
+              <a:rPr lang="en-US"/>
               <a:t>Click to edit Master subtitle style</a:t>
             </a:r>
-            <a:endParaRPr lang="en-US"/>
           </a:p>
         </p:txBody>
       </p:sp>
@@ -700,7 +698,7 @@
           <a:p>
             <a:fld id="{699DC775-C286-4358-8C92-D7E584E969B3}" type="datetimeFigureOut">
               <a:rPr lang="en-US" smtClean="0"/>
-              <a:t>4/7/2019</a:t>
+              <a:t>6/27/2019</a:t>
             </a:fld>
             <a:endParaRPr lang="en-US"/>
           </a:p>
@@ -794,10 +792,9 @@
           <a:lstStyle/>
           <a:p>
             <a:r>
-              <a:rPr lang="en-US" smtClean="0"/>
+              <a:rPr lang="en-US"/>
               <a:t>Click to edit Master title style</a:t>
             </a:r>
-            <a:endParaRPr lang="en-US"/>
           </a:p>
         </p:txBody>
       </p:sp>
@@ -818,38 +815,37 @@
           <a:p>
             <a:pPr lvl="0"/>
             <a:r>
-              <a:rPr lang="en-US" smtClean="0"/>
+              <a:rPr lang="en-US"/>
               <a:t>Click to edit Master text styles</a:t>
             </a:r>
           </a:p>
           <a:p>
             <a:pPr lvl="1"/>
             <a:r>
-              <a:rPr lang="en-US" smtClean="0"/>
+              <a:rPr lang="en-US"/>
               <a:t>Second level</a:t>
             </a:r>
           </a:p>
           <a:p>
             <a:pPr lvl="2"/>
             <a:r>
-              <a:rPr lang="en-US" smtClean="0"/>
+              <a:rPr lang="en-US"/>
               <a:t>Third level</a:t>
             </a:r>
           </a:p>
           <a:p>
             <a:pPr lvl="3"/>
             <a:r>
-              <a:rPr lang="en-US" smtClean="0"/>
+              <a:rPr lang="en-US"/>
               <a:t>Fourth level</a:t>
             </a:r>
           </a:p>
           <a:p>
             <a:pPr lvl="4"/>
             <a:r>
-              <a:rPr lang="en-US" smtClean="0"/>
+              <a:rPr lang="en-US"/>
               <a:t>Fifth level</a:t>
             </a:r>
-            <a:endParaRPr lang="en-US"/>
           </a:p>
         </p:txBody>
       </p:sp>
@@ -870,7 +866,7 @@
           <a:p>
             <a:fld id="{699DC775-C286-4358-8C92-D7E584E969B3}" type="datetimeFigureOut">
               <a:rPr lang="en-US" smtClean="0"/>
-              <a:t>4/7/2019</a:t>
+              <a:t>6/27/2019</a:t>
             </a:fld>
             <a:endParaRPr lang="en-US"/>
           </a:p>
@@ -969,10 +965,9 @@
           <a:lstStyle/>
           <a:p>
             <a:r>
-              <a:rPr lang="en-US" smtClean="0"/>
+              <a:rPr lang="en-US"/>
               <a:t>Click to edit Master title style</a:t>
             </a:r>
-            <a:endParaRPr lang="en-US"/>
           </a:p>
         </p:txBody>
       </p:sp>
@@ -998,38 +993,37 @@
           <a:p>
             <a:pPr lvl="0"/>
             <a:r>
-              <a:rPr lang="en-US" smtClean="0"/>
+              <a:rPr lang="en-US"/>
               <a:t>Click to edit Master text styles</a:t>
             </a:r>
           </a:p>
           <a:p>
             <a:pPr lvl="1"/>
             <a:r>
-              <a:rPr lang="en-US" smtClean="0"/>
+              <a:rPr lang="en-US"/>
               <a:t>Second level</a:t>
             </a:r>
           </a:p>
           <a:p>
             <a:pPr lvl="2"/>
             <a:r>
-              <a:rPr lang="en-US" smtClean="0"/>
+              <a:rPr lang="en-US"/>
               <a:t>Third level</a:t>
             </a:r>
           </a:p>
           <a:p>
             <a:pPr lvl="3"/>
             <a:r>
-              <a:rPr lang="en-US" smtClean="0"/>
+              <a:rPr lang="en-US"/>
               <a:t>Fourth level</a:t>
             </a:r>
           </a:p>
           <a:p>
             <a:pPr lvl="4"/>
             <a:r>
-              <a:rPr lang="en-US" smtClean="0"/>
+              <a:rPr lang="en-US"/>
               <a:t>Fifth level</a:t>
             </a:r>
-            <a:endParaRPr lang="en-US"/>
           </a:p>
         </p:txBody>
       </p:sp>
@@ -1050,7 +1044,7 @@
           <a:p>
             <a:fld id="{699DC775-C286-4358-8C92-D7E584E969B3}" type="datetimeFigureOut">
               <a:rPr lang="en-US" smtClean="0"/>
-              <a:t>4/7/2019</a:t>
+              <a:t>6/27/2019</a:t>
             </a:fld>
             <a:endParaRPr lang="en-US"/>
           </a:p>
@@ -1149,10 +1143,9 @@
           <a:lstStyle/>
           <a:p>
             <a:r>
-              <a:rPr lang="en-US" smtClean="0"/>
+              <a:rPr lang="en-US"/>
               <a:t>Click to edit Master title style</a:t>
             </a:r>
-            <a:endParaRPr lang="en-US"/>
           </a:p>
         </p:txBody>
       </p:sp>
@@ -1268,10 +1261,9 @@
           </a:lstStyle>
           <a:p>
             <a:r>
-              <a:rPr lang="en-US" smtClean="0"/>
+              <a:rPr lang="en-US"/>
               <a:t>Click to edit Master subtitle style</a:t>
             </a:r>
-            <a:endParaRPr lang="en-US"/>
           </a:p>
         </p:txBody>
       </p:sp>
@@ -1292,7 +1284,7 @@
           <a:p>
             <a:fld id="{699DC775-C286-4358-8C92-D7E584E969B3}" type="datetimeFigureOut">
               <a:rPr lang="en-US" smtClean="0"/>
-              <a:t>4/7/2019</a:t>
+              <a:t>6/27/2019</a:t>
             </a:fld>
             <a:endParaRPr lang="en-US"/>
           </a:p>
@@ -1386,10 +1378,9 @@
           <a:lstStyle/>
           <a:p>
             <a:r>
-              <a:rPr lang="en-US" smtClean="0"/>
+              <a:rPr lang="en-US"/>
               <a:t>Click to edit Master title style</a:t>
             </a:r>
-            <a:endParaRPr lang="en-US"/>
           </a:p>
         </p:txBody>
       </p:sp>
@@ -1410,38 +1401,37 @@
           <a:p>
             <a:pPr lvl="0"/>
             <a:r>
-              <a:rPr lang="en-US" smtClean="0"/>
+              <a:rPr lang="en-US"/>
               <a:t>Click to edit Master text styles</a:t>
             </a:r>
           </a:p>
           <a:p>
             <a:pPr lvl="1"/>
             <a:r>
-              <a:rPr lang="en-US" smtClean="0"/>
+              <a:rPr lang="en-US"/>
               <a:t>Second level</a:t>
             </a:r>
           </a:p>
           <a:p>
             <a:pPr lvl="2"/>
             <a:r>
-              <a:rPr lang="en-US" smtClean="0"/>
+              <a:rPr lang="en-US"/>
               <a:t>Third level</a:t>
             </a:r>
           </a:p>
           <a:p>
             <a:pPr lvl="3"/>
             <a:r>
-              <a:rPr lang="en-US" smtClean="0"/>
+              <a:rPr lang="en-US"/>
               <a:t>Fourth level</a:t>
             </a:r>
           </a:p>
           <a:p>
             <a:pPr lvl="4"/>
             <a:r>
-              <a:rPr lang="en-US" smtClean="0"/>
+              <a:rPr lang="en-US"/>
               <a:t>Fifth level</a:t>
             </a:r>
-            <a:endParaRPr lang="en-US"/>
           </a:p>
         </p:txBody>
       </p:sp>
@@ -1462,7 +1452,7 @@
           <a:p>
             <a:fld id="{699DC775-C286-4358-8C92-D7E584E969B3}" type="datetimeFigureOut">
               <a:rPr lang="en-US" smtClean="0"/>
-              <a:t>4/7/2019</a:t>
+              <a:t>6/27/2019</a:t>
             </a:fld>
             <a:endParaRPr lang="en-US"/>
           </a:p>
@@ -1565,10 +1555,9 @@
           </a:lstStyle>
           <a:p>
             <a:r>
-              <a:rPr lang="en-US" smtClean="0"/>
+              <a:rPr lang="en-US"/>
               <a:t>Click to edit Master title style</a:t>
             </a:r>
-            <a:endParaRPr lang="en-US"/>
           </a:p>
         </p:txBody>
       </p:sp>
@@ -1685,7 +1674,7 @@
           <a:p>
             <a:pPr lvl="0"/>
             <a:r>
-              <a:rPr lang="en-US" smtClean="0"/>
+              <a:rPr lang="en-US"/>
               <a:t>Click to edit Master text styles</a:t>
             </a:r>
           </a:p>
@@ -1708,7 +1697,7 @@
           <a:p>
             <a:fld id="{699DC775-C286-4358-8C92-D7E584E969B3}" type="datetimeFigureOut">
               <a:rPr lang="en-US" smtClean="0"/>
-              <a:t>4/7/2019</a:t>
+              <a:t>6/27/2019</a:t>
             </a:fld>
             <a:endParaRPr lang="en-US"/>
           </a:p>
@@ -1802,10 +1791,9 @@
           <a:lstStyle/>
           <a:p>
             <a:r>
-              <a:rPr lang="en-US" smtClean="0"/>
+              <a:rPr lang="en-US"/>
               <a:t>Click to edit Master title style</a:t>
             </a:r>
-            <a:endParaRPr lang="en-US"/>
           </a:p>
         </p:txBody>
       </p:sp>
@@ -1859,38 +1847,37 @@
           <a:p>
             <a:pPr lvl="0"/>
             <a:r>
-              <a:rPr lang="en-US" smtClean="0"/>
+              <a:rPr lang="en-US"/>
               <a:t>Click to edit Master text styles</a:t>
             </a:r>
           </a:p>
           <a:p>
             <a:pPr lvl="1"/>
             <a:r>
-              <a:rPr lang="en-US" smtClean="0"/>
+              <a:rPr lang="en-US"/>
               <a:t>Second level</a:t>
             </a:r>
           </a:p>
           <a:p>
             <a:pPr lvl="2"/>
             <a:r>
-              <a:rPr lang="en-US" smtClean="0"/>
+              <a:rPr lang="en-US"/>
               <a:t>Third level</a:t>
             </a:r>
           </a:p>
           <a:p>
             <a:pPr lvl="3"/>
             <a:r>
-              <a:rPr lang="en-US" smtClean="0"/>
+              <a:rPr lang="en-US"/>
               <a:t>Fourth level</a:t>
             </a:r>
           </a:p>
           <a:p>
             <a:pPr lvl="4"/>
             <a:r>
-              <a:rPr lang="en-US" smtClean="0"/>
+              <a:rPr lang="en-US"/>
               <a:t>Fifth level</a:t>
             </a:r>
-            <a:endParaRPr lang="en-US"/>
           </a:p>
         </p:txBody>
       </p:sp>
@@ -1944,38 +1931,37 @@
           <a:p>
             <a:pPr lvl="0"/>
             <a:r>
-              <a:rPr lang="en-US" smtClean="0"/>
+              <a:rPr lang="en-US"/>
               <a:t>Click to edit Master text styles</a:t>
             </a:r>
           </a:p>
           <a:p>
             <a:pPr lvl="1"/>
             <a:r>
-              <a:rPr lang="en-US" smtClean="0"/>
+              <a:rPr lang="en-US"/>
               <a:t>Second level</a:t>
             </a:r>
           </a:p>
           <a:p>
             <a:pPr lvl="2"/>
             <a:r>
-              <a:rPr lang="en-US" smtClean="0"/>
+              <a:rPr lang="en-US"/>
               <a:t>Third level</a:t>
             </a:r>
           </a:p>
           <a:p>
             <a:pPr lvl="3"/>
             <a:r>
-              <a:rPr lang="en-US" smtClean="0"/>
+              <a:rPr lang="en-US"/>
               <a:t>Fourth level</a:t>
             </a:r>
           </a:p>
           <a:p>
             <a:pPr lvl="4"/>
             <a:r>
-              <a:rPr lang="en-US" smtClean="0"/>
+              <a:rPr lang="en-US"/>
               <a:t>Fifth level</a:t>
             </a:r>
-            <a:endParaRPr lang="en-US"/>
           </a:p>
         </p:txBody>
       </p:sp>
@@ -1996,7 +1982,7 @@
           <a:p>
             <a:fld id="{699DC775-C286-4358-8C92-D7E584E969B3}" type="datetimeFigureOut">
               <a:rPr lang="en-US" smtClean="0"/>
-              <a:t>4/7/2019</a:t>
+              <a:t>6/27/2019</a:t>
             </a:fld>
             <a:endParaRPr lang="en-US"/>
           </a:p>
@@ -2094,10 +2080,9 @@
           </a:lstStyle>
           <a:p>
             <a:r>
-              <a:rPr lang="en-US" smtClean="0"/>
+              <a:rPr lang="en-US"/>
               <a:t>Click to edit Master title style</a:t>
             </a:r>
-            <a:endParaRPr lang="en-US"/>
           </a:p>
         </p:txBody>
       </p:sp>
@@ -2160,7 +2145,7 @@
           <a:p>
             <a:pPr lvl="0"/>
             <a:r>
-              <a:rPr lang="en-US" smtClean="0"/>
+              <a:rPr lang="en-US"/>
               <a:t>Click to edit Master text styles</a:t>
             </a:r>
           </a:p>
@@ -2216,38 +2201,37 @@
           <a:p>
             <a:pPr lvl="0"/>
             <a:r>
-              <a:rPr lang="en-US" smtClean="0"/>
+              <a:rPr lang="en-US"/>
               <a:t>Click to edit Master text styles</a:t>
             </a:r>
           </a:p>
           <a:p>
             <a:pPr lvl="1"/>
             <a:r>
-              <a:rPr lang="en-US" smtClean="0"/>
+              <a:rPr lang="en-US"/>
               <a:t>Second level</a:t>
             </a:r>
           </a:p>
           <a:p>
             <a:pPr lvl="2"/>
             <a:r>
-              <a:rPr lang="en-US" smtClean="0"/>
+              <a:rPr lang="en-US"/>
               <a:t>Third level</a:t>
             </a:r>
           </a:p>
           <a:p>
             <a:pPr lvl="3"/>
             <a:r>
-              <a:rPr lang="en-US" smtClean="0"/>
+              <a:rPr lang="en-US"/>
               <a:t>Fourth level</a:t>
             </a:r>
           </a:p>
           <a:p>
             <a:pPr lvl="4"/>
             <a:r>
-              <a:rPr lang="en-US" smtClean="0"/>
+              <a:rPr lang="en-US"/>
               <a:t>Fifth level</a:t>
             </a:r>
-            <a:endParaRPr lang="en-US"/>
           </a:p>
         </p:txBody>
       </p:sp>
@@ -2310,7 +2294,7 @@
           <a:p>
             <a:pPr lvl="0"/>
             <a:r>
-              <a:rPr lang="en-US" smtClean="0"/>
+              <a:rPr lang="en-US"/>
               <a:t>Click to edit Master text styles</a:t>
             </a:r>
           </a:p>
@@ -2366,38 +2350,37 @@
           <a:p>
             <a:pPr lvl="0"/>
             <a:r>
-              <a:rPr lang="en-US" smtClean="0"/>
+              <a:rPr lang="en-US"/>
               <a:t>Click to edit Master text styles</a:t>
             </a:r>
           </a:p>
           <a:p>
             <a:pPr lvl="1"/>
             <a:r>
-              <a:rPr lang="en-US" smtClean="0"/>
+              <a:rPr lang="en-US"/>
               <a:t>Second level</a:t>
             </a:r>
           </a:p>
           <a:p>
             <a:pPr lvl="2"/>
             <a:r>
-              <a:rPr lang="en-US" smtClean="0"/>
+              <a:rPr lang="en-US"/>
               <a:t>Third level</a:t>
             </a:r>
           </a:p>
           <a:p>
             <a:pPr lvl="3"/>
             <a:r>
-              <a:rPr lang="en-US" smtClean="0"/>
+              <a:rPr lang="en-US"/>
               <a:t>Fourth level</a:t>
             </a:r>
           </a:p>
           <a:p>
             <a:pPr lvl="4"/>
             <a:r>
-              <a:rPr lang="en-US" smtClean="0"/>
+              <a:rPr lang="en-US"/>
               <a:t>Fifth level</a:t>
             </a:r>
-            <a:endParaRPr lang="en-US"/>
           </a:p>
         </p:txBody>
       </p:sp>
@@ -2418,7 +2401,7 @@
           <a:p>
             <a:fld id="{699DC775-C286-4358-8C92-D7E584E969B3}" type="datetimeFigureOut">
               <a:rPr lang="en-US" smtClean="0"/>
-              <a:t>4/7/2019</a:t>
+              <a:t>6/27/2019</a:t>
             </a:fld>
             <a:endParaRPr lang="en-US"/>
           </a:p>
@@ -2512,10 +2495,9 @@
           <a:lstStyle/>
           <a:p>
             <a:r>
-              <a:rPr lang="en-US" smtClean="0"/>
+              <a:rPr lang="en-US"/>
               <a:t>Click to edit Master title style</a:t>
             </a:r>
-            <a:endParaRPr lang="en-US"/>
           </a:p>
         </p:txBody>
       </p:sp>
@@ -2536,7 +2518,7 @@
           <a:p>
             <a:fld id="{699DC775-C286-4358-8C92-D7E584E969B3}" type="datetimeFigureOut">
               <a:rPr lang="en-US" smtClean="0"/>
-              <a:t>4/7/2019</a:t>
+              <a:t>6/27/2019</a:t>
             </a:fld>
             <a:endParaRPr lang="en-US"/>
           </a:p>
@@ -2631,7 +2613,7 @@
           <a:p>
             <a:fld id="{699DC775-C286-4358-8C92-D7E584E969B3}" type="datetimeFigureOut">
               <a:rPr lang="en-US" smtClean="0"/>
-              <a:t>4/7/2019</a:t>
+              <a:t>6/27/2019</a:t>
             </a:fld>
             <a:endParaRPr lang="en-US"/>
           </a:p>
@@ -2734,10 +2716,9 @@
           </a:lstStyle>
           <a:p>
             <a:r>
-              <a:rPr lang="en-US" smtClean="0"/>
+              <a:rPr lang="en-US"/>
               <a:t>Click to edit Master title style</a:t>
             </a:r>
-            <a:endParaRPr lang="en-US"/>
           </a:p>
         </p:txBody>
       </p:sp>
@@ -2791,38 +2772,37 @@
           <a:p>
             <a:pPr lvl="0"/>
             <a:r>
-              <a:rPr lang="en-US" smtClean="0"/>
+              <a:rPr lang="en-US"/>
               <a:t>Click to edit Master text styles</a:t>
             </a:r>
           </a:p>
           <a:p>
             <a:pPr lvl="1"/>
             <a:r>
-              <a:rPr lang="en-US" smtClean="0"/>
+              <a:rPr lang="en-US"/>
               <a:t>Second level</a:t>
             </a:r>
           </a:p>
           <a:p>
             <a:pPr lvl="2"/>
             <a:r>
-              <a:rPr lang="en-US" smtClean="0"/>
+              <a:rPr lang="en-US"/>
               <a:t>Third level</a:t>
             </a:r>
           </a:p>
           <a:p>
             <a:pPr lvl="3"/>
             <a:r>
-              <a:rPr lang="en-US" smtClean="0"/>
+              <a:rPr lang="en-US"/>
               <a:t>Fourth level</a:t>
             </a:r>
           </a:p>
           <a:p>
             <a:pPr lvl="4"/>
             <a:r>
-              <a:rPr lang="en-US" smtClean="0"/>
+              <a:rPr lang="en-US"/>
               <a:t>Fifth level</a:t>
             </a:r>
-            <a:endParaRPr lang="en-US"/>
           </a:p>
         </p:txBody>
       </p:sp>
@@ -2885,7 +2865,7 @@
           <a:p>
             <a:pPr lvl="0"/>
             <a:r>
-              <a:rPr lang="en-US" smtClean="0"/>
+              <a:rPr lang="en-US"/>
               <a:t>Click to edit Master text styles</a:t>
             </a:r>
           </a:p>
@@ -2908,7 +2888,7 @@
           <a:p>
             <a:fld id="{699DC775-C286-4358-8C92-D7E584E969B3}" type="datetimeFigureOut">
               <a:rPr lang="en-US" smtClean="0"/>
-              <a:t>4/7/2019</a:t>
+              <a:t>6/27/2019</a:t>
             </a:fld>
             <a:endParaRPr lang="en-US"/>
           </a:p>
@@ -3002,10 +2982,9 @@
           <a:lstStyle/>
           <a:p>
             <a:r>
-              <a:rPr lang="en-US" smtClean="0"/>
+              <a:rPr lang="en-US"/>
               <a:t>Click to edit Master title style</a:t>
             </a:r>
-            <a:endParaRPr lang="en-US"/>
           </a:p>
         </p:txBody>
       </p:sp>
@@ -3026,38 +3005,37 @@
           <a:p>
             <a:pPr lvl="0"/>
             <a:r>
-              <a:rPr lang="en-US" smtClean="0"/>
+              <a:rPr lang="en-US"/>
               <a:t>Click to edit Master text styles</a:t>
             </a:r>
           </a:p>
           <a:p>
             <a:pPr lvl="1"/>
             <a:r>
-              <a:rPr lang="en-US" smtClean="0"/>
+              <a:rPr lang="en-US"/>
               <a:t>Second level</a:t>
             </a:r>
           </a:p>
           <a:p>
             <a:pPr lvl="2"/>
             <a:r>
-              <a:rPr lang="en-US" smtClean="0"/>
+              <a:rPr lang="en-US"/>
               <a:t>Third level</a:t>
             </a:r>
           </a:p>
           <a:p>
             <a:pPr lvl="3"/>
             <a:r>
-              <a:rPr lang="en-US" smtClean="0"/>
+              <a:rPr lang="en-US"/>
               <a:t>Fourth level</a:t>
             </a:r>
           </a:p>
           <a:p>
             <a:pPr lvl="4"/>
             <a:r>
-              <a:rPr lang="en-US" smtClean="0"/>
+              <a:rPr lang="en-US"/>
               <a:t>Fifth level</a:t>
             </a:r>
-            <a:endParaRPr lang="en-US"/>
           </a:p>
         </p:txBody>
       </p:sp>
@@ -3078,7 +3056,7 @@
           <a:p>
             <a:fld id="{699DC775-C286-4358-8C92-D7E584E969B3}" type="datetimeFigureOut">
               <a:rPr lang="en-US" smtClean="0"/>
-              <a:t>4/7/2019</a:t>
+              <a:t>6/27/2019</a:t>
             </a:fld>
             <a:endParaRPr lang="en-US"/>
           </a:p>
@@ -3181,10 +3159,9 @@
           </a:lstStyle>
           <a:p>
             <a:r>
-              <a:rPr lang="en-US" smtClean="0"/>
+              <a:rPr lang="en-US"/>
               <a:t>Click to edit Master title style</a:t>
             </a:r>
-            <a:endParaRPr lang="en-US"/>
           </a:p>
         </p:txBody>
       </p:sp>
@@ -3308,7 +3285,7 @@
           <a:p>
             <a:pPr lvl="0"/>
             <a:r>
-              <a:rPr lang="en-US" smtClean="0"/>
+              <a:rPr lang="en-US"/>
               <a:t>Click to edit Master text styles</a:t>
             </a:r>
           </a:p>
@@ -3331,7 +3308,7 @@
           <a:p>
             <a:fld id="{699DC775-C286-4358-8C92-D7E584E969B3}" type="datetimeFigureOut">
               <a:rPr lang="en-US" smtClean="0"/>
-              <a:t>4/7/2019</a:t>
+              <a:t>6/27/2019</a:t>
             </a:fld>
             <a:endParaRPr lang="en-US"/>
           </a:p>
@@ -3425,10 +3402,9 @@
           <a:lstStyle/>
           <a:p>
             <a:r>
-              <a:rPr lang="en-US" smtClean="0"/>
+              <a:rPr lang="en-US"/>
               <a:t>Click to edit Master title style</a:t>
             </a:r>
-            <a:endParaRPr lang="en-US"/>
           </a:p>
         </p:txBody>
       </p:sp>
@@ -3449,38 +3425,37 @@
           <a:p>
             <a:pPr lvl="0"/>
             <a:r>
-              <a:rPr lang="en-US" smtClean="0"/>
+              <a:rPr lang="en-US"/>
               <a:t>Click to edit Master text styles</a:t>
             </a:r>
           </a:p>
           <a:p>
             <a:pPr lvl="1"/>
             <a:r>
-              <a:rPr lang="en-US" smtClean="0"/>
+              <a:rPr lang="en-US"/>
               <a:t>Second level</a:t>
             </a:r>
           </a:p>
           <a:p>
             <a:pPr lvl="2"/>
             <a:r>
-              <a:rPr lang="en-US" smtClean="0"/>
+              <a:rPr lang="en-US"/>
               <a:t>Third level</a:t>
             </a:r>
           </a:p>
           <a:p>
             <a:pPr lvl="3"/>
             <a:r>
-              <a:rPr lang="en-US" smtClean="0"/>
+              <a:rPr lang="en-US"/>
               <a:t>Fourth level</a:t>
             </a:r>
           </a:p>
           <a:p>
             <a:pPr lvl="4"/>
             <a:r>
-              <a:rPr lang="en-US" smtClean="0"/>
+              <a:rPr lang="en-US"/>
               <a:t>Fifth level</a:t>
             </a:r>
-            <a:endParaRPr lang="en-US"/>
           </a:p>
         </p:txBody>
       </p:sp>
@@ -3501,7 +3476,7 @@
           <a:p>
             <a:fld id="{699DC775-C286-4358-8C92-D7E584E969B3}" type="datetimeFigureOut">
               <a:rPr lang="en-US" smtClean="0"/>
-              <a:t>4/7/2019</a:t>
+              <a:t>6/27/2019</a:t>
             </a:fld>
             <a:endParaRPr lang="en-US"/>
           </a:p>
@@ -3600,10 +3575,9 @@
           <a:lstStyle/>
           <a:p>
             <a:r>
-              <a:rPr lang="en-US" smtClean="0"/>
+              <a:rPr lang="en-US"/>
               <a:t>Click to edit Master title style</a:t>
             </a:r>
-            <a:endParaRPr lang="en-US"/>
           </a:p>
         </p:txBody>
       </p:sp>
@@ -3629,38 +3603,37 @@
           <a:p>
             <a:pPr lvl="0"/>
             <a:r>
-              <a:rPr lang="en-US" smtClean="0"/>
+              <a:rPr lang="en-US"/>
               <a:t>Click to edit Master text styles</a:t>
             </a:r>
           </a:p>
           <a:p>
             <a:pPr lvl="1"/>
             <a:r>
-              <a:rPr lang="en-US" smtClean="0"/>
+              <a:rPr lang="en-US"/>
               <a:t>Second level</a:t>
             </a:r>
           </a:p>
           <a:p>
             <a:pPr lvl="2"/>
             <a:r>
-              <a:rPr lang="en-US" smtClean="0"/>
+              <a:rPr lang="en-US"/>
               <a:t>Third level</a:t>
             </a:r>
           </a:p>
           <a:p>
             <a:pPr lvl="3"/>
             <a:r>
-              <a:rPr lang="en-US" smtClean="0"/>
+              <a:rPr lang="en-US"/>
               <a:t>Fourth level</a:t>
             </a:r>
           </a:p>
           <a:p>
             <a:pPr lvl="4"/>
             <a:r>
-              <a:rPr lang="en-US" smtClean="0"/>
+              <a:rPr lang="en-US"/>
               <a:t>Fifth level</a:t>
             </a:r>
-            <a:endParaRPr lang="en-US"/>
           </a:p>
         </p:txBody>
       </p:sp>
@@ -3681,7 +3654,7 @@
           <a:p>
             <a:fld id="{699DC775-C286-4358-8C92-D7E584E969B3}" type="datetimeFigureOut">
               <a:rPr lang="en-US" smtClean="0"/>
-              <a:t>4/7/2019</a:t>
+              <a:t>6/27/2019</a:t>
             </a:fld>
             <a:endParaRPr lang="en-US"/>
           </a:p>
@@ -3780,10 +3753,9 @@
           <a:lstStyle/>
           <a:p>
             <a:r>
-              <a:rPr lang="en-US" smtClean="0"/>
+              <a:rPr lang="en-US"/>
               <a:t>Click to edit Master title style</a:t>
             </a:r>
-            <a:endParaRPr lang="en-US"/>
           </a:p>
         </p:txBody>
       </p:sp>
@@ -3899,10 +3871,9 @@
           </a:lstStyle>
           <a:p>
             <a:r>
-              <a:rPr lang="en-US" smtClean="0"/>
+              <a:rPr lang="en-US"/>
               <a:t>Click to edit Master subtitle style</a:t>
             </a:r>
-            <a:endParaRPr lang="en-US"/>
           </a:p>
         </p:txBody>
       </p:sp>
@@ -3923,7 +3894,7 @@
           <a:p>
             <a:fld id="{699DC775-C286-4358-8C92-D7E584E969B3}" type="datetimeFigureOut">
               <a:rPr lang="en-US" smtClean="0"/>
-              <a:t>4/7/2019</a:t>
+              <a:t>6/27/2019</a:t>
             </a:fld>
             <a:endParaRPr lang="en-US"/>
           </a:p>
@@ -4017,10 +3988,9 @@
           <a:lstStyle/>
           <a:p>
             <a:r>
-              <a:rPr lang="en-US" smtClean="0"/>
+              <a:rPr lang="en-US"/>
               <a:t>Click to edit Master title style</a:t>
             </a:r>
-            <a:endParaRPr lang="en-US"/>
           </a:p>
         </p:txBody>
       </p:sp>
@@ -4041,38 +4011,37 @@
           <a:p>
             <a:pPr lvl="0"/>
             <a:r>
-              <a:rPr lang="en-US" smtClean="0"/>
+              <a:rPr lang="en-US"/>
               <a:t>Click to edit Master text styles</a:t>
             </a:r>
           </a:p>
           <a:p>
             <a:pPr lvl="1"/>
             <a:r>
-              <a:rPr lang="en-US" smtClean="0"/>
+              <a:rPr lang="en-US"/>
               <a:t>Second level</a:t>
             </a:r>
           </a:p>
           <a:p>
             <a:pPr lvl="2"/>
             <a:r>
-              <a:rPr lang="en-US" smtClean="0"/>
+              <a:rPr lang="en-US"/>
               <a:t>Third level</a:t>
             </a:r>
           </a:p>
           <a:p>
             <a:pPr lvl="3"/>
             <a:r>
-              <a:rPr lang="en-US" smtClean="0"/>
+              <a:rPr lang="en-US"/>
               <a:t>Fourth level</a:t>
             </a:r>
           </a:p>
           <a:p>
             <a:pPr lvl="4"/>
             <a:r>
-              <a:rPr lang="en-US" smtClean="0"/>
+              <a:rPr lang="en-US"/>
               <a:t>Fifth level</a:t>
             </a:r>
-            <a:endParaRPr lang="en-US"/>
           </a:p>
         </p:txBody>
       </p:sp>
@@ -4093,7 +4062,7 @@
           <a:p>
             <a:fld id="{699DC775-C286-4358-8C92-D7E584E969B3}" type="datetimeFigureOut">
               <a:rPr lang="en-US" smtClean="0"/>
-              <a:t>4/7/2019</a:t>
+              <a:t>6/27/2019</a:t>
             </a:fld>
             <a:endParaRPr lang="en-US"/>
           </a:p>
@@ -4196,10 +4165,9 @@
           </a:lstStyle>
           <a:p>
             <a:r>
-              <a:rPr lang="en-US" smtClean="0"/>
+              <a:rPr lang="en-US"/>
               <a:t>Click to edit Master title style</a:t>
             </a:r>
-            <a:endParaRPr lang="en-US"/>
           </a:p>
         </p:txBody>
       </p:sp>
@@ -4316,7 +4284,7 @@
           <a:p>
             <a:pPr lvl="0"/>
             <a:r>
-              <a:rPr lang="en-US" smtClean="0"/>
+              <a:rPr lang="en-US"/>
               <a:t>Click to edit Master text styles</a:t>
             </a:r>
           </a:p>
@@ -4339,7 +4307,7 @@
           <a:p>
             <a:fld id="{699DC775-C286-4358-8C92-D7E584E969B3}" type="datetimeFigureOut">
               <a:rPr lang="en-US" smtClean="0"/>
-              <a:t>4/7/2019</a:t>
+              <a:t>6/27/2019</a:t>
             </a:fld>
             <a:endParaRPr lang="en-US"/>
           </a:p>
@@ -4433,10 +4401,9 @@
           <a:lstStyle/>
           <a:p>
             <a:r>
-              <a:rPr lang="en-US" smtClean="0"/>
+              <a:rPr lang="en-US"/>
               <a:t>Click to edit Master title style</a:t>
             </a:r>
-            <a:endParaRPr lang="en-US"/>
           </a:p>
         </p:txBody>
       </p:sp>
@@ -4490,38 +4457,37 @@
           <a:p>
             <a:pPr lvl="0"/>
             <a:r>
-              <a:rPr lang="en-US" smtClean="0"/>
+              <a:rPr lang="en-US"/>
               <a:t>Click to edit Master text styles</a:t>
             </a:r>
           </a:p>
           <a:p>
             <a:pPr lvl="1"/>
             <a:r>
-              <a:rPr lang="en-US" smtClean="0"/>
+              <a:rPr lang="en-US"/>
               <a:t>Second level</a:t>
             </a:r>
           </a:p>
           <a:p>
             <a:pPr lvl="2"/>
             <a:r>
-              <a:rPr lang="en-US" smtClean="0"/>
+              <a:rPr lang="en-US"/>
               <a:t>Third level</a:t>
             </a:r>
           </a:p>
           <a:p>
             <a:pPr lvl="3"/>
             <a:r>
-              <a:rPr lang="en-US" smtClean="0"/>
+              <a:rPr lang="en-US"/>
               <a:t>Fourth level</a:t>
             </a:r>
           </a:p>
           <a:p>
             <a:pPr lvl="4"/>
             <a:r>
-              <a:rPr lang="en-US" smtClean="0"/>
+              <a:rPr lang="en-US"/>
               <a:t>Fifth level</a:t>
             </a:r>
-            <a:endParaRPr lang="en-US"/>
           </a:p>
         </p:txBody>
       </p:sp>
@@ -4575,38 +4541,37 @@
           <a:p>
             <a:pPr lvl="0"/>
             <a:r>
-              <a:rPr lang="en-US" smtClean="0"/>
+              <a:rPr lang="en-US"/>
               <a:t>Click to edit Master text styles</a:t>
             </a:r>
           </a:p>
           <a:p>
             <a:pPr lvl="1"/>
             <a:r>
-              <a:rPr lang="en-US" smtClean="0"/>
+              <a:rPr lang="en-US"/>
               <a:t>Second level</a:t>
             </a:r>
           </a:p>
           <a:p>
             <a:pPr lvl="2"/>
             <a:r>
-              <a:rPr lang="en-US" smtClean="0"/>
+              <a:rPr lang="en-US"/>
               <a:t>Third level</a:t>
             </a:r>
           </a:p>
           <a:p>
             <a:pPr lvl="3"/>
             <a:r>
-              <a:rPr lang="en-US" smtClean="0"/>
+              <a:rPr lang="en-US"/>
               <a:t>Fourth level</a:t>
             </a:r>
           </a:p>
           <a:p>
             <a:pPr lvl="4"/>
             <a:r>
-              <a:rPr lang="en-US" smtClean="0"/>
+              <a:rPr lang="en-US"/>
               <a:t>Fifth level</a:t>
             </a:r>
-            <a:endParaRPr lang="en-US"/>
           </a:p>
         </p:txBody>
       </p:sp>
@@ -4627,7 +4592,7 @@
           <a:p>
             <a:fld id="{699DC775-C286-4358-8C92-D7E584E969B3}" type="datetimeFigureOut">
               <a:rPr lang="en-US" smtClean="0"/>
-              <a:t>4/7/2019</a:t>
+              <a:t>6/27/2019</a:t>
             </a:fld>
             <a:endParaRPr lang="en-US"/>
           </a:p>
@@ -4725,10 +4690,9 @@
           </a:lstStyle>
           <a:p>
             <a:r>
-              <a:rPr lang="en-US" smtClean="0"/>
+              <a:rPr lang="en-US"/>
               <a:t>Click to edit Master title style</a:t>
             </a:r>
-            <a:endParaRPr lang="en-US"/>
           </a:p>
         </p:txBody>
       </p:sp>
@@ -4791,7 +4755,7 @@
           <a:p>
             <a:pPr lvl="0"/>
             <a:r>
-              <a:rPr lang="en-US" smtClean="0"/>
+              <a:rPr lang="en-US"/>
               <a:t>Click to edit Master text styles</a:t>
             </a:r>
           </a:p>
@@ -4847,38 +4811,37 @@
           <a:p>
             <a:pPr lvl="0"/>
             <a:r>
-              <a:rPr lang="en-US" smtClean="0"/>
+              <a:rPr lang="en-US"/>
               <a:t>Click to edit Master text styles</a:t>
             </a:r>
           </a:p>
           <a:p>
             <a:pPr lvl="1"/>
             <a:r>
-              <a:rPr lang="en-US" smtClean="0"/>
+              <a:rPr lang="en-US"/>
               <a:t>Second level</a:t>
             </a:r>
           </a:p>
           <a:p>
             <a:pPr lvl="2"/>
             <a:r>
-              <a:rPr lang="en-US" smtClean="0"/>
+              <a:rPr lang="en-US"/>
               <a:t>Third level</a:t>
             </a:r>
           </a:p>
           <a:p>
             <a:pPr lvl="3"/>
             <a:r>
-              <a:rPr lang="en-US" smtClean="0"/>
+              <a:rPr lang="en-US"/>
               <a:t>Fourth level</a:t>
             </a:r>
           </a:p>
           <a:p>
             <a:pPr lvl="4"/>
             <a:r>
-              <a:rPr lang="en-US" smtClean="0"/>
+              <a:rPr lang="en-US"/>
               <a:t>Fifth level</a:t>
             </a:r>
-            <a:endParaRPr lang="en-US"/>
           </a:p>
         </p:txBody>
       </p:sp>
@@ -4941,7 +4904,7 @@
           <a:p>
             <a:pPr lvl="0"/>
             <a:r>
-              <a:rPr lang="en-US" smtClean="0"/>
+              <a:rPr lang="en-US"/>
               <a:t>Click to edit Master text styles</a:t>
             </a:r>
           </a:p>
@@ -4997,38 +4960,37 @@
           <a:p>
             <a:pPr lvl="0"/>
             <a:r>
-              <a:rPr lang="en-US" smtClean="0"/>
+              <a:rPr lang="en-US"/>
               <a:t>Click to edit Master text styles</a:t>
             </a:r>
           </a:p>
           <a:p>
             <a:pPr lvl="1"/>
             <a:r>
-              <a:rPr lang="en-US" smtClean="0"/>
+              <a:rPr lang="en-US"/>
               <a:t>Second level</a:t>
             </a:r>
           </a:p>
           <a:p>
             <a:pPr lvl="2"/>
             <a:r>
-              <a:rPr lang="en-US" smtClean="0"/>
+              <a:rPr lang="en-US"/>
               <a:t>Third level</a:t>
             </a:r>
           </a:p>
           <a:p>
             <a:pPr lvl="3"/>
             <a:r>
-              <a:rPr lang="en-US" smtClean="0"/>
+              <a:rPr lang="en-US"/>
               <a:t>Fourth level</a:t>
             </a:r>
           </a:p>
           <a:p>
             <a:pPr lvl="4"/>
             <a:r>
-              <a:rPr lang="en-US" smtClean="0"/>
+              <a:rPr lang="en-US"/>
               <a:t>Fifth level</a:t>
             </a:r>
-            <a:endParaRPr lang="en-US"/>
           </a:p>
         </p:txBody>
       </p:sp>
@@ -5049,7 +5011,7 @@
           <a:p>
             <a:fld id="{699DC775-C286-4358-8C92-D7E584E969B3}" type="datetimeFigureOut">
               <a:rPr lang="en-US" smtClean="0"/>
-              <a:t>4/7/2019</a:t>
+              <a:t>6/27/2019</a:t>
             </a:fld>
             <a:endParaRPr lang="en-US"/>
           </a:p>
@@ -5143,10 +5105,9 @@
           <a:lstStyle/>
           <a:p>
             <a:r>
-              <a:rPr lang="en-US" smtClean="0"/>
+              <a:rPr lang="en-US"/>
               <a:t>Click to edit Master title style</a:t>
             </a:r>
-            <a:endParaRPr lang="en-US"/>
           </a:p>
         </p:txBody>
       </p:sp>
@@ -5167,7 +5128,7 @@
           <a:p>
             <a:fld id="{699DC775-C286-4358-8C92-D7E584E969B3}" type="datetimeFigureOut">
               <a:rPr lang="en-US" smtClean="0"/>
-              <a:t>4/7/2019</a:t>
+              <a:t>6/27/2019</a:t>
             </a:fld>
             <a:endParaRPr lang="en-US"/>
           </a:p>
@@ -5262,7 +5223,7 @@
           <a:p>
             <a:fld id="{699DC775-C286-4358-8C92-D7E584E969B3}" type="datetimeFigureOut">
               <a:rPr lang="en-US" smtClean="0"/>
-              <a:t>4/7/2019</a:t>
+              <a:t>6/27/2019</a:t>
             </a:fld>
             <a:endParaRPr lang="en-US"/>
           </a:p>
@@ -5365,10 +5326,9 @@
           </a:lstStyle>
           <a:p>
             <a:r>
-              <a:rPr lang="en-US" smtClean="0"/>
+              <a:rPr lang="en-US"/>
               <a:t>Click to edit Master title style</a:t>
             </a:r>
-            <a:endParaRPr lang="en-US"/>
           </a:p>
         </p:txBody>
       </p:sp>
@@ -5485,7 +5445,7 @@
           <a:p>
             <a:pPr lvl="0"/>
             <a:r>
-              <a:rPr lang="en-US" smtClean="0"/>
+              <a:rPr lang="en-US"/>
               <a:t>Click to edit Master text styles</a:t>
             </a:r>
           </a:p>
@@ -5508,7 +5468,7 @@
           <a:p>
             <a:fld id="{699DC775-C286-4358-8C92-D7E584E969B3}" type="datetimeFigureOut">
               <a:rPr lang="en-US" smtClean="0"/>
-              <a:t>4/7/2019</a:t>
+              <a:t>6/27/2019</a:t>
             </a:fld>
             <a:endParaRPr lang="en-US"/>
           </a:p>
@@ -5611,10 +5571,9 @@
           </a:lstStyle>
           <a:p>
             <a:r>
-              <a:rPr lang="en-US" smtClean="0"/>
+              <a:rPr lang="en-US"/>
               <a:t>Click to edit Master title style</a:t>
             </a:r>
-            <a:endParaRPr lang="en-US"/>
           </a:p>
         </p:txBody>
       </p:sp>
@@ -5668,38 +5627,37 @@
           <a:p>
             <a:pPr lvl="0"/>
             <a:r>
-              <a:rPr lang="en-US" smtClean="0"/>
+              <a:rPr lang="en-US"/>
               <a:t>Click to edit Master text styles</a:t>
             </a:r>
           </a:p>
           <a:p>
             <a:pPr lvl="1"/>
             <a:r>
-              <a:rPr lang="en-US" smtClean="0"/>
+              <a:rPr lang="en-US"/>
               <a:t>Second level</a:t>
             </a:r>
           </a:p>
           <a:p>
             <a:pPr lvl="2"/>
             <a:r>
-              <a:rPr lang="en-US" smtClean="0"/>
+              <a:rPr lang="en-US"/>
               <a:t>Third level</a:t>
             </a:r>
           </a:p>
           <a:p>
             <a:pPr lvl="3"/>
             <a:r>
-              <a:rPr lang="en-US" smtClean="0"/>
+              <a:rPr lang="en-US"/>
               <a:t>Fourth level</a:t>
             </a:r>
           </a:p>
           <a:p>
             <a:pPr lvl="4"/>
             <a:r>
-              <a:rPr lang="en-US" smtClean="0"/>
+              <a:rPr lang="en-US"/>
               <a:t>Fifth level</a:t>
             </a:r>
-            <a:endParaRPr lang="en-US"/>
           </a:p>
         </p:txBody>
       </p:sp>
@@ -5762,7 +5720,7 @@
           <a:p>
             <a:pPr lvl="0"/>
             <a:r>
-              <a:rPr lang="en-US" smtClean="0"/>
+              <a:rPr lang="en-US"/>
               <a:t>Click to edit Master text styles</a:t>
             </a:r>
           </a:p>
@@ -5785,7 +5743,7 @@
           <a:p>
             <a:fld id="{699DC775-C286-4358-8C92-D7E584E969B3}" type="datetimeFigureOut">
               <a:rPr lang="en-US" smtClean="0"/>
-              <a:t>4/7/2019</a:t>
+              <a:t>6/27/2019</a:t>
             </a:fld>
             <a:endParaRPr lang="en-US"/>
           </a:p>
@@ -5888,10 +5846,9 @@
           </a:lstStyle>
           <a:p>
             <a:r>
-              <a:rPr lang="en-US" smtClean="0"/>
+              <a:rPr lang="en-US"/>
               <a:t>Click to edit Master title style</a:t>
             </a:r>
-            <a:endParaRPr lang="en-US"/>
           </a:p>
         </p:txBody>
       </p:sp>
@@ -6015,7 +5972,7 @@
           <a:p>
             <a:pPr lvl="0"/>
             <a:r>
-              <a:rPr lang="en-US" smtClean="0"/>
+              <a:rPr lang="en-US"/>
               <a:t>Click to edit Master text styles</a:t>
             </a:r>
           </a:p>
@@ -6038,7 +5995,7 @@
           <a:p>
             <a:fld id="{699DC775-C286-4358-8C92-D7E584E969B3}" type="datetimeFigureOut">
               <a:rPr lang="en-US" smtClean="0"/>
-              <a:t>4/7/2019</a:t>
+              <a:t>6/27/2019</a:t>
             </a:fld>
             <a:endParaRPr lang="en-US"/>
           </a:p>
@@ -6132,10 +6089,9 @@
           <a:lstStyle/>
           <a:p>
             <a:r>
-              <a:rPr lang="en-US" smtClean="0"/>
+              <a:rPr lang="en-US"/>
               <a:t>Click to edit Master title style</a:t>
             </a:r>
-            <a:endParaRPr lang="en-US"/>
           </a:p>
         </p:txBody>
       </p:sp>
@@ -6156,38 +6112,37 @@
           <a:p>
             <a:pPr lvl="0"/>
             <a:r>
-              <a:rPr lang="en-US" smtClean="0"/>
+              <a:rPr lang="en-US"/>
               <a:t>Click to edit Master text styles</a:t>
             </a:r>
           </a:p>
           <a:p>
             <a:pPr lvl="1"/>
             <a:r>
-              <a:rPr lang="en-US" smtClean="0"/>
+              <a:rPr lang="en-US"/>
               <a:t>Second level</a:t>
             </a:r>
           </a:p>
           <a:p>
             <a:pPr lvl="2"/>
             <a:r>
-              <a:rPr lang="en-US" smtClean="0"/>
+              <a:rPr lang="en-US"/>
               <a:t>Third level</a:t>
             </a:r>
           </a:p>
           <a:p>
             <a:pPr lvl="3"/>
             <a:r>
-              <a:rPr lang="en-US" smtClean="0"/>
+              <a:rPr lang="en-US"/>
               <a:t>Fourth level</a:t>
             </a:r>
           </a:p>
           <a:p>
             <a:pPr lvl="4"/>
             <a:r>
-              <a:rPr lang="en-US" smtClean="0"/>
+              <a:rPr lang="en-US"/>
               <a:t>Fifth level</a:t>
             </a:r>
-            <a:endParaRPr lang="en-US"/>
           </a:p>
         </p:txBody>
       </p:sp>
@@ -6208,7 +6163,7 @@
           <a:p>
             <a:fld id="{699DC775-C286-4358-8C92-D7E584E969B3}" type="datetimeFigureOut">
               <a:rPr lang="en-US" smtClean="0"/>
-              <a:t>4/7/2019</a:t>
+              <a:t>6/27/2019</a:t>
             </a:fld>
             <a:endParaRPr lang="en-US"/>
           </a:p>
@@ -6307,10 +6262,9 @@
           <a:lstStyle/>
           <a:p>
             <a:r>
-              <a:rPr lang="en-US" smtClean="0"/>
+              <a:rPr lang="en-US"/>
               <a:t>Click to edit Master title style</a:t>
             </a:r>
-            <a:endParaRPr lang="en-US"/>
           </a:p>
         </p:txBody>
       </p:sp>
@@ -6336,38 +6290,37 @@
           <a:p>
             <a:pPr lvl="0"/>
             <a:r>
-              <a:rPr lang="en-US" smtClean="0"/>
+              <a:rPr lang="en-US"/>
               <a:t>Click to edit Master text styles</a:t>
             </a:r>
           </a:p>
           <a:p>
             <a:pPr lvl="1"/>
             <a:r>
-              <a:rPr lang="en-US" smtClean="0"/>
+              <a:rPr lang="en-US"/>
               <a:t>Second level</a:t>
             </a:r>
           </a:p>
           <a:p>
             <a:pPr lvl="2"/>
             <a:r>
-              <a:rPr lang="en-US" smtClean="0"/>
+              <a:rPr lang="en-US"/>
               <a:t>Third level</a:t>
             </a:r>
           </a:p>
           <a:p>
             <a:pPr lvl="3"/>
             <a:r>
-              <a:rPr lang="en-US" smtClean="0"/>
+              <a:rPr lang="en-US"/>
               <a:t>Fourth level</a:t>
             </a:r>
           </a:p>
           <a:p>
             <a:pPr lvl="4"/>
             <a:r>
-              <a:rPr lang="en-US" smtClean="0"/>
+              <a:rPr lang="en-US"/>
               <a:t>Fifth level</a:t>
             </a:r>
-            <a:endParaRPr lang="en-US"/>
           </a:p>
         </p:txBody>
       </p:sp>
@@ -6388,7 +6341,7 @@
           <a:p>
             <a:fld id="{699DC775-C286-4358-8C92-D7E584E969B3}" type="datetimeFigureOut">
               <a:rPr lang="en-US" smtClean="0"/>
-              <a:t>4/7/2019</a:t>
+              <a:t>6/27/2019</a:t>
             </a:fld>
             <a:endParaRPr lang="en-US"/>
           </a:p>
@@ -6482,10 +6435,9 @@
           <a:lstStyle/>
           <a:p>
             <a:r>
-              <a:rPr lang="en-US" smtClean="0"/>
+              <a:rPr lang="en-US"/>
               <a:t>Click to edit Master title style</a:t>
             </a:r>
-            <a:endParaRPr lang="en-US"/>
           </a:p>
         </p:txBody>
       </p:sp>
@@ -6539,38 +6491,37 @@
           <a:p>
             <a:pPr lvl="0"/>
             <a:r>
-              <a:rPr lang="en-US" smtClean="0"/>
+              <a:rPr lang="en-US"/>
               <a:t>Click to edit Master text styles</a:t>
             </a:r>
           </a:p>
           <a:p>
             <a:pPr lvl="1"/>
             <a:r>
-              <a:rPr lang="en-US" smtClean="0"/>
+              <a:rPr lang="en-US"/>
               <a:t>Second level</a:t>
             </a:r>
           </a:p>
           <a:p>
             <a:pPr lvl="2"/>
             <a:r>
-              <a:rPr lang="en-US" smtClean="0"/>
+              <a:rPr lang="en-US"/>
               <a:t>Third level</a:t>
             </a:r>
           </a:p>
           <a:p>
             <a:pPr lvl="3"/>
             <a:r>
-              <a:rPr lang="en-US" smtClean="0"/>
+              <a:rPr lang="en-US"/>
               <a:t>Fourth level</a:t>
             </a:r>
           </a:p>
           <a:p>
             <a:pPr lvl="4"/>
             <a:r>
-              <a:rPr lang="en-US" smtClean="0"/>
+              <a:rPr lang="en-US"/>
               <a:t>Fifth level</a:t>
             </a:r>
-            <a:endParaRPr lang="en-US"/>
           </a:p>
         </p:txBody>
       </p:sp>
@@ -6624,38 +6575,37 @@
           <a:p>
             <a:pPr lvl="0"/>
             <a:r>
-              <a:rPr lang="en-US" smtClean="0"/>
+              <a:rPr lang="en-US"/>
               <a:t>Click to edit Master text styles</a:t>
             </a:r>
           </a:p>
           <a:p>
             <a:pPr lvl="1"/>
             <a:r>
-              <a:rPr lang="en-US" smtClean="0"/>
+              <a:rPr lang="en-US"/>
               <a:t>Second level</a:t>
             </a:r>
           </a:p>
           <a:p>
             <a:pPr lvl="2"/>
             <a:r>
-              <a:rPr lang="en-US" smtClean="0"/>
+              <a:rPr lang="en-US"/>
               <a:t>Third level</a:t>
             </a:r>
           </a:p>
           <a:p>
             <a:pPr lvl="3"/>
             <a:r>
-              <a:rPr lang="en-US" smtClean="0"/>
+              <a:rPr lang="en-US"/>
               <a:t>Fourth level</a:t>
             </a:r>
           </a:p>
           <a:p>
             <a:pPr lvl="4"/>
             <a:r>
-              <a:rPr lang="en-US" smtClean="0"/>
+              <a:rPr lang="en-US"/>
               <a:t>Fifth level</a:t>
             </a:r>
-            <a:endParaRPr lang="en-US"/>
           </a:p>
         </p:txBody>
       </p:sp>
@@ -6676,7 +6626,7 @@
           <a:p>
             <a:fld id="{699DC775-C286-4358-8C92-D7E584E969B3}" type="datetimeFigureOut">
               <a:rPr lang="en-US" smtClean="0"/>
-              <a:t>4/7/2019</a:t>
+              <a:t>6/27/2019</a:t>
             </a:fld>
             <a:endParaRPr lang="en-US"/>
           </a:p>
@@ -6774,10 +6724,9 @@
           </a:lstStyle>
           <a:p>
             <a:r>
-              <a:rPr lang="en-US" smtClean="0"/>
+              <a:rPr lang="en-US"/>
               <a:t>Click to edit Master title style</a:t>
             </a:r>
-            <a:endParaRPr lang="en-US"/>
           </a:p>
         </p:txBody>
       </p:sp>
@@ -6840,7 +6789,7 @@
           <a:p>
             <a:pPr lvl="0"/>
             <a:r>
-              <a:rPr lang="en-US" smtClean="0"/>
+              <a:rPr lang="en-US"/>
               <a:t>Click to edit Master text styles</a:t>
             </a:r>
           </a:p>
@@ -6896,38 +6845,37 @@
           <a:p>
             <a:pPr lvl="0"/>
             <a:r>
-              <a:rPr lang="en-US" smtClean="0"/>
+              <a:rPr lang="en-US"/>
               <a:t>Click to edit Master text styles</a:t>
             </a:r>
           </a:p>
           <a:p>
             <a:pPr lvl="1"/>
             <a:r>
-              <a:rPr lang="en-US" smtClean="0"/>
+              <a:rPr lang="en-US"/>
               <a:t>Second level</a:t>
             </a:r>
           </a:p>
           <a:p>
             <a:pPr lvl="2"/>
             <a:r>
-              <a:rPr lang="en-US" smtClean="0"/>
+              <a:rPr lang="en-US"/>
               <a:t>Third level</a:t>
             </a:r>
           </a:p>
           <a:p>
             <a:pPr lvl="3"/>
             <a:r>
-              <a:rPr lang="en-US" smtClean="0"/>
+              <a:rPr lang="en-US"/>
               <a:t>Fourth level</a:t>
             </a:r>
           </a:p>
           <a:p>
             <a:pPr lvl="4"/>
             <a:r>
-              <a:rPr lang="en-US" smtClean="0"/>
+              <a:rPr lang="en-US"/>
               <a:t>Fifth level</a:t>
             </a:r>
-            <a:endParaRPr lang="en-US"/>
           </a:p>
         </p:txBody>
       </p:sp>
@@ -6990,7 +6938,7 @@
           <a:p>
             <a:pPr lvl="0"/>
             <a:r>
-              <a:rPr lang="en-US" smtClean="0"/>
+              <a:rPr lang="en-US"/>
               <a:t>Click to edit Master text styles</a:t>
             </a:r>
           </a:p>
@@ -7046,38 +6994,37 @@
           <a:p>
             <a:pPr lvl="0"/>
             <a:r>
-              <a:rPr lang="en-US" smtClean="0"/>
+              <a:rPr lang="en-US"/>
               <a:t>Click to edit Master text styles</a:t>
             </a:r>
           </a:p>
           <a:p>
             <a:pPr lvl="1"/>
             <a:r>
-              <a:rPr lang="en-US" smtClean="0"/>
+              <a:rPr lang="en-US"/>
               <a:t>Second level</a:t>
             </a:r>
           </a:p>
           <a:p>
             <a:pPr lvl="2"/>
             <a:r>
-              <a:rPr lang="en-US" smtClean="0"/>
+              <a:rPr lang="en-US"/>
               <a:t>Third level</a:t>
             </a:r>
           </a:p>
           <a:p>
             <a:pPr lvl="3"/>
             <a:r>
-              <a:rPr lang="en-US" smtClean="0"/>
+              <a:rPr lang="en-US"/>
               <a:t>Fourth level</a:t>
             </a:r>
           </a:p>
           <a:p>
             <a:pPr lvl="4"/>
             <a:r>
-              <a:rPr lang="en-US" smtClean="0"/>
+              <a:rPr lang="en-US"/>
               <a:t>Fifth level</a:t>
             </a:r>
-            <a:endParaRPr lang="en-US"/>
           </a:p>
         </p:txBody>
       </p:sp>
@@ -7098,7 +7045,7 @@
           <a:p>
             <a:fld id="{699DC775-C286-4358-8C92-D7E584E969B3}" type="datetimeFigureOut">
               <a:rPr lang="en-US" smtClean="0"/>
-              <a:t>4/7/2019</a:t>
+              <a:t>6/27/2019</a:t>
             </a:fld>
             <a:endParaRPr lang="en-US"/>
           </a:p>
@@ -7192,10 +7139,9 @@
           <a:lstStyle/>
           <a:p>
             <a:r>
-              <a:rPr lang="en-US" smtClean="0"/>
+              <a:rPr lang="en-US"/>
               <a:t>Click to edit Master title style</a:t>
             </a:r>
-            <a:endParaRPr lang="en-US"/>
           </a:p>
         </p:txBody>
       </p:sp>
@@ -7216,7 +7162,7 @@
           <a:p>
             <a:fld id="{699DC775-C286-4358-8C92-D7E584E969B3}" type="datetimeFigureOut">
               <a:rPr lang="en-US" smtClean="0"/>
-              <a:t>4/7/2019</a:t>
+              <a:t>6/27/2019</a:t>
             </a:fld>
             <a:endParaRPr lang="en-US"/>
           </a:p>
@@ -7311,7 +7257,7 @@
           <a:p>
             <a:fld id="{699DC775-C286-4358-8C92-D7E584E969B3}" type="datetimeFigureOut">
               <a:rPr lang="en-US" smtClean="0"/>
-              <a:t>4/7/2019</a:t>
+              <a:t>6/27/2019</a:t>
             </a:fld>
             <a:endParaRPr lang="en-US"/>
           </a:p>
@@ -7414,10 +7360,9 @@
           </a:lstStyle>
           <a:p>
             <a:r>
-              <a:rPr lang="en-US" smtClean="0"/>
+              <a:rPr lang="en-US"/>
               <a:t>Click to edit Master title style</a:t>
             </a:r>
-            <a:endParaRPr lang="en-US"/>
           </a:p>
         </p:txBody>
       </p:sp>
@@ -7471,38 +7416,37 @@
           <a:p>
             <a:pPr lvl="0"/>
             <a:r>
-              <a:rPr lang="en-US" smtClean="0"/>
+              <a:rPr lang="en-US"/>
               <a:t>Click to edit Master text styles</a:t>
             </a:r>
           </a:p>
           <a:p>
             <a:pPr lvl="1"/>
             <a:r>
-              <a:rPr lang="en-US" smtClean="0"/>
+              <a:rPr lang="en-US"/>
               <a:t>Second level</a:t>
             </a:r>
           </a:p>
           <a:p>
             <a:pPr lvl="2"/>
             <a:r>
-              <a:rPr lang="en-US" smtClean="0"/>
+              <a:rPr lang="en-US"/>
               <a:t>Third level</a:t>
             </a:r>
           </a:p>
           <a:p>
             <a:pPr lvl="3"/>
             <a:r>
-              <a:rPr lang="en-US" smtClean="0"/>
+              <a:rPr lang="en-US"/>
               <a:t>Fourth level</a:t>
             </a:r>
           </a:p>
           <a:p>
             <a:pPr lvl="4"/>
             <a:r>
-              <a:rPr lang="en-US" smtClean="0"/>
+              <a:rPr lang="en-US"/>
               <a:t>Fifth level</a:t>
             </a:r>
-            <a:endParaRPr lang="en-US"/>
           </a:p>
         </p:txBody>
       </p:sp>
@@ -7565,7 +7509,7 @@
           <a:p>
             <a:pPr lvl="0"/>
             <a:r>
-              <a:rPr lang="en-US" smtClean="0"/>
+              <a:rPr lang="en-US"/>
               <a:t>Click to edit Master text styles</a:t>
             </a:r>
           </a:p>
@@ -7588,7 +7532,7 @@
           <a:p>
             <a:fld id="{699DC775-C286-4358-8C92-D7E584E969B3}" type="datetimeFigureOut">
               <a:rPr lang="en-US" smtClean="0"/>
-              <a:t>4/7/2019</a:t>
+              <a:t>6/27/2019</a:t>
             </a:fld>
             <a:endParaRPr lang="en-US"/>
           </a:p>
@@ -7691,10 +7635,9 @@
           </a:lstStyle>
           <a:p>
             <a:r>
-              <a:rPr lang="en-US" smtClean="0"/>
+              <a:rPr lang="en-US"/>
               <a:t>Click to edit Master title style</a:t>
             </a:r>
-            <a:endParaRPr lang="en-US"/>
           </a:p>
         </p:txBody>
       </p:sp>
@@ -7818,7 +7761,7 @@
           <a:p>
             <a:pPr lvl="0"/>
             <a:r>
-              <a:rPr lang="en-US" smtClean="0"/>
+              <a:rPr lang="en-US"/>
               <a:t>Click to edit Master text styles</a:t>
             </a:r>
           </a:p>
@@ -7841,7 +7784,7 @@
           <a:p>
             <a:fld id="{699DC775-C286-4358-8C92-D7E584E969B3}" type="datetimeFigureOut">
               <a:rPr lang="en-US" smtClean="0"/>
-              <a:t>4/7/2019</a:t>
+              <a:t>6/27/2019</a:t>
             </a:fld>
             <a:endParaRPr lang="en-US"/>
           </a:p>
@@ -7953,10 +7896,9 @@
           <a:lstStyle/>
           <a:p>
             <a:r>
-              <a:rPr lang="en-US" smtClean="0"/>
+              <a:rPr lang="en-US"/>
               <a:t>Click to edit Master title style</a:t>
             </a:r>
-            <a:endParaRPr lang="en-US"/>
           </a:p>
         </p:txBody>
       </p:sp>
@@ -7987,38 +7929,37 @@
           <a:p>
             <a:pPr lvl="0"/>
             <a:r>
-              <a:rPr lang="en-US" smtClean="0"/>
+              <a:rPr lang="en-US"/>
               <a:t>Click to edit Master text styles</a:t>
             </a:r>
           </a:p>
           <a:p>
             <a:pPr lvl="1"/>
             <a:r>
-              <a:rPr lang="en-US" smtClean="0"/>
+              <a:rPr lang="en-US"/>
               <a:t>Second level</a:t>
             </a:r>
           </a:p>
           <a:p>
             <a:pPr lvl="2"/>
             <a:r>
-              <a:rPr lang="en-US" smtClean="0"/>
+              <a:rPr lang="en-US"/>
               <a:t>Third level</a:t>
             </a:r>
           </a:p>
           <a:p>
             <a:pPr lvl="3"/>
             <a:r>
-              <a:rPr lang="en-US" smtClean="0"/>
+              <a:rPr lang="en-US"/>
               <a:t>Fourth level</a:t>
             </a:r>
           </a:p>
           <a:p>
             <a:pPr lvl="4"/>
             <a:r>
-              <a:rPr lang="en-US" smtClean="0"/>
+              <a:rPr lang="en-US"/>
               <a:t>Fifth level</a:t>
             </a:r>
-            <a:endParaRPr lang="en-US"/>
           </a:p>
         </p:txBody>
       </p:sp>
@@ -8057,7 +7998,7 @@
           <a:p>
             <a:fld id="{699DC775-C286-4358-8C92-D7E584E969B3}" type="datetimeFigureOut">
               <a:rPr lang="en-US" smtClean="0"/>
-              <a:t>4/7/2019</a:t>
+              <a:t>6/27/2019</a:t>
             </a:fld>
             <a:endParaRPr lang="en-US"/>
           </a:p>
@@ -8466,10 +8407,9 @@
           <a:lstStyle/>
           <a:p>
             <a:r>
-              <a:rPr lang="en-US" smtClean="0"/>
+              <a:rPr lang="en-US"/>
               <a:t>Click to edit Master title style</a:t>
             </a:r>
-            <a:endParaRPr lang="en-US"/>
           </a:p>
         </p:txBody>
       </p:sp>
@@ -8500,38 +8440,37 @@
           <a:p>
             <a:pPr lvl="0"/>
             <a:r>
-              <a:rPr lang="en-US" smtClean="0"/>
+              <a:rPr lang="en-US"/>
               <a:t>Click to edit Master text styles</a:t>
             </a:r>
           </a:p>
           <a:p>
             <a:pPr lvl="1"/>
             <a:r>
-              <a:rPr lang="en-US" smtClean="0"/>
+              <a:rPr lang="en-US"/>
               <a:t>Second level</a:t>
             </a:r>
           </a:p>
           <a:p>
             <a:pPr lvl="2"/>
             <a:r>
-              <a:rPr lang="en-US" smtClean="0"/>
+              <a:rPr lang="en-US"/>
               <a:t>Third level</a:t>
             </a:r>
           </a:p>
           <a:p>
             <a:pPr lvl="3"/>
             <a:r>
-              <a:rPr lang="en-US" smtClean="0"/>
+              <a:rPr lang="en-US"/>
               <a:t>Fourth level</a:t>
             </a:r>
           </a:p>
           <a:p>
             <a:pPr lvl="4"/>
             <a:r>
-              <a:rPr lang="en-US" smtClean="0"/>
+              <a:rPr lang="en-US"/>
               <a:t>Fifth level</a:t>
             </a:r>
-            <a:endParaRPr lang="en-US"/>
           </a:p>
         </p:txBody>
       </p:sp>
@@ -8570,7 +8509,7 @@
           <a:p>
             <a:fld id="{699DC775-C286-4358-8C92-D7E584E969B3}" type="datetimeFigureOut">
               <a:rPr lang="en-US" smtClean="0"/>
-              <a:t>4/7/2019</a:t>
+              <a:t>6/27/2019</a:t>
             </a:fld>
             <a:endParaRPr lang="en-US"/>
           </a:p>
@@ -8979,10 +8918,9 @@
           <a:lstStyle/>
           <a:p>
             <a:r>
-              <a:rPr lang="en-US" dirty="0" smtClean="0"/>
+              <a:rPr lang="en-US" dirty="0"/>
               <a:t>Click to edit Master title style</a:t>
             </a:r>
-            <a:endParaRPr lang="en-US" dirty="0"/>
           </a:p>
         </p:txBody>
       </p:sp>
@@ -9013,38 +8951,37 @@
           <a:p>
             <a:pPr lvl="0"/>
             <a:r>
-              <a:rPr lang="en-US" smtClean="0"/>
+              <a:rPr lang="en-US"/>
               <a:t>Click to edit Master text styles</a:t>
             </a:r>
           </a:p>
           <a:p>
             <a:pPr lvl="1"/>
             <a:r>
-              <a:rPr lang="en-US" smtClean="0"/>
+              <a:rPr lang="en-US"/>
               <a:t>Second level</a:t>
             </a:r>
           </a:p>
           <a:p>
             <a:pPr lvl="2"/>
             <a:r>
-              <a:rPr lang="en-US" smtClean="0"/>
+              <a:rPr lang="en-US"/>
               <a:t>Third level</a:t>
             </a:r>
           </a:p>
           <a:p>
             <a:pPr lvl="3"/>
             <a:r>
-              <a:rPr lang="en-US" smtClean="0"/>
+              <a:rPr lang="en-US"/>
               <a:t>Fourth level</a:t>
             </a:r>
           </a:p>
           <a:p>
             <a:pPr lvl="4"/>
             <a:r>
-              <a:rPr lang="en-US" smtClean="0"/>
+              <a:rPr lang="en-US"/>
               <a:t>Fifth level</a:t>
             </a:r>
-            <a:endParaRPr lang="en-US"/>
           </a:p>
         </p:txBody>
       </p:sp>
@@ -9083,7 +9020,7 @@
           <a:p>
             <a:fld id="{699DC775-C286-4358-8C92-D7E584E969B3}" type="datetimeFigureOut">
               <a:rPr lang="en-US" smtClean="0"/>
-              <a:t>4/7/2019</a:t>
+              <a:t>6/27/2019</a:t>
             </a:fld>
             <a:endParaRPr lang="en-US"/>
           </a:p>
@@ -9476,7 +9413,7 @@
           <a:lstStyle/>
           <a:p>
             <a:r>
-              <a:rPr lang="en-US" sz="5400" b="1" dirty="0" err="1" smtClean="0">
+              <a:rPr lang="en-US" sz="5400" b="1" dirty="0" err="1">
                 <a:solidFill>
                   <a:schemeClr val="accent6">
                     <a:lumMod val="75000"/>
@@ -9486,7 +9423,7 @@
               <a:t>PowerPointLabs</a:t>
             </a:r>
             <a:r>
-              <a:rPr lang="en-US" sz="5400" b="1" dirty="0" smtClean="0">
+              <a:rPr lang="en-US" sz="5400" b="1" dirty="0">
                 <a:solidFill>
                   <a:schemeClr val="accent6">
                     <a:lumMod val="75000"/>
@@ -9524,7 +9461,7 @@
               <a:buNone/>
             </a:pPr>
             <a:r>
-              <a:rPr lang="en-US" b="1" dirty="0" smtClean="0">
+              <a:rPr lang="en-US" b="1" dirty="0">
                 <a:solidFill>
                   <a:srgbClr val="0070C0"/>
                 </a:solidFill>
@@ -9535,34 +9472,21 @@
           <a:p>
             <a:pPr marL="285750" indent="-285750"/>
             <a:r>
-              <a:rPr lang="en-US" b="1" dirty="0" smtClean="0">
-                <a:solidFill>
-                  <a:srgbClr val="0070C0"/>
-                </a:solidFill>
-              </a:rPr>
-              <a:t>DO </a:t>
-            </a:r>
-            <a:r>
               <a:rPr lang="en-US" b="1" dirty="0">
                 <a:solidFill>
                   <a:srgbClr val="0070C0"/>
                 </a:solidFill>
               </a:rPr>
-              <a:t>NOT SAVE </a:t>
-            </a:r>
-            <a:r>
-              <a:rPr lang="en-US" dirty="0" smtClean="0">
+              <a:t>DO NOT SAVE </a:t>
+            </a:r>
+            <a:r>
+              <a:rPr lang="en-US" dirty="0">
                 <a:solidFill>
                   <a:srgbClr val="0070C0"/>
                 </a:solidFill>
               </a:rPr>
               <a:t>these slides after testing. Keep this file in its original form.</a:t>
             </a:r>
-            <a:endParaRPr lang="en-US" dirty="0">
-              <a:solidFill>
-                <a:srgbClr val="0070C0"/>
-              </a:solidFill>
-            </a:endParaRPr>
           </a:p>
           <a:p>
             <a:pPr marL="285750" indent="-285750"/>
@@ -9572,47 +9496,7 @@
                   <a:srgbClr val="0070C0"/>
                 </a:solidFill>
               </a:rPr>
-              <a:t>If </a:t>
-            </a:r>
-            <a:r>
-              <a:rPr lang="en-US" dirty="0" smtClean="0">
-                <a:solidFill>
-                  <a:srgbClr val="0070C0"/>
-                </a:solidFill>
-              </a:rPr>
-              <a:t>your </a:t>
-            </a:r>
-            <a:r>
-              <a:rPr lang="en-US" dirty="0">
-                <a:solidFill>
-                  <a:srgbClr val="0070C0"/>
-                </a:solidFill>
-              </a:rPr>
-              <a:t>result </a:t>
-            </a:r>
-            <a:r>
-              <a:rPr lang="en-US" dirty="0" smtClean="0">
-                <a:solidFill>
-                  <a:srgbClr val="0070C0"/>
-                </a:solidFill>
-              </a:rPr>
-              <a:t>is different from the </a:t>
-            </a:r>
-            <a:r>
-              <a:rPr lang="en-US" dirty="0">
-                <a:solidFill>
-                  <a:srgbClr val="0070C0"/>
-                </a:solidFill>
-              </a:rPr>
-              <a:t>expected output, </a:t>
-            </a:r>
-            <a:r>
-              <a:rPr lang="en-US" dirty="0" smtClean="0">
-                <a:solidFill>
-                  <a:srgbClr val="0070C0"/>
-                </a:solidFill>
-              </a:rPr>
-              <a:t>please submit a bug report (attach slides/screenshots as necessary).</a:t>
+              <a:t>If your result is different from the expected output, please submit a bug report (attach slides/screenshots as necessary).</a:t>
             </a:r>
             <a:endParaRPr lang="en-SG" dirty="0">
               <a:solidFill>
@@ -9635,13 +9519,6 @@
   <p:clrMapOvr>
     <a:masterClrMapping/>
   </p:clrMapOvr>
-  <p:timing>
-    <p:tnLst>
-      <p:par>
-        <p:cTn id="1" dur="indefinite" restart="never" nodeType="tmRoot"/>
-      </p:par>
-    </p:tnLst>
-  </p:timing>
 </p:sld>
 </file>
 
@@ -9714,18 +9591,13 @@
           <a:p>
             <a:pPr algn="ctr"/>
             <a:r>
-              <a:rPr lang="en-SG" sz="1600" smtClean="0">
+              <a:rPr lang="en-SG" sz="1600">
                 <a:solidFill>
                   <a:srgbClr val="FFFFFF"/>
                 </a:solidFill>
               </a:rPr>
               <a:t>?</a:t>
             </a:r>
-            <a:endParaRPr lang="en-SG" sz="1600">
-              <a:solidFill>
-                <a:srgbClr val="FFFFFF"/>
-              </a:solidFill>
-            </a:endParaRPr>
           </a:p>
         </p:txBody>
       </p:sp>
@@ -9785,7 +9657,7 @@
           <a:p>
             <a:pPr algn="ctr"/>
             <a:r>
-              <a:rPr lang="en-US" sz="1600" dirty="0" smtClean="0">
+              <a:rPr lang="en-US" sz="1600" dirty="0">
                 <a:solidFill>
                   <a:srgbClr val="FFFFFF"/>
                 </a:solidFill>
@@ -9852,18 +9724,13 @@
           <a:p>
             <a:pPr algn="ctr"/>
             <a:r>
-              <a:rPr lang="en-SG" sz="1600" smtClean="0">
+              <a:rPr lang="en-SG" sz="1600">
                 <a:solidFill>
                   <a:srgbClr val="FFFFFF"/>
                 </a:solidFill>
               </a:rPr>
               <a:t>?</a:t>
             </a:r>
-            <a:endParaRPr lang="en-SG" sz="1600">
-              <a:solidFill>
-                <a:srgbClr val="FFFFFF"/>
-              </a:solidFill>
-            </a:endParaRPr>
           </a:p>
         </p:txBody>
       </p:sp>
@@ -9923,7 +9790,7 @@
           <a:p>
             <a:pPr algn="ctr"/>
             <a:r>
-              <a:rPr lang="en-US" sz="1600" dirty="0" smtClean="0">
+              <a:rPr lang="en-US" sz="1600" dirty="0">
                 <a:solidFill>
                   <a:srgbClr val="FFFFFF"/>
                 </a:solidFill>
@@ -10294,18 +10161,13 @@
           <a:p>
             <a:pPr algn="ctr"/>
             <a:r>
-              <a:rPr lang="en-SG" sz="1600" smtClean="0">
+              <a:rPr lang="en-SG" sz="1600">
                 <a:solidFill>
                   <a:srgbClr val="FFFFFF"/>
                 </a:solidFill>
               </a:rPr>
               <a:t>?</a:t>
             </a:r>
-            <a:endParaRPr lang="en-SG" sz="1600">
-              <a:solidFill>
-                <a:srgbClr val="FFFFFF"/>
-              </a:solidFill>
-            </a:endParaRPr>
           </a:p>
         </p:txBody>
       </p:sp>
@@ -10365,7 +10227,7 @@
           <a:p>
             <a:pPr algn="ctr"/>
             <a:r>
-              <a:rPr lang="en-US" sz="1600" dirty="0" smtClean="0">
+              <a:rPr lang="en-US" sz="1600" dirty="0">
                 <a:solidFill>
                   <a:srgbClr val="FFFFFF"/>
                 </a:solidFill>
@@ -10432,18 +10294,13 @@
           <a:p>
             <a:pPr algn="ctr"/>
             <a:r>
-              <a:rPr lang="en-SG" sz="1600" smtClean="0">
+              <a:rPr lang="en-SG" sz="1600">
                 <a:solidFill>
                   <a:srgbClr val="FFFFFF"/>
                 </a:solidFill>
               </a:rPr>
               <a:t>?</a:t>
             </a:r>
-            <a:endParaRPr lang="en-SG" sz="1600">
-              <a:solidFill>
-                <a:srgbClr val="FFFFFF"/>
-              </a:solidFill>
-            </a:endParaRPr>
           </a:p>
         </p:txBody>
       </p:sp>
@@ -10503,7 +10360,7 @@
           <a:p>
             <a:pPr algn="ctr"/>
             <a:r>
-              <a:rPr lang="en-US" sz="1600" dirty="0" smtClean="0">
+              <a:rPr lang="en-US" sz="1600" dirty="0">
                 <a:solidFill>
                   <a:srgbClr val="FFFFFF"/>
                 </a:solidFill>
@@ -10570,18 +10427,13 @@
           <a:p>
             <a:pPr algn="ctr"/>
             <a:r>
-              <a:rPr lang="en-SG" sz="1600" smtClean="0">
+              <a:rPr lang="en-SG" sz="1600">
                 <a:solidFill>
                   <a:srgbClr val="FFFFFF"/>
                 </a:solidFill>
               </a:rPr>
               <a:t>?</a:t>
             </a:r>
-            <a:endParaRPr lang="en-SG" sz="1600">
-              <a:solidFill>
-                <a:srgbClr val="FFFFFF"/>
-              </a:solidFill>
-            </a:endParaRPr>
           </a:p>
         </p:txBody>
       </p:sp>
@@ -11111,12 +10963,8 @@
           <a:lstStyle/>
           <a:p>
             <a:r>
-              <a:rPr lang="en-US" dirty="0" smtClean="0"/>
-              <a:t>Create Tooltip: </a:t>
-            </a:r>
-            <a:r>
-              <a:rPr lang="en-US" dirty="0" smtClean="0"/>
-              <a:t>Create multiple tooltips</a:t>
+              <a:rPr lang="en-US" dirty="0"/>
+              <a:t>Create Tooltip: Create multiple tooltips</a:t>
             </a:r>
             <a:endParaRPr lang="en-SG" dirty="0"/>
           </a:p>
@@ -11143,12 +10991,8 @@
           <a:lstStyle/>
           <a:p>
             <a:r>
-              <a:rPr lang="en-US" dirty="0" smtClean="0"/>
-              <a:t>Click ‘Create Tooltip’ </a:t>
-            </a:r>
-            <a:r>
-              <a:rPr lang="en-US" dirty="0" smtClean="0"/>
-              <a:t>5 times in succession.</a:t>
+              <a:rPr lang="en-US" dirty="0"/>
+              <a:t>Click ‘Create Tooltip’ 5 times in succession.</a:t>
             </a:r>
             <a:endParaRPr lang="en-SG" dirty="0"/>
           </a:p>
@@ -11164,13 +11008,6 @@
   <p:clrMapOvr>
     <a:masterClrMapping/>
   </p:clrMapOvr>
-  <p:timing>
-    <p:tnLst>
-      <p:par>
-        <p:cTn id="1" dur="indefinite" restart="never" nodeType="tmRoot"/>
-      </p:par>
-    </p:tnLst>
-  </p:timing>
 </p:sld>
 </file>
 
@@ -11201,13 +11038,6 @@
   <p:clrMapOvr>
     <a:masterClrMapping/>
   </p:clrMapOvr>
-  <p:timing>
-    <p:tnLst>
-      <p:par>
-        <p:cTn id="1" dur="indefinite" restart="never" nodeType="tmRoot"/>
-      </p:par>
-    </p:tnLst>
-  </p:timing>
 </p:sld>
 </file>
 
@@ -11230,7 +11060,13 @@
       </p:grpSpPr>
       <p:sp>
         <p:nvSpPr>
-          <p:cNvPr id="8" name="Oval 7"/>
+          <p:cNvPr id="2" name="Oval 1">
+            <a:extLst>
+              <a:ext uri="{FF2B5EF4-FFF2-40B4-BE49-F238E27FC236}">
+                <a16:creationId xmlns:a16="http://schemas.microsoft.com/office/drawing/2014/main" id="{D220FAEC-3F34-40AC-90C4-8DF52DE96852}"/>
+              </a:ext>
+            </a:extLst>
+          </p:cNvPr>
           <p:cNvSpPr/>
           <p:nvPr/>
         </p:nvSpPr>
@@ -11280,24 +11116,25 @@
           <a:p>
             <a:pPr algn="ctr"/>
             <a:r>
-              <a:rPr lang="en-SG" sz="1600" smtClean="0">
+              <a:rPr lang="en-SG" sz="1600">
                 <a:solidFill>
                   <a:srgbClr val="FFFFFF"/>
                 </a:solidFill>
               </a:rPr>
               <a:t>?</a:t>
             </a:r>
-            <a:endParaRPr lang="en-SG" sz="1600">
-              <a:solidFill>
-                <a:srgbClr val="FFFFFF"/>
-              </a:solidFill>
-            </a:endParaRPr>
-          </a:p>
-        </p:txBody>
-      </p:sp>
-      <p:sp>
-        <p:nvSpPr>
-          <p:cNvPr id="9" name="Rounded Rectangular Callout 8"/>
+          </a:p>
+        </p:txBody>
+      </p:sp>
+      <p:sp>
+        <p:nvSpPr>
+          <p:cNvPr id="3" name="Speech Bubble: Rectangle with Corners Rounded 2">
+            <a:extLst>
+              <a:ext uri="{FF2B5EF4-FFF2-40B4-BE49-F238E27FC236}">
+                <a16:creationId xmlns:a16="http://schemas.microsoft.com/office/drawing/2014/main" id="{7026585D-D5D6-447E-A822-BFABA2271EEC}"/>
+              </a:ext>
+            </a:extLst>
+          </p:cNvPr>
           <p:cNvSpPr/>
           <p:nvPr/>
         </p:nvSpPr>
@@ -11344,7 +11181,7 @@
           </a:fontRef>
         </p:style>
         <p:txBody>
-          <a:bodyPr rtlCol="0" anchor="ctr">
+          <a:bodyPr wrap="square" rtlCol="0" anchor="ctr">
             <a:normAutofit/>
           </a:bodyPr>
           <a:lstStyle/>
@@ -11360,13 +11197,19 @@
       </p:sp>
       <p:sp>
         <p:nvSpPr>
-          <p:cNvPr id="10" name="Oval 9"/>
+          <p:cNvPr id="4" name="Oval 3">
+            <a:extLst>
+              <a:ext uri="{FF2B5EF4-FFF2-40B4-BE49-F238E27FC236}">
+                <a16:creationId xmlns:a16="http://schemas.microsoft.com/office/drawing/2014/main" id="{9A8BB90C-CE84-4833-9A5F-CE9FACE77ABD}"/>
+              </a:ext>
+            </a:extLst>
+          </p:cNvPr>
           <p:cNvSpPr/>
           <p:nvPr/>
         </p:nvSpPr>
         <p:spPr>
           <a:xfrm>
-            <a:off x="2540000" y="2540000"/>
+            <a:off x="2794000" y="2794000"/>
             <a:ext cx="317500" cy="317500"/>
           </a:xfrm>
           <a:prstGeom prst="ellipse">
@@ -11410,30 +11253,31 @@
           <a:p>
             <a:pPr algn="ctr"/>
             <a:r>
-              <a:rPr lang="en-SG" sz="1600" smtClean="0">
+              <a:rPr lang="en-SG" sz="1600">
                 <a:solidFill>
                   <a:srgbClr val="FFFFFF"/>
                 </a:solidFill>
               </a:rPr>
               <a:t>?</a:t>
             </a:r>
-            <a:endParaRPr lang="en-SG" sz="1600">
-              <a:solidFill>
-                <a:srgbClr val="FFFFFF"/>
-              </a:solidFill>
-            </a:endParaRPr>
-          </a:p>
-        </p:txBody>
-      </p:sp>
-      <p:sp>
-        <p:nvSpPr>
-          <p:cNvPr id="11" name="Rounded Rectangular Callout 10"/>
+          </a:p>
+        </p:txBody>
+      </p:sp>
+      <p:sp>
+        <p:nvSpPr>
+          <p:cNvPr id="5" name="Speech Bubble: Rectangle with Corners Rounded 4">
+            <a:extLst>
+              <a:ext uri="{FF2B5EF4-FFF2-40B4-BE49-F238E27FC236}">
+                <a16:creationId xmlns:a16="http://schemas.microsoft.com/office/drawing/2014/main" id="{15F49016-14DE-491E-8A6E-D6BB0C1956D2}"/>
+              </a:ext>
+            </a:extLst>
+          </p:cNvPr>
           <p:cNvSpPr/>
           <p:nvPr/>
         </p:nvSpPr>
         <p:spPr>
           <a:xfrm>
-            <a:off x="2143119" y="984250"/>
+            <a:off x="2397119" y="1238250"/>
             <a:ext cx="1905000" cy="1270000"/>
           </a:xfrm>
           <a:prstGeom prst="wedgeRoundRectCallout">
@@ -11474,7 +11318,7 @@
           </a:fontRef>
         </p:style>
         <p:txBody>
-          <a:bodyPr rtlCol="0" anchor="ctr">
+          <a:bodyPr wrap="square" rtlCol="0" anchor="ctr">
             <a:normAutofit/>
           </a:bodyPr>
           <a:lstStyle/>
@@ -11490,13 +11334,19 @@
       </p:sp>
       <p:sp>
         <p:nvSpPr>
-          <p:cNvPr id="12" name="Oval 11"/>
+          <p:cNvPr id="6" name="Oval 5">
+            <a:extLst>
+              <a:ext uri="{FF2B5EF4-FFF2-40B4-BE49-F238E27FC236}">
+                <a16:creationId xmlns:a16="http://schemas.microsoft.com/office/drawing/2014/main" id="{EA2B30FA-5B62-44A6-B3D0-CF5AD0AD7145}"/>
+              </a:ext>
+            </a:extLst>
+          </p:cNvPr>
           <p:cNvSpPr/>
           <p:nvPr/>
         </p:nvSpPr>
         <p:spPr>
           <a:xfrm>
-            <a:off x="2540000" y="2540000"/>
+            <a:off x="3048000" y="3048000"/>
             <a:ext cx="317500" cy="317500"/>
           </a:xfrm>
           <a:prstGeom prst="ellipse">
@@ -11540,30 +11390,31 @@
           <a:p>
             <a:pPr algn="ctr"/>
             <a:r>
-              <a:rPr lang="en-SG" sz="1600" smtClean="0">
+              <a:rPr lang="en-SG" sz="1600">
                 <a:solidFill>
                   <a:srgbClr val="FFFFFF"/>
                 </a:solidFill>
               </a:rPr>
               <a:t>?</a:t>
             </a:r>
-            <a:endParaRPr lang="en-SG" sz="1600">
-              <a:solidFill>
-                <a:srgbClr val="FFFFFF"/>
-              </a:solidFill>
-            </a:endParaRPr>
-          </a:p>
-        </p:txBody>
-      </p:sp>
-      <p:sp>
-        <p:nvSpPr>
-          <p:cNvPr id="13" name="Rounded Rectangular Callout 12"/>
+          </a:p>
+        </p:txBody>
+      </p:sp>
+      <p:sp>
+        <p:nvSpPr>
+          <p:cNvPr id="7" name="Speech Bubble: Rectangle with Corners Rounded 6">
+            <a:extLst>
+              <a:ext uri="{FF2B5EF4-FFF2-40B4-BE49-F238E27FC236}">
+                <a16:creationId xmlns:a16="http://schemas.microsoft.com/office/drawing/2014/main" id="{BD713C19-D9BD-4752-BE7B-8254D91EF854}"/>
+              </a:ext>
+            </a:extLst>
+          </p:cNvPr>
           <p:cNvSpPr/>
           <p:nvPr/>
         </p:nvSpPr>
         <p:spPr>
           <a:xfrm>
-            <a:off x="2143119" y="984250"/>
+            <a:off x="2651119" y="1492250"/>
             <a:ext cx="1905000" cy="1270000"/>
           </a:xfrm>
           <a:prstGeom prst="wedgeRoundRectCallout">
@@ -11604,7 +11455,7 @@
           </a:fontRef>
         </p:style>
         <p:txBody>
-          <a:bodyPr rtlCol="0" anchor="ctr">
+          <a:bodyPr wrap="square" rtlCol="0" anchor="ctr">
             <a:normAutofit/>
           </a:bodyPr>
           <a:lstStyle/>
@@ -11620,13 +11471,19 @@
       </p:sp>
       <p:sp>
         <p:nvSpPr>
-          <p:cNvPr id="14" name="Oval 13"/>
+          <p:cNvPr id="8" name="Oval 7">
+            <a:extLst>
+              <a:ext uri="{FF2B5EF4-FFF2-40B4-BE49-F238E27FC236}">
+                <a16:creationId xmlns:a16="http://schemas.microsoft.com/office/drawing/2014/main" id="{9AB7F7CD-D7A0-41D1-B747-3B0AF714C17F}"/>
+              </a:ext>
+            </a:extLst>
+          </p:cNvPr>
           <p:cNvSpPr/>
           <p:nvPr/>
         </p:nvSpPr>
         <p:spPr>
           <a:xfrm>
-            <a:off x="2540000" y="2540000"/>
+            <a:off x="3302000" y="3302000"/>
             <a:ext cx="317500" cy="317500"/>
           </a:xfrm>
           <a:prstGeom prst="ellipse">
@@ -11670,30 +11527,31 @@
           <a:p>
             <a:pPr algn="ctr"/>
             <a:r>
-              <a:rPr lang="en-SG" sz="1600" smtClean="0">
+              <a:rPr lang="en-SG" sz="1600">
                 <a:solidFill>
                   <a:srgbClr val="FFFFFF"/>
                 </a:solidFill>
               </a:rPr>
               <a:t>?</a:t>
             </a:r>
-            <a:endParaRPr lang="en-SG" sz="1600">
-              <a:solidFill>
-                <a:srgbClr val="FFFFFF"/>
-              </a:solidFill>
-            </a:endParaRPr>
-          </a:p>
-        </p:txBody>
-      </p:sp>
-      <p:sp>
-        <p:nvSpPr>
-          <p:cNvPr id="15" name="Rounded Rectangular Callout 14"/>
+          </a:p>
+        </p:txBody>
+      </p:sp>
+      <p:sp>
+        <p:nvSpPr>
+          <p:cNvPr id="9" name="Speech Bubble: Rectangle with Corners Rounded 8">
+            <a:extLst>
+              <a:ext uri="{FF2B5EF4-FFF2-40B4-BE49-F238E27FC236}">
+                <a16:creationId xmlns:a16="http://schemas.microsoft.com/office/drawing/2014/main" id="{8852CDFB-EECA-490D-BD4E-0C48301F4975}"/>
+              </a:ext>
+            </a:extLst>
+          </p:cNvPr>
           <p:cNvSpPr/>
           <p:nvPr/>
         </p:nvSpPr>
         <p:spPr>
           <a:xfrm>
-            <a:off x="2143119" y="984250"/>
+            <a:off x="2905119" y="1746250"/>
             <a:ext cx="1905000" cy="1270000"/>
           </a:xfrm>
           <a:prstGeom prst="wedgeRoundRectCallout">
@@ -11734,7 +11592,7 @@
           </a:fontRef>
         </p:style>
         <p:txBody>
-          <a:bodyPr rtlCol="0" anchor="ctr">
+          <a:bodyPr wrap="square" rtlCol="0" anchor="ctr">
             <a:normAutofit/>
           </a:bodyPr>
           <a:lstStyle/>
@@ -11750,13 +11608,19 @@
       </p:sp>
       <p:sp>
         <p:nvSpPr>
-          <p:cNvPr id="16" name="Oval 15"/>
+          <p:cNvPr id="10" name="Oval 9">
+            <a:extLst>
+              <a:ext uri="{FF2B5EF4-FFF2-40B4-BE49-F238E27FC236}">
+                <a16:creationId xmlns:a16="http://schemas.microsoft.com/office/drawing/2014/main" id="{C0982F9F-2BF8-4085-82E5-7594DC23EA08}"/>
+              </a:ext>
+            </a:extLst>
+          </p:cNvPr>
           <p:cNvSpPr/>
           <p:nvPr/>
         </p:nvSpPr>
         <p:spPr>
           <a:xfrm>
-            <a:off x="2540000" y="2540000"/>
+            <a:off x="3556000" y="3556000"/>
             <a:ext cx="317500" cy="317500"/>
           </a:xfrm>
           <a:prstGeom prst="ellipse">
@@ -11800,30 +11664,31 @@
           <a:p>
             <a:pPr algn="ctr"/>
             <a:r>
-              <a:rPr lang="en-SG" sz="1600" smtClean="0">
+              <a:rPr lang="en-SG" sz="1600">
                 <a:solidFill>
                   <a:srgbClr val="FFFFFF"/>
                 </a:solidFill>
               </a:rPr>
               <a:t>?</a:t>
             </a:r>
-            <a:endParaRPr lang="en-SG" sz="1600">
-              <a:solidFill>
-                <a:srgbClr val="FFFFFF"/>
-              </a:solidFill>
-            </a:endParaRPr>
-          </a:p>
-        </p:txBody>
-      </p:sp>
-      <p:sp>
-        <p:nvSpPr>
-          <p:cNvPr id="17" name="Rounded Rectangular Callout 16"/>
+          </a:p>
+        </p:txBody>
+      </p:sp>
+      <p:sp>
+        <p:nvSpPr>
+          <p:cNvPr id="11" name="Speech Bubble: Rectangle with Corners Rounded 10">
+            <a:extLst>
+              <a:ext uri="{FF2B5EF4-FFF2-40B4-BE49-F238E27FC236}">
+                <a16:creationId xmlns:a16="http://schemas.microsoft.com/office/drawing/2014/main" id="{43E5418F-1861-46B4-A816-6B1EBAA52E81}"/>
+              </a:ext>
+            </a:extLst>
+          </p:cNvPr>
           <p:cNvSpPr/>
           <p:nvPr/>
         </p:nvSpPr>
         <p:spPr>
           <a:xfrm>
-            <a:off x="2143119" y="984250"/>
+            <a:off x="3159119" y="2000250"/>
             <a:ext cx="1905000" cy="1270000"/>
           </a:xfrm>
           <a:prstGeom prst="wedgeRoundRectCallout">
@@ -11864,7 +11729,7 @@
           </a:fontRef>
         </p:style>
         <p:txBody>
-          <a:bodyPr rtlCol="0" anchor="ctr">
+          <a:bodyPr wrap="square" rtlCol="0" anchor="ctr">
             <a:normAutofit/>
           </a:bodyPr>
           <a:lstStyle/>
@@ -11881,7 +11746,7 @@
     </p:spTree>
     <p:extLst>
       <p:ext uri="{BB962C8B-B14F-4D97-AF65-F5344CB8AC3E}">
-        <p14:creationId xmlns:p14="http://schemas.microsoft.com/office/powerpoint/2010/main" val="1714793549"/>
+        <p14:creationId xmlns:p14="http://schemas.microsoft.com/office/powerpoint/2010/main" val="1115305802"/>
       </p:ext>
     </p:extLst>
   </p:cSld>
@@ -11898,7 +11763,7 @@
                 <p:stCondLst>
                   <p:cond evt="onClick" delay="0">
                     <p:tgtEl>
-                      <p:spTgt spid="8"/>
+                      <p:spTgt spid="2"/>
                     </p:tgtEl>
                   </p:cond>
                 </p:stCondLst>
@@ -11932,7 +11797,7 @@
                                           </p:stCondLst>
                                         </p:cTn>
                                         <p:tgtEl>
-                                          <p:spTgt spid="9"/>
+                                          <p:spTgt spid="3"/>
                                         </p:tgtEl>
                                         <p:attrNameLst>
                                           <p:attrName>style.visibility</p:attrName>
@@ -11946,7 +11811,7 @@
                                       <p:cBhvr>
                                         <p:cTn id="7" dur="500"/>
                                         <p:tgtEl>
-                                          <p:spTgt spid="9"/>
+                                          <p:spTgt spid="3"/>
                                         </p:tgtEl>
                                       </p:cBhvr>
                                     </p:animEffect>
@@ -11981,13 +11846,400 @@
                                       <p:cBhvr>
                                         <p:cTn id="11" dur="500"/>
                                         <p:tgtEl>
+                                          <p:spTgt spid="3"/>
+                                        </p:tgtEl>
+                                      </p:cBhvr>
+                                    </p:animEffect>
+                                    <p:set>
+                                      <p:cBhvr>
+                                        <p:cTn id="12" dur="1" fill="hold">
+                                          <p:stCondLst>
+                                            <p:cond delay="499"/>
+                                          </p:stCondLst>
+                                        </p:cTn>
+                                        <p:tgtEl>
+                                          <p:spTgt spid="3"/>
+                                        </p:tgtEl>
+                                        <p:attrNameLst>
+                                          <p:attrName>style.visibility</p:attrName>
+                                        </p:attrNameLst>
+                                      </p:cBhvr>
+                                      <p:to>
+                                        <p:strVal val="hidden"/>
+                                      </p:to>
+                                    </p:set>
+                                  </p:childTnLst>
+                                </p:cTn>
+                              </p:par>
+                            </p:childTnLst>
+                          </p:cTn>
+                        </p:par>
+                      </p:childTnLst>
+                    </p:cTn>
+                  </p:par>
+                </p:childTnLst>
+              </p:cTn>
+              <p:nextCondLst>
+                <p:cond evt="onClick" delay="0">
+                  <p:tgtEl>
+                    <p:spTgt spid="2"/>
+                  </p:tgtEl>
+                </p:cond>
+              </p:nextCondLst>
+            </p:seq>
+            <p:seq concurrent="1" nextAc="seek">
+              <p:cTn id="13" restart="whenNotActive" fill="hold" evtFilter="cancelBubble" nodeType="interactiveSeq">
+                <p:stCondLst>
+                  <p:cond evt="onClick" delay="0">
+                    <p:tgtEl>
+                      <p:spTgt spid="4"/>
+                    </p:tgtEl>
+                  </p:cond>
+                </p:stCondLst>
+                <p:endSync evt="end" delay="0">
+                  <p:rtn val="all"/>
+                </p:endSync>
+                <p:childTnLst>
+                  <p:par>
+                    <p:cTn id="14" fill="hold">
+                      <p:stCondLst>
+                        <p:cond delay="0"/>
+                      </p:stCondLst>
+                      <p:childTnLst>
+                        <p:par>
+                          <p:cTn id="15" fill="hold">
+                            <p:stCondLst>
+                              <p:cond delay="0"/>
+                            </p:stCondLst>
+                            <p:childTnLst>
+                              <p:par>
+                                <p:cTn id="16" presetID="10" presetClass="entr" presetSubtype="0" fill="hold" grpId="0" nodeType="clickEffect">
+                                  <p:stCondLst>
+                                    <p:cond delay="0"/>
+                                  </p:stCondLst>
+                                  <p:childTnLst>
+                                    <p:set>
+                                      <p:cBhvr>
+                                        <p:cTn id="17" dur="1" fill="hold">
+                                          <p:stCondLst>
+                                            <p:cond delay="0"/>
+                                          </p:stCondLst>
+                                        </p:cTn>
+                                        <p:tgtEl>
+                                          <p:spTgt spid="5"/>
+                                        </p:tgtEl>
+                                        <p:attrNameLst>
+                                          <p:attrName>style.visibility</p:attrName>
+                                        </p:attrNameLst>
+                                      </p:cBhvr>
+                                      <p:to>
+                                        <p:strVal val="visible"/>
+                                      </p:to>
+                                    </p:set>
+                                    <p:animEffect transition="in" filter="fade">
+                                      <p:cBhvr>
+                                        <p:cTn id="18" dur="500"/>
+                                        <p:tgtEl>
+                                          <p:spTgt spid="5"/>
+                                        </p:tgtEl>
+                                      </p:cBhvr>
+                                    </p:animEffect>
+                                  </p:childTnLst>
+                                </p:cTn>
+                              </p:par>
+                            </p:childTnLst>
+                          </p:cTn>
+                        </p:par>
+                      </p:childTnLst>
+                    </p:cTn>
+                  </p:par>
+                  <p:par>
+                    <p:cTn id="19" fill="hold">
+                      <p:stCondLst>
+                        <p:cond delay="indefinite"/>
+                      </p:stCondLst>
+                      <p:childTnLst>
+                        <p:par>
+                          <p:cTn id="20" fill="hold">
+                            <p:stCondLst>
+                              <p:cond delay="0"/>
+                            </p:stCondLst>
+                            <p:childTnLst>
+                              <p:par>
+                                <p:cTn id="21" presetID="10" presetClass="exit" presetSubtype="0" fill="hold" grpId="1" nodeType="clickEffect">
+                                  <p:stCondLst>
+                                    <p:cond delay="0"/>
+                                  </p:stCondLst>
+                                  <p:childTnLst>
+                                    <p:animEffect transition="out" filter="fade">
+                                      <p:cBhvr>
+                                        <p:cTn id="22" dur="500"/>
+                                        <p:tgtEl>
+                                          <p:spTgt spid="5"/>
+                                        </p:tgtEl>
+                                      </p:cBhvr>
+                                    </p:animEffect>
+                                    <p:set>
+                                      <p:cBhvr>
+                                        <p:cTn id="23" dur="1" fill="hold">
+                                          <p:stCondLst>
+                                            <p:cond delay="499"/>
+                                          </p:stCondLst>
+                                        </p:cTn>
+                                        <p:tgtEl>
+                                          <p:spTgt spid="5"/>
+                                        </p:tgtEl>
+                                        <p:attrNameLst>
+                                          <p:attrName>style.visibility</p:attrName>
+                                        </p:attrNameLst>
+                                      </p:cBhvr>
+                                      <p:to>
+                                        <p:strVal val="hidden"/>
+                                      </p:to>
+                                    </p:set>
+                                  </p:childTnLst>
+                                </p:cTn>
+                              </p:par>
+                            </p:childTnLst>
+                          </p:cTn>
+                        </p:par>
+                      </p:childTnLst>
+                    </p:cTn>
+                  </p:par>
+                </p:childTnLst>
+              </p:cTn>
+              <p:nextCondLst>
+                <p:cond evt="onClick" delay="0">
+                  <p:tgtEl>
+                    <p:spTgt spid="4"/>
+                  </p:tgtEl>
+                </p:cond>
+              </p:nextCondLst>
+            </p:seq>
+            <p:seq concurrent="1" nextAc="seek">
+              <p:cTn id="24" restart="whenNotActive" fill="hold" evtFilter="cancelBubble" nodeType="interactiveSeq">
+                <p:stCondLst>
+                  <p:cond evt="onClick" delay="0">
+                    <p:tgtEl>
+                      <p:spTgt spid="6"/>
+                    </p:tgtEl>
+                  </p:cond>
+                </p:stCondLst>
+                <p:endSync evt="end" delay="0">
+                  <p:rtn val="all"/>
+                </p:endSync>
+                <p:childTnLst>
+                  <p:par>
+                    <p:cTn id="25" fill="hold">
+                      <p:stCondLst>
+                        <p:cond delay="0"/>
+                      </p:stCondLst>
+                      <p:childTnLst>
+                        <p:par>
+                          <p:cTn id="26" fill="hold">
+                            <p:stCondLst>
+                              <p:cond delay="0"/>
+                            </p:stCondLst>
+                            <p:childTnLst>
+                              <p:par>
+                                <p:cTn id="27" presetID="10" presetClass="entr" presetSubtype="0" fill="hold" grpId="0" nodeType="clickEffect">
+                                  <p:stCondLst>
+                                    <p:cond delay="0"/>
+                                  </p:stCondLst>
+                                  <p:childTnLst>
+                                    <p:set>
+                                      <p:cBhvr>
+                                        <p:cTn id="28" dur="1" fill="hold">
+                                          <p:stCondLst>
+                                            <p:cond delay="0"/>
+                                          </p:stCondLst>
+                                        </p:cTn>
+                                        <p:tgtEl>
+                                          <p:spTgt spid="7"/>
+                                        </p:tgtEl>
+                                        <p:attrNameLst>
+                                          <p:attrName>style.visibility</p:attrName>
+                                        </p:attrNameLst>
+                                      </p:cBhvr>
+                                      <p:to>
+                                        <p:strVal val="visible"/>
+                                      </p:to>
+                                    </p:set>
+                                    <p:animEffect transition="in" filter="fade">
+                                      <p:cBhvr>
+                                        <p:cTn id="29" dur="500"/>
+                                        <p:tgtEl>
+                                          <p:spTgt spid="7"/>
+                                        </p:tgtEl>
+                                      </p:cBhvr>
+                                    </p:animEffect>
+                                  </p:childTnLst>
+                                </p:cTn>
+                              </p:par>
+                            </p:childTnLst>
+                          </p:cTn>
+                        </p:par>
+                      </p:childTnLst>
+                    </p:cTn>
+                  </p:par>
+                  <p:par>
+                    <p:cTn id="30" fill="hold">
+                      <p:stCondLst>
+                        <p:cond delay="indefinite"/>
+                      </p:stCondLst>
+                      <p:childTnLst>
+                        <p:par>
+                          <p:cTn id="31" fill="hold">
+                            <p:stCondLst>
+                              <p:cond delay="0"/>
+                            </p:stCondLst>
+                            <p:childTnLst>
+                              <p:par>
+                                <p:cTn id="32" presetID="10" presetClass="exit" presetSubtype="0" fill="hold" grpId="1" nodeType="clickEffect">
+                                  <p:stCondLst>
+                                    <p:cond delay="0"/>
+                                  </p:stCondLst>
+                                  <p:childTnLst>
+                                    <p:animEffect transition="out" filter="fade">
+                                      <p:cBhvr>
+                                        <p:cTn id="33" dur="500"/>
+                                        <p:tgtEl>
+                                          <p:spTgt spid="7"/>
+                                        </p:tgtEl>
+                                      </p:cBhvr>
+                                    </p:animEffect>
+                                    <p:set>
+                                      <p:cBhvr>
+                                        <p:cTn id="34" dur="1" fill="hold">
+                                          <p:stCondLst>
+                                            <p:cond delay="499"/>
+                                          </p:stCondLst>
+                                        </p:cTn>
+                                        <p:tgtEl>
+                                          <p:spTgt spid="7"/>
+                                        </p:tgtEl>
+                                        <p:attrNameLst>
+                                          <p:attrName>style.visibility</p:attrName>
+                                        </p:attrNameLst>
+                                      </p:cBhvr>
+                                      <p:to>
+                                        <p:strVal val="hidden"/>
+                                      </p:to>
+                                    </p:set>
+                                  </p:childTnLst>
+                                </p:cTn>
+                              </p:par>
+                            </p:childTnLst>
+                          </p:cTn>
+                        </p:par>
+                      </p:childTnLst>
+                    </p:cTn>
+                  </p:par>
+                </p:childTnLst>
+              </p:cTn>
+              <p:nextCondLst>
+                <p:cond evt="onClick" delay="0">
+                  <p:tgtEl>
+                    <p:spTgt spid="6"/>
+                  </p:tgtEl>
+                </p:cond>
+              </p:nextCondLst>
+            </p:seq>
+            <p:seq concurrent="1" nextAc="seek">
+              <p:cTn id="35" restart="whenNotActive" fill="hold" evtFilter="cancelBubble" nodeType="interactiveSeq">
+                <p:stCondLst>
+                  <p:cond evt="onClick" delay="0">
+                    <p:tgtEl>
+                      <p:spTgt spid="8"/>
+                    </p:tgtEl>
+                  </p:cond>
+                </p:stCondLst>
+                <p:endSync evt="end" delay="0">
+                  <p:rtn val="all"/>
+                </p:endSync>
+                <p:childTnLst>
+                  <p:par>
+                    <p:cTn id="36" fill="hold">
+                      <p:stCondLst>
+                        <p:cond delay="0"/>
+                      </p:stCondLst>
+                      <p:childTnLst>
+                        <p:par>
+                          <p:cTn id="37" fill="hold">
+                            <p:stCondLst>
+                              <p:cond delay="0"/>
+                            </p:stCondLst>
+                            <p:childTnLst>
+                              <p:par>
+                                <p:cTn id="38" presetID="10" presetClass="entr" presetSubtype="0" fill="hold" grpId="0" nodeType="clickEffect">
+                                  <p:stCondLst>
+                                    <p:cond delay="0"/>
+                                  </p:stCondLst>
+                                  <p:childTnLst>
+                                    <p:set>
+                                      <p:cBhvr>
+                                        <p:cTn id="39" dur="1" fill="hold">
+                                          <p:stCondLst>
+                                            <p:cond delay="0"/>
+                                          </p:stCondLst>
+                                        </p:cTn>
+                                        <p:tgtEl>
+                                          <p:spTgt spid="9"/>
+                                        </p:tgtEl>
+                                        <p:attrNameLst>
+                                          <p:attrName>style.visibility</p:attrName>
+                                        </p:attrNameLst>
+                                      </p:cBhvr>
+                                      <p:to>
+                                        <p:strVal val="visible"/>
+                                      </p:to>
+                                    </p:set>
+                                    <p:animEffect transition="in" filter="fade">
+                                      <p:cBhvr>
+                                        <p:cTn id="40" dur="500"/>
+                                        <p:tgtEl>
+                                          <p:spTgt spid="9"/>
+                                        </p:tgtEl>
+                                      </p:cBhvr>
+                                    </p:animEffect>
+                                  </p:childTnLst>
+                                </p:cTn>
+                              </p:par>
+                            </p:childTnLst>
+                          </p:cTn>
+                        </p:par>
+                      </p:childTnLst>
+                    </p:cTn>
+                  </p:par>
+                  <p:par>
+                    <p:cTn id="41" fill="hold">
+                      <p:stCondLst>
+                        <p:cond delay="indefinite"/>
+                      </p:stCondLst>
+                      <p:childTnLst>
+                        <p:par>
+                          <p:cTn id="42" fill="hold">
+                            <p:stCondLst>
+                              <p:cond delay="0"/>
+                            </p:stCondLst>
+                            <p:childTnLst>
+                              <p:par>
+                                <p:cTn id="43" presetID="10" presetClass="exit" presetSubtype="0" fill="hold" grpId="1" nodeType="clickEffect">
+                                  <p:stCondLst>
+                                    <p:cond delay="0"/>
+                                  </p:stCondLst>
+                                  <p:childTnLst>
+                                    <p:animEffect transition="out" filter="fade">
+                                      <p:cBhvr>
+                                        <p:cTn id="44" dur="500"/>
+                                        <p:tgtEl>
                                           <p:spTgt spid="9"/>
                                         </p:tgtEl>
                                       </p:cBhvr>
                                     </p:animEffect>
                                     <p:set>
                                       <p:cBhvr>
-                                        <p:cTn id="12" dur="1" fill="hold">
+                                        <p:cTn id="45" dur="1" fill="hold">
                                           <p:stCondLst>
                                             <p:cond delay="499"/>
                                           </p:stCondLst>
@@ -12023,7 +12275,7 @@
               </p:nextCondLst>
             </p:seq>
             <p:seq concurrent="1" nextAc="seek">
-              <p:cTn id="13" restart="whenNotActive" fill="hold" evtFilter="cancelBubble" nodeType="interactiveSeq">
+              <p:cTn id="46" restart="whenNotActive" fill="hold" evtFilter="cancelBubble" nodeType="interactiveSeq">
                 <p:stCondLst>
                   <p:cond evt="onClick" delay="0">
                     <p:tgtEl>
@@ -12036,26 +12288,26 @@
                 </p:endSync>
                 <p:childTnLst>
                   <p:par>
-                    <p:cTn id="14" fill="hold">
+                    <p:cTn id="47" fill="hold">
                       <p:stCondLst>
                         <p:cond delay="0"/>
                       </p:stCondLst>
                       <p:childTnLst>
                         <p:par>
-                          <p:cTn id="15" fill="hold">
+                          <p:cTn id="48" fill="hold">
                             <p:stCondLst>
                               <p:cond delay="0"/>
                             </p:stCondLst>
                             <p:childTnLst>
                               <p:par>
-                                <p:cTn id="16" presetID="10" presetClass="entr" presetSubtype="0" fill="hold" grpId="0" nodeType="clickEffect">
+                                <p:cTn id="49" presetID="10" presetClass="entr" presetSubtype="0" fill="hold" grpId="0" nodeType="clickEffect">
                                   <p:stCondLst>
                                     <p:cond delay="0"/>
                                   </p:stCondLst>
                                   <p:childTnLst>
                                     <p:set>
                                       <p:cBhvr>
-                                        <p:cTn id="17" dur="1" fill="hold">
+                                        <p:cTn id="50" dur="1" fill="hold">
                                           <p:stCondLst>
                                             <p:cond delay="0"/>
                                           </p:stCondLst>
@@ -12073,7 +12325,7 @@
                                     </p:set>
                                     <p:animEffect transition="in" filter="fade">
                                       <p:cBhvr>
-                                        <p:cTn id="18" dur="500"/>
+                                        <p:cTn id="51" dur="500"/>
                                         <p:tgtEl>
                                           <p:spTgt spid="11"/>
                                         </p:tgtEl>
@@ -12089,26 +12341,26 @@
                     </p:cTn>
                   </p:par>
                   <p:par>
-                    <p:cTn id="19" fill="hold">
+                    <p:cTn id="52" fill="hold">
                       <p:stCondLst>
                         <p:cond delay="indefinite"/>
                       </p:stCondLst>
                       <p:childTnLst>
                         <p:par>
-                          <p:cTn id="20" fill="hold">
+                          <p:cTn id="53" fill="hold">
                             <p:stCondLst>
                               <p:cond delay="0"/>
                             </p:stCondLst>
                             <p:childTnLst>
                               <p:par>
-                                <p:cTn id="21" presetID="10" presetClass="exit" presetSubtype="0" fill="hold" grpId="1" nodeType="clickEffect">
+                                <p:cTn id="54" presetID="10" presetClass="exit" presetSubtype="0" fill="hold" grpId="1" nodeType="clickEffect">
                                   <p:stCondLst>
                                     <p:cond delay="0"/>
                                   </p:stCondLst>
                                   <p:childTnLst>
                                     <p:animEffect transition="out" filter="fade">
                                       <p:cBhvr>
-                                        <p:cTn id="22" dur="500"/>
+                                        <p:cTn id="55" dur="500"/>
                                         <p:tgtEl>
                                           <p:spTgt spid="11"/>
                                         </p:tgtEl>
@@ -12116,7 +12368,7 @@
                                     </p:animEffect>
                                     <p:set>
                                       <p:cBhvr>
-                                        <p:cTn id="23" dur="1" fill="hold">
+                                        <p:cTn id="56" dur="1" fill="hold">
                                           <p:stCondLst>
                                             <p:cond delay="499"/>
                                           </p:stCondLst>
@@ -12151,408 +12403,21 @@
                 </p:cond>
               </p:nextCondLst>
             </p:seq>
-            <p:seq concurrent="1" nextAc="seek">
-              <p:cTn id="24" restart="whenNotActive" fill="hold" evtFilter="cancelBubble" nodeType="interactiveSeq">
-                <p:stCondLst>
-                  <p:cond evt="onClick" delay="0">
-                    <p:tgtEl>
-                      <p:spTgt spid="12"/>
-                    </p:tgtEl>
-                  </p:cond>
-                </p:stCondLst>
-                <p:endSync evt="end" delay="0">
-                  <p:rtn val="all"/>
-                </p:endSync>
-                <p:childTnLst>
-                  <p:par>
-                    <p:cTn id="25" fill="hold">
-                      <p:stCondLst>
-                        <p:cond delay="0"/>
-                      </p:stCondLst>
-                      <p:childTnLst>
-                        <p:par>
-                          <p:cTn id="26" fill="hold">
-                            <p:stCondLst>
-                              <p:cond delay="0"/>
-                            </p:stCondLst>
-                            <p:childTnLst>
-                              <p:par>
-                                <p:cTn id="27" presetID="10" presetClass="entr" presetSubtype="0" fill="hold" grpId="0" nodeType="clickEffect">
-                                  <p:stCondLst>
-                                    <p:cond delay="0"/>
-                                  </p:stCondLst>
-                                  <p:childTnLst>
-                                    <p:set>
-                                      <p:cBhvr>
-                                        <p:cTn id="28" dur="1" fill="hold">
-                                          <p:stCondLst>
-                                            <p:cond delay="0"/>
-                                          </p:stCondLst>
-                                        </p:cTn>
-                                        <p:tgtEl>
-                                          <p:spTgt spid="13"/>
-                                        </p:tgtEl>
-                                        <p:attrNameLst>
-                                          <p:attrName>style.visibility</p:attrName>
-                                        </p:attrNameLst>
-                                      </p:cBhvr>
-                                      <p:to>
-                                        <p:strVal val="visible"/>
-                                      </p:to>
-                                    </p:set>
-                                    <p:animEffect transition="in" filter="fade">
-                                      <p:cBhvr>
-                                        <p:cTn id="29" dur="500"/>
-                                        <p:tgtEl>
-                                          <p:spTgt spid="13"/>
-                                        </p:tgtEl>
-                                      </p:cBhvr>
-                                    </p:animEffect>
-                                  </p:childTnLst>
-                                </p:cTn>
-                              </p:par>
-                            </p:childTnLst>
-                          </p:cTn>
-                        </p:par>
-                      </p:childTnLst>
-                    </p:cTn>
-                  </p:par>
-                  <p:par>
-                    <p:cTn id="30" fill="hold">
-                      <p:stCondLst>
-                        <p:cond delay="indefinite"/>
-                      </p:stCondLst>
-                      <p:childTnLst>
-                        <p:par>
-                          <p:cTn id="31" fill="hold">
-                            <p:stCondLst>
-                              <p:cond delay="0"/>
-                            </p:stCondLst>
-                            <p:childTnLst>
-                              <p:par>
-                                <p:cTn id="32" presetID="10" presetClass="exit" presetSubtype="0" fill="hold" grpId="1" nodeType="clickEffect">
-                                  <p:stCondLst>
-                                    <p:cond delay="0"/>
-                                  </p:stCondLst>
-                                  <p:childTnLst>
-                                    <p:animEffect transition="out" filter="fade">
-                                      <p:cBhvr>
-                                        <p:cTn id="33" dur="500"/>
-                                        <p:tgtEl>
-                                          <p:spTgt spid="13"/>
-                                        </p:tgtEl>
-                                      </p:cBhvr>
-                                    </p:animEffect>
-                                    <p:set>
-                                      <p:cBhvr>
-                                        <p:cTn id="34" dur="1" fill="hold">
-                                          <p:stCondLst>
-                                            <p:cond delay="499"/>
-                                          </p:stCondLst>
-                                        </p:cTn>
-                                        <p:tgtEl>
-                                          <p:spTgt spid="13"/>
-                                        </p:tgtEl>
-                                        <p:attrNameLst>
-                                          <p:attrName>style.visibility</p:attrName>
-                                        </p:attrNameLst>
-                                      </p:cBhvr>
-                                      <p:to>
-                                        <p:strVal val="hidden"/>
-                                      </p:to>
-                                    </p:set>
-                                  </p:childTnLst>
-                                </p:cTn>
-                              </p:par>
-                            </p:childTnLst>
-                          </p:cTn>
-                        </p:par>
-                      </p:childTnLst>
-                    </p:cTn>
-                  </p:par>
-                </p:childTnLst>
-              </p:cTn>
-              <p:nextCondLst>
-                <p:cond evt="onClick" delay="0">
-                  <p:tgtEl>
-                    <p:spTgt spid="12"/>
-                  </p:tgtEl>
-                </p:cond>
-              </p:nextCondLst>
-            </p:seq>
-            <p:seq concurrent="1" nextAc="seek">
-              <p:cTn id="35" restart="whenNotActive" fill="hold" evtFilter="cancelBubble" nodeType="interactiveSeq">
-                <p:stCondLst>
-                  <p:cond evt="onClick" delay="0">
-                    <p:tgtEl>
-                      <p:spTgt spid="14"/>
-                    </p:tgtEl>
-                  </p:cond>
-                </p:stCondLst>
-                <p:endSync evt="end" delay="0">
-                  <p:rtn val="all"/>
-                </p:endSync>
-                <p:childTnLst>
-                  <p:par>
-                    <p:cTn id="36" fill="hold">
-                      <p:stCondLst>
-                        <p:cond delay="0"/>
-                      </p:stCondLst>
-                      <p:childTnLst>
-                        <p:par>
-                          <p:cTn id="37" fill="hold">
-                            <p:stCondLst>
-                              <p:cond delay="0"/>
-                            </p:stCondLst>
-                            <p:childTnLst>
-                              <p:par>
-                                <p:cTn id="38" presetID="10" presetClass="entr" presetSubtype="0" fill="hold" grpId="0" nodeType="clickEffect">
-                                  <p:stCondLst>
-                                    <p:cond delay="0"/>
-                                  </p:stCondLst>
-                                  <p:childTnLst>
-                                    <p:set>
-                                      <p:cBhvr>
-                                        <p:cTn id="39" dur="1" fill="hold">
-                                          <p:stCondLst>
-                                            <p:cond delay="0"/>
-                                          </p:stCondLst>
-                                        </p:cTn>
-                                        <p:tgtEl>
-                                          <p:spTgt spid="15"/>
-                                        </p:tgtEl>
-                                        <p:attrNameLst>
-                                          <p:attrName>style.visibility</p:attrName>
-                                        </p:attrNameLst>
-                                      </p:cBhvr>
-                                      <p:to>
-                                        <p:strVal val="visible"/>
-                                      </p:to>
-                                    </p:set>
-                                    <p:animEffect transition="in" filter="fade">
-                                      <p:cBhvr>
-                                        <p:cTn id="40" dur="500"/>
-                                        <p:tgtEl>
-                                          <p:spTgt spid="15"/>
-                                        </p:tgtEl>
-                                      </p:cBhvr>
-                                    </p:animEffect>
-                                  </p:childTnLst>
-                                </p:cTn>
-                              </p:par>
-                            </p:childTnLst>
-                          </p:cTn>
-                        </p:par>
-                      </p:childTnLst>
-                    </p:cTn>
-                  </p:par>
-                  <p:par>
-                    <p:cTn id="41" fill="hold">
-                      <p:stCondLst>
-                        <p:cond delay="indefinite"/>
-                      </p:stCondLst>
-                      <p:childTnLst>
-                        <p:par>
-                          <p:cTn id="42" fill="hold">
-                            <p:stCondLst>
-                              <p:cond delay="0"/>
-                            </p:stCondLst>
-                            <p:childTnLst>
-                              <p:par>
-                                <p:cTn id="43" presetID="10" presetClass="exit" presetSubtype="0" fill="hold" grpId="1" nodeType="clickEffect">
-                                  <p:stCondLst>
-                                    <p:cond delay="0"/>
-                                  </p:stCondLst>
-                                  <p:childTnLst>
-                                    <p:animEffect transition="out" filter="fade">
-                                      <p:cBhvr>
-                                        <p:cTn id="44" dur="500"/>
-                                        <p:tgtEl>
-                                          <p:spTgt spid="15"/>
-                                        </p:tgtEl>
-                                      </p:cBhvr>
-                                    </p:animEffect>
-                                    <p:set>
-                                      <p:cBhvr>
-                                        <p:cTn id="45" dur="1" fill="hold">
-                                          <p:stCondLst>
-                                            <p:cond delay="499"/>
-                                          </p:stCondLst>
-                                        </p:cTn>
-                                        <p:tgtEl>
-                                          <p:spTgt spid="15"/>
-                                        </p:tgtEl>
-                                        <p:attrNameLst>
-                                          <p:attrName>style.visibility</p:attrName>
-                                        </p:attrNameLst>
-                                      </p:cBhvr>
-                                      <p:to>
-                                        <p:strVal val="hidden"/>
-                                      </p:to>
-                                    </p:set>
-                                  </p:childTnLst>
-                                </p:cTn>
-                              </p:par>
-                            </p:childTnLst>
-                          </p:cTn>
-                        </p:par>
-                      </p:childTnLst>
-                    </p:cTn>
-                  </p:par>
-                </p:childTnLst>
-              </p:cTn>
-              <p:nextCondLst>
-                <p:cond evt="onClick" delay="0">
-                  <p:tgtEl>
-                    <p:spTgt spid="14"/>
-                  </p:tgtEl>
-                </p:cond>
-              </p:nextCondLst>
-            </p:seq>
-            <p:seq concurrent="1" nextAc="seek">
-              <p:cTn id="46" restart="whenNotActive" fill="hold" evtFilter="cancelBubble" nodeType="interactiveSeq">
-                <p:stCondLst>
-                  <p:cond evt="onClick" delay="0">
-                    <p:tgtEl>
-                      <p:spTgt spid="16"/>
-                    </p:tgtEl>
-                  </p:cond>
-                </p:stCondLst>
-                <p:endSync evt="end" delay="0">
-                  <p:rtn val="all"/>
-                </p:endSync>
-                <p:childTnLst>
-                  <p:par>
-                    <p:cTn id="47" fill="hold">
-                      <p:stCondLst>
-                        <p:cond delay="0"/>
-                      </p:stCondLst>
-                      <p:childTnLst>
-                        <p:par>
-                          <p:cTn id="48" fill="hold">
-                            <p:stCondLst>
-                              <p:cond delay="0"/>
-                            </p:stCondLst>
-                            <p:childTnLst>
-                              <p:par>
-                                <p:cTn id="49" presetID="10" presetClass="entr" presetSubtype="0" fill="hold" grpId="0" nodeType="clickEffect">
-                                  <p:stCondLst>
-                                    <p:cond delay="0"/>
-                                  </p:stCondLst>
-                                  <p:childTnLst>
-                                    <p:set>
-                                      <p:cBhvr>
-                                        <p:cTn id="50" dur="1" fill="hold">
-                                          <p:stCondLst>
-                                            <p:cond delay="0"/>
-                                          </p:stCondLst>
-                                        </p:cTn>
-                                        <p:tgtEl>
-                                          <p:spTgt spid="17"/>
-                                        </p:tgtEl>
-                                        <p:attrNameLst>
-                                          <p:attrName>style.visibility</p:attrName>
-                                        </p:attrNameLst>
-                                      </p:cBhvr>
-                                      <p:to>
-                                        <p:strVal val="visible"/>
-                                      </p:to>
-                                    </p:set>
-                                    <p:animEffect transition="in" filter="fade">
-                                      <p:cBhvr>
-                                        <p:cTn id="51" dur="500"/>
-                                        <p:tgtEl>
-                                          <p:spTgt spid="17"/>
-                                        </p:tgtEl>
-                                      </p:cBhvr>
-                                    </p:animEffect>
-                                  </p:childTnLst>
-                                </p:cTn>
-                              </p:par>
-                            </p:childTnLst>
-                          </p:cTn>
-                        </p:par>
-                      </p:childTnLst>
-                    </p:cTn>
-                  </p:par>
-                  <p:par>
-                    <p:cTn id="52" fill="hold">
-                      <p:stCondLst>
-                        <p:cond delay="indefinite"/>
-                      </p:stCondLst>
-                      <p:childTnLst>
-                        <p:par>
-                          <p:cTn id="53" fill="hold">
-                            <p:stCondLst>
-                              <p:cond delay="0"/>
-                            </p:stCondLst>
-                            <p:childTnLst>
-                              <p:par>
-                                <p:cTn id="54" presetID="10" presetClass="exit" presetSubtype="0" fill="hold" grpId="1" nodeType="clickEffect">
-                                  <p:stCondLst>
-                                    <p:cond delay="0"/>
-                                  </p:stCondLst>
-                                  <p:childTnLst>
-                                    <p:animEffect transition="out" filter="fade">
-                                      <p:cBhvr>
-                                        <p:cTn id="55" dur="500"/>
-                                        <p:tgtEl>
-                                          <p:spTgt spid="17"/>
-                                        </p:tgtEl>
-                                      </p:cBhvr>
-                                    </p:animEffect>
-                                    <p:set>
-                                      <p:cBhvr>
-                                        <p:cTn id="56" dur="1" fill="hold">
-                                          <p:stCondLst>
-                                            <p:cond delay="499"/>
-                                          </p:stCondLst>
-                                        </p:cTn>
-                                        <p:tgtEl>
-                                          <p:spTgt spid="17"/>
-                                        </p:tgtEl>
-                                        <p:attrNameLst>
-                                          <p:attrName>style.visibility</p:attrName>
-                                        </p:attrNameLst>
-                                      </p:cBhvr>
-                                      <p:to>
-                                        <p:strVal val="hidden"/>
-                                      </p:to>
-                                    </p:set>
-                                  </p:childTnLst>
-                                </p:cTn>
-                              </p:par>
-                            </p:childTnLst>
-                          </p:cTn>
-                        </p:par>
-                      </p:childTnLst>
-                    </p:cTn>
-                  </p:par>
-                </p:childTnLst>
-              </p:cTn>
-              <p:nextCondLst>
-                <p:cond evt="onClick" delay="0">
-                  <p:tgtEl>
-                    <p:spTgt spid="16"/>
-                  </p:tgtEl>
-                </p:cond>
-              </p:nextCondLst>
-            </p:seq>
           </p:childTnLst>
         </p:cTn>
       </p:par>
     </p:tnLst>
     <p:bldLst>
+      <p:bldP spid="3" grpId="0" animBg="1"/>
+      <p:bldP spid="3" grpId="1" animBg="1"/>
+      <p:bldP spid="5" grpId="0" animBg="1"/>
+      <p:bldP spid="5" grpId="1" animBg="1"/>
+      <p:bldP spid="7" grpId="0" animBg="1"/>
+      <p:bldP spid="7" grpId="1" animBg="1"/>
       <p:bldP spid="9" grpId="0" animBg="1"/>
       <p:bldP spid="9" grpId="1" animBg="1"/>
       <p:bldP spid="11" grpId="0" animBg="1"/>
       <p:bldP spid="11" grpId="1" animBg="1"/>
-      <p:bldP spid="13" grpId="0" animBg="1"/>
-      <p:bldP spid="13" grpId="1" animBg="1"/>
-      <p:bldP spid="15" grpId="0" animBg="1"/>
-      <p:bldP spid="15" grpId="1" animBg="1"/>
-      <p:bldP spid="17" grpId="0" animBg="1"/>
-      <p:bldP spid="17" grpId="1" animBg="1"/>
     </p:bldLst>
   </p:timing>
 </p:sld>
@@ -12615,21 +12480,6 @@
   <p:clrMapOvr>
     <a:masterClrMapping/>
   </p:clrMapOvr>
-  <mc:AlternateContent xmlns:mc="http://schemas.openxmlformats.org/markup-compatibility/2006" xmlns:p14="http://schemas.microsoft.com/office/powerpoint/2010/main">
-    <mc:Choice Requires="p14">
-      <p:transition spd="slow" p14:dur="2000"/>
-    </mc:Choice>
-    <mc:Fallback xmlns="">
-      <p:transition spd="slow"/>
-    </mc:Fallback>
-  </mc:AlternateContent>
-  <p:timing>
-    <p:tnLst>
-      <p:par>
-        <p:cTn id="1" dur="indefinite" restart="never" nodeType="tmRoot"/>
-      </p:par>
-    </p:tnLst>
-  </p:timing>
 </p:sld>
 </file>
 
@@ -12685,7 +12535,7 @@
           <a:p>
             <a:pPr algn="l"/>
             <a:r>
-              <a:rPr lang="en-US" sz="7200" dirty="0" smtClean="0">
+              <a:rPr lang="en-US" sz="7200" dirty="0">
                 <a:solidFill>
                   <a:schemeClr val="bg1"/>
                 </a:solidFill>
@@ -12710,13 +12560,6 @@
   <p:clrMapOvr>
     <a:masterClrMapping/>
   </p:clrMapOvr>
-  <p:timing>
-    <p:tnLst>
-      <p:par>
-        <p:cTn id="1" dur="indefinite" restart="never" nodeType="tmRoot"/>
-      </p:par>
-    </p:tnLst>
-  </p:timing>
 </p:sld>
 </file>
 
@@ -12765,7 +12608,7 @@
           <a:lstStyle/>
           <a:p>
             <a:r>
-              <a:rPr lang="en-US" dirty="0" smtClean="0"/>
+              <a:rPr lang="en-US" dirty="0"/>
               <a:t>Create Tooltip: None Selected</a:t>
             </a:r>
             <a:endParaRPr lang="en-SG" dirty="0"/>
@@ -12793,13 +12636,13 @@
           <a:lstStyle/>
           <a:p>
             <a:r>
-              <a:rPr lang="en-US" dirty="0" smtClean="0"/>
+              <a:rPr lang="en-US" dirty="0"/>
               <a:t>Unselect everything</a:t>
             </a:r>
           </a:p>
           <a:p>
             <a:r>
-              <a:rPr lang="en-US" dirty="0" smtClean="0"/>
+              <a:rPr lang="en-US" dirty="0"/>
               <a:t>Click ‘Create Tooltip’</a:t>
             </a:r>
             <a:endParaRPr lang="en-SG" dirty="0"/>
@@ -12816,13 +12659,6 @@
   <p:clrMapOvr>
     <a:masterClrMapping/>
   </p:clrMapOvr>
-  <p:timing>
-    <p:tnLst>
-      <p:par>
-        <p:cTn id="1" dur="indefinite" restart="never" nodeType="tmRoot"/>
-      </p:par>
-    </p:tnLst>
-  </p:timing>
 </p:sld>
 </file>
 
@@ -12893,13 +12729,6 @@
   <p:clrMapOvr>
     <a:masterClrMapping/>
   </p:clrMapOvr>
-  <p:timing>
-    <p:tnLst>
-      <p:par>
-        <p:cTn id="1" dur="indefinite" restart="never" nodeType="tmRoot"/>
-      </p:par>
-    </p:tnLst>
-  </p:timing>
 </p:sld>
 </file>
 
@@ -12972,18 +12801,13 @@
           <a:p>
             <a:pPr algn="ctr"/>
             <a:r>
-              <a:rPr lang="en-SG" sz="1600" smtClean="0">
+              <a:rPr lang="en-SG" sz="1600">
                 <a:solidFill>
                   <a:srgbClr val="FFFFFF"/>
                 </a:solidFill>
               </a:rPr>
               <a:t>?</a:t>
             </a:r>
-            <a:endParaRPr lang="en-SG" sz="1600">
-              <a:solidFill>
-                <a:srgbClr val="FFFFFF"/>
-              </a:solidFill>
-            </a:endParaRPr>
           </a:p>
         </p:txBody>
       </p:sp>
@@ -13291,7 +13115,7 @@
           <a:lstStyle/>
           <a:p>
             <a:r>
-              <a:rPr lang="en-US" dirty="0" smtClean="0"/>
+              <a:rPr lang="en-US" dirty="0"/>
               <a:t>Create Tooltip: Shape Selected</a:t>
             </a:r>
             <a:endParaRPr lang="en-SG" dirty="0"/>
@@ -13319,13 +13143,13 @@
           <a:lstStyle/>
           <a:p>
             <a:r>
-              <a:rPr lang="en-US" dirty="0" smtClean="0"/>
+              <a:rPr lang="en-US" dirty="0"/>
               <a:t>Select the shape</a:t>
             </a:r>
           </a:p>
           <a:p>
             <a:r>
-              <a:rPr lang="en-US" dirty="0" smtClean="0"/>
+              <a:rPr lang="en-US" dirty="0"/>
               <a:t>Click ‘Create Tooltip’</a:t>
             </a:r>
             <a:endParaRPr lang="en-SG" dirty="0"/>
@@ -13342,13 +13166,6 @@
   <p:clrMapOvr>
     <a:masterClrMapping/>
   </p:clrMapOvr>
-  <p:timing>
-    <p:tnLst>
-      <p:par>
-        <p:cTn id="1" dur="indefinite" restart="never" nodeType="tmRoot"/>
-      </p:par>
-    </p:tnLst>
-  </p:timing>
 </p:sld>
 </file>
 
@@ -13406,7 +13223,7 @@
           <a:p>
             <a:pPr algn="ctr"/>
             <a:r>
-              <a:rPr lang="en-US" dirty="0" smtClean="0"/>
+              <a:rPr lang="en-US" dirty="0"/>
               <a:t>Select me!</a:t>
             </a:r>
             <a:endParaRPr lang="en-SG" dirty="0"/>
@@ -13423,13 +13240,6 @@
   <p:clrMapOvr>
     <a:masterClrMapping/>
   </p:clrMapOvr>
-  <p:timing>
-    <p:tnLst>
-      <p:par>
-        <p:cTn id="1" dur="indefinite" restart="never" nodeType="tmRoot"/>
-      </p:par>
-    </p:tnLst>
-  </p:timing>
 </p:sld>
 </file>
 
@@ -13487,7 +13297,7 @@
           <a:p>
             <a:pPr algn="ctr"/>
             <a:r>
-              <a:rPr lang="en-US" dirty="0" smtClean="0"/>
+              <a:rPr lang="en-US" dirty="0"/>
               <a:t>Select me!</a:t>
             </a:r>
             <a:endParaRPr lang="en-SG" dirty="0"/>
@@ -13546,18 +13356,13 @@
           <a:p>
             <a:pPr algn="ctr"/>
             <a:r>
-              <a:rPr lang="en-SG" sz="1600" smtClean="0">
+              <a:rPr lang="en-SG" sz="1600">
                 <a:solidFill>
                   <a:srgbClr val="FFFFFF"/>
                 </a:solidFill>
               </a:rPr>
               <a:t>?</a:t>
             </a:r>
-            <a:endParaRPr lang="en-SG" sz="1600">
-              <a:solidFill>
-                <a:srgbClr val="FFFFFF"/>
-              </a:solidFill>
-            </a:endParaRPr>
           </a:p>
         </p:txBody>
       </p:sp>
@@ -13825,7 +13630,7 @@
           <a:lstStyle/>
           <a:p>
             <a:r>
-              <a:rPr lang="en-US" dirty="0" smtClean="0"/>
+              <a:rPr lang="en-US" dirty="0"/>
               <a:t>Create Tooltip: Existing tooltip present</a:t>
             </a:r>
             <a:endParaRPr lang="en-SG" dirty="0"/>
@@ -13853,7 +13658,7 @@
           <a:lstStyle/>
           <a:p>
             <a:r>
-              <a:rPr lang="en-US" dirty="0" smtClean="0"/>
+              <a:rPr lang="en-US" dirty="0"/>
               <a:t>Click ‘Create Tooltip’ (existing tooltips should not affect creation of new tooltips)</a:t>
             </a:r>
             <a:endParaRPr lang="en-SG" dirty="0"/>
@@ -13870,13 +13675,6 @@
   <p:clrMapOvr>
     <a:masterClrMapping/>
   </p:clrMapOvr>
-  <p:timing>
-    <p:tnLst>
-      <p:par>
-        <p:cTn id="1" dur="indefinite" restart="never" nodeType="tmRoot"/>
-      </p:par>
-    </p:tnLst>
-  </p:timing>
 </p:sld>
 </file>
 

</xml_diff>